<commit_message>
Added a technical instruments slide
</commit_message>
<xml_diff>
--- a/REAL.NET.pptx
+++ b/REAL.NET.pptx
@@ -12,7 +12,8 @@
     <p:sldId id="264" r:id="rId6"/>
     <p:sldId id="262" r:id="rId7"/>
     <p:sldId id="263" r:id="rId8"/>
-    <p:sldId id="259" r:id="rId9"/>
+    <p:sldId id="265" r:id="rId9"/>
+    <p:sldId id="259" r:id="rId10"/>
   </p:sldIdLst>
   <p:sldSz cx="12192000" cy="6858000"/>
   <p:notesSz cx="6858000" cy="9144000"/>
@@ -113,7 +114,7 @@
   </p:defaultTextStyle>
   <p:extLst>
     <p:ext uri="{EFAFB233-063F-42B5-8137-9DF3F51BA10A}">
-      <p15:sldGuideLst xmlns="" xmlns:p15="http://schemas.microsoft.com/office/powerpoint/2012/main"/>
+      <p15:sldGuideLst xmlns:p15="http://schemas.microsoft.com/office/powerpoint/2012/main" xmlns=""/>
     </p:ext>
   </p:extLst>
 </p:presentation>
@@ -254,7 +255,7 @@
           <p:cNvPr id="2" name="Заголовок 1">
             <a:extLst>
               <a:ext uri="{FF2B5EF4-FFF2-40B4-BE49-F238E27FC236}">
-                <a16:creationId xmlns="" xmlns:a16="http://schemas.microsoft.com/office/drawing/2014/main" id="{37CAFF4F-E106-4FFC-930C-B2CF5F22161A}"/>
+                <a16:creationId xmlns:a16="http://schemas.microsoft.com/office/drawing/2014/main" xmlns="" id="{37CAFF4F-E106-4FFC-930C-B2CF5F22161A}"/>
               </a:ext>
             </a:extLst>
           </p:cNvPr>
@@ -291,7 +292,7 @@
           <p:cNvPr id="3" name="Подзаголовок 2">
             <a:extLst>
               <a:ext uri="{FF2B5EF4-FFF2-40B4-BE49-F238E27FC236}">
-                <a16:creationId xmlns="" xmlns:a16="http://schemas.microsoft.com/office/drawing/2014/main" id="{D931388F-6771-4551-91FD-5E21225AF71E}"/>
+                <a16:creationId xmlns:a16="http://schemas.microsoft.com/office/drawing/2014/main" xmlns="" id="{D931388F-6771-4551-91FD-5E21225AF71E}"/>
               </a:ext>
             </a:extLst>
           </p:cNvPr>
@@ -361,7 +362,7 @@
           <p:cNvPr id="4" name="Дата 3">
             <a:extLst>
               <a:ext uri="{FF2B5EF4-FFF2-40B4-BE49-F238E27FC236}">
-                <a16:creationId xmlns="" xmlns:a16="http://schemas.microsoft.com/office/drawing/2014/main" id="{891E1217-D87F-4D0A-BAC3-AC2EB3EB3948}"/>
+                <a16:creationId xmlns:a16="http://schemas.microsoft.com/office/drawing/2014/main" xmlns="" id="{891E1217-D87F-4D0A-BAC3-AC2EB3EB3948}"/>
               </a:ext>
             </a:extLst>
           </p:cNvPr>
@@ -390,7 +391,7 @@
           <p:cNvPr id="5" name="Нижний колонтитул 4">
             <a:extLst>
               <a:ext uri="{FF2B5EF4-FFF2-40B4-BE49-F238E27FC236}">
-                <a16:creationId xmlns="" xmlns:a16="http://schemas.microsoft.com/office/drawing/2014/main" id="{2E38F155-81BE-4451-BA4A-4A4A2FC39B0B}"/>
+                <a16:creationId xmlns:a16="http://schemas.microsoft.com/office/drawing/2014/main" xmlns="" id="{2E38F155-81BE-4451-BA4A-4A4A2FC39B0B}"/>
               </a:ext>
             </a:extLst>
           </p:cNvPr>
@@ -415,7 +416,7 @@
           <p:cNvPr id="6" name="Номер слайда 5">
             <a:extLst>
               <a:ext uri="{FF2B5EF4-FFF2-40B4-BE49-F238E27FC236}">
-                <a16:creationId xmlns="" xmlns:a16="http://schemas.microsoft.com/office/drawing/2014/main" id="{D4AF2960-2CA3-4194-B038-7D2E7F666E01}"/>
+                <a16:creationId xmlns:a16="http://schemas.microsoft.com/office/drawing/2014/main" xmlns="" id="{D4AF2960-2CA3-4194-B038-7D2E7F666E01}"/>
               </a:ext>
             </a:extLst>
           </p:cNvPr>
@@ -474,7 +475,7 @@
           <p:cNvPr id="2" name="Заголовок 1">
             <a:extLst>
               <a:ext uri="{FF2B5EF4-FFF2-40B4-BE49-F238E27FC236}">
-                <a16:creationId xmlns="" xmlns:a16="http://schemas.microsoft.com/office/drawing/2014/main" id="{CB1EEEF4-4B96-4913-8187-25000DB5172B}"/>
+                <a16:creationId xmlns:a16="http://schemas.microsoft.com/office/drawing/2014/main" xmlns="" id="{CB1EEEF4-4B96-4913-8187-25000DB5172B}"/>
               </a:ext>
             </a:extLst>
           </p:cNvPr>
@@ -502,7 +503,7 @@
           <p:cNvPr id="3" name="Вертикальный текст 2">
             <a:extLst>
               <a:ext uri="{FF2B5EF4-FFF2-40B4-BE49-F238E27FC236}">
-                <a16:creationId xmlns="" xmlns:a16="http://schemas.microsoft.com/office/drawing/2014/main" id="{851313DB-3E90-4C47-904F-3DB8D80F491E}"/>
+                <a16:creationId xmlns:a16="http://schemas.microsoft.com/office/drawing/2014/main" xmlns="" id="{851313DB-3E90-4C47-904F-3DB8D80F491E}"/>
               </a:ext>
             </a:extLst>
           </p:cNvPr>
@@ -559,7 +560,7 @@
           <p:cNvPr id="4" name="Дата 3">
             <a:extLst>
               <a:ext uri="{FF2B5EF4-FFF2-40B4-BE49-F238E27FC236}">
-                <a16:creationId xmlns="" xmlns:a16="http://schemas.microsoft.com/office/drawing/2014/main" id="{F2D1EEC3-8F71-4969-9A6A-70F2FB8269C4}"/>
+                <a16:creationId xmlns:a16="http://schemas.microsoft.com/office/drawing/2014/main" xmlns="" id="{F2D1EEC3-8F71-4969-9A6A-70F2FB8269C4}"/>
               </a:ext>
             </a:extLst>
           </p:cNvPr>
@@ -588,7 +589,7 @@
           <p:cNvPr id="5" name="Нижний колонтитул 4">
             <a:extLst>
               <a:ext uri="{FF2B5EF4-FFF2-40B4-BE49-F238E27FC236}">
-                <a16:creationId xmlns="" xmlns:a16="http://schemas.microsoft.com/office/drawing/2014/main" id="{22444CCD-343D-48B0-AA57-298076F7BD70}"/>
+                <a16:creationId xmlns:a16="http://schemas.microsoft.com/office/drawing/2014/main" xmlns="" id="{22444CCD-343D-48B0-AA57-298076F7BD70}"/>
               </a:ext>
             </a:extLst>
           </p:cNvPr>
@@ -613,7 +614,7 @@
           <p:cNvPr id="6" name="Номер слайда 5">
             <a:extLst>
               <a:ext uri="{FF2B5EF4-FFF2-40B4-BE49-F238E27FC236}">
-                <a16:creationId xmlns="" xmlns:a16="http://schemas.microsoft.com/office/drawing/2014/main" id="{75FEDECC-87A2-471F-AEF3-D994F28C85D3}"/>
+                <a16:creationId xmlns:a16="http://schemas.microsoft.com/office/drawing/2014/main" xmlns="" id="{75FEDECC-87A2-471F-AEF3-D994F28C85D3}"/>
               </a:ext>
             </a:extLst>
           </p:cNvPr>
@@ -672,7 +673,7 @@
           <p:cNvPr id="2" name="Вертикальный заголовок 1">
             <a:extLst>
               <a:ext uri="{FF2B5EF4-FFF2-40B4-BE49-F238E27FC236}">
-                <a16:creationId xmlns="" xmlns:a16="http://schemas.microsoft.com/office/drawing/2014/main" id="{E01EC5FD-8E6D-4585-834B-2BA4D8BE2230}"/>
+                <a16:creationId xmlns:a16="http://schemas.microsoft.com/office/drawing/2014/main" xmlns="" id="{E01EC5FD-8E6D-4585-834B-2BA4D8BE2230}"/>
               </a:ext>
             </a:extLst>
           </p:cNvPr>
@@ -705,7 +706,7 @@
           <p:cNvPr id="3" name="Вертикальный текст 2">
             <a:extLst>
               <a:ext uri="{FF2B5EF4-FFF2-40B4-BE49-F238E27FC236}">
-                <a16:creationId xmlns="" xmlns:a16="http://schemas.microsoft.com/office/drawing/2014/main" id="{A0AF2BCF-B7A9-4273-A036-65D48EC35AFB}"/>
+                <a16:creationId xmlns:a16="http://schemas.microsoft.com/office/drawing/2014/main" xmlns="" id="{A0AF2BCF-B7A9-4273-A036-65D48EC35AFB}"/>
               </a:ext>
             </a:extLst>
           </p:cNvPr>
@@ -767,7 +768,7 @@
           <p:cNvPr id="4" name="Дата 3">
             <a:extLst>
               <a:ext uri="{FF2B5EF4-FFF2-40B4-BE49-F238E27FC236}">
-                <a16:creationId xmlns="" xmlns:a16="http://schemas.microsoft.com/office/drawing/2014/main" id="{FD0D1C6D-69CF-457C-91C7-F377F3740FD7}"/>
+                <a16:creationId xmlns:a16="http://schemas.microsoft.com/office/drawing/2014/main" xmlns="" id="{FD0D1C6D-69CF-457C-91C7-F377F3740FD7}"/>
               </a:ext>
             </a:extLst>
           </p:cNvPr>
@@ -796,7 +797,7 @@
           <p:cNvPr id="5" name="Нижний колонтитул 4">
             <a:extLst>
               <a:ext uri="{FF2B5EF4-FFF2-40B4-BE49-F238E27FC236}">
-                <a16:creationId xmlns="" xmlns:a16="http://schemas.microsoft.com/office/drawing/2014/main" id="{B4E51A0A-6E5C-4D13-BEEB-CD5E87DE7A55}"/>
+                <a16:creationId xmlns:a16="http://schemas.microsoft.com/office/drawing/2014/main" xmlns="" id="{B4E51A0A-6E5C-4D13-BEEB-CD5E87DE7A55}"/>
               </a:ext>
             </a:extLst>
           </p:cNvPr>
@@ -821,7 +822,7 @@
           <p:cNvPr id="6" name="Номер слайда 5">
             <a:extLst>
               <a:ext uri="{FF2B5EF4-FFF2-40B4-BE49-F238E27FC236}">
-                <a16:creationId xmlns="" xmlns:a16="http://schemas.microsoft.com/office/drawing/2014/main" id="{DDBC26EC-1A2D-4432-9144-2DB20ABD8101}"/>
+                <a16:creationId xmlns:a16="http://schemas.microsoft.com/office/drawing/2014/main" xmlns="" id="{DDBC26EC-1A2D-4432-9144-2DB20ABD8101}"/>
               </a:ext>
             </a:extLst>
           </p:cNvPr>
@@ -880,7 +881,7 @@
           <p:cNvPr id="2" name="Заголовок 1">
             <a:extLst>
               <a:ext uri="{FF2B5EF4-FFF2-40B4-BE49-F238E27FC236}">
-                <a16:creationId xmlns="" xmlns:a16="http://schemas.microsoft.com/office/drawing/2014/main" id="{93F15F7B-3F3F-4BCF-A278-ED76E11675D5}"/>
+                <a16:creationId xmlns:a16="http://schemas.microsoft.com/office/drawing/2014/main" xmlns="" id="{93F15F7B-3F3F-4BCF-A278-ED76E11675D5}"/>
               </a:ext>
             </a:extLst>
           </p:cNvPr>
@@ -908,7 +909,7 @@
           <p:cNvPr id="3" name="Объект 2">
             <a:extLst>
               <a:ext uri="{FF2B5EF4-FFF2-40B4-BE49-F238E27FC236}">
-                <a16:creationId xmlns="" xmlns:a16="http://schemas.microsoft.com/office/drawing/2014/main" id="{53CE5BDC-C0F2-4C9D-82E4-E7AB75BD3541}"/>
+                <a16:creationId xmlns:a16="http://schemas.microsoft.com/office/drawing/2014/main" xmlns="" id="{53CE5BDC-C0F2-4C9D-82E4-E7AB75BD3541}"/>
               </a:ext>
             </a:extLst>
           </p:cNvPr>
@@ -965,7 +966,7 @@
           <p:cNvPr id="4" name="Дата 3">
             <a:extLst>
               <a:ext uri="{FF2B5EF4-FFF2-40B4-BE49-F238E27FC236}">
-                <a16:creationId xmlns="" xmlns:a16="http://schemas.microsoft.com/office/drawing/2014/main" id="{7A58E51C-CAC9-4ED0-A790-E5CFBAE9031B}"/>
+                <a16:creationId xmlns:a16="http://schemas.microsoft.com/office/drawing/2014/main" xmlns="" id="{7A58E51C-CAC9-4ED0-A790-E5CFBAE9031B}"/>
               </a:ext>
             </a:extLst>
           </p:cNvPr>
@@ -994,7 +995,7 @@
           <p:cNvPr id="5" name="Нижний колонтитул 4">
             <a:extLst>
               <a:ext uri="{FF2B5EF4-FFF2-40B4-BE49-F238E27FC236}">
-                <a16:creationId xmlns="" xmlns:a16="http://schemas.microsoft.com/office/drawing/2014/main" id="{ABB2258F-C224-4F1E-B5B7-B244967A5C26}"/>
+                <a16:creationId xmlns:a16="http://schemas.microsoft.com/office/drawing/2014/main" xmlns="" id="{ABB2258F-C224-4F1E-B5B7-B244967A5C26}"/>
               </a:ext>
             </a:extLst>
           </p:cNvPr>
@@ -1019,7 +1020,7 @@
           <p:cNvPr id="6" name="Номер слайда 5">
             <a:extLst>
               <a:ext uri="{FF2B5EF4-FFF2-40B4-BE49-F238E27FC236}">
-                <a16:creationId xmlns="" xmlns:a16="http://schemas.microsoft.com/office/drawing/2014/main" id="{5FC87BB2-F189-4F29-B9B4-B32305682BA5}"/>
+                <a16:creationId xmlns:a16="http://schemas.microsoft.com/office/drawing/2014/main" xmlns="" id="{5FC87BB2-F189-4F29-B9B4-B32305682BA5}"/>
               </a:ext>
             </a:extLst>
           </p:cNvPr>
@@ -1078,7 +1079,7 @@
           <p:cNvPr id="2" name="Заголовок 1">
             <a:extLst>
               <a:ext uri="{FF2B5EF4-FFF2-40B4-BE49-F238E27FC236}">
-                <a16:creationId xmlns="" xmlns:a16="http://schemas.microsoft.com/office/drawing/2014/main" id="{605F2F98-82CD-48E0-91F5-FB2E59327BB2}"/>
+                <a16:creationId xmlns:a16="http://schemas.microsoft.com/office/drawing/2014/main" xmlns="" id="{605F2F98-82CD-48E0-91F5-FB2E59327BB2}"/>
               </a:ext>
             </a:extLst>
           </p:cNvPr>
@@ -1115,7 +1116,7 @@
           <p:cNvPr id="3" name="Текст 2">
             <a:extLst>
               <a:ext uri="{FF2B5EF4-FFF2-40B4-BE49-F238E27FC236}">
-                <a16:creationId xmlns="" xmlns:a16="http://schemas.microsoft.com/office/drawing/2014/main" id="{E55186E3-53AF-41EA-B7C6-F3B318EEB171}"/>
+                <a16:creationId xmlns:a16="http://schemas.microsoft.com/office/drawing/2014/main" xmlns="" id="{E55186E3-53AF-41EA-B7C6-F3B318EEB171}"/>
               </a:ext>
             </a:extLst>
           </p:cNvPr>
@@ -1240,7 +1241,7 @@
           <p:cNvPr id="4" name="Дата 3">
             <a:extLst>
               <a:ext uri="{FF2B5EF4-FFF2-40B4-BE49-F238E27FC236}">
-                <a16:creationId xmlns="" xmlns:a16="http://schemas.microsoft.com/office/drawing/2014/main" id="{C1AE53D4-3C43-49FA-AFE5-6476242EC6CE}"/>
+                <a16:creationId xmlns:a16="http://schemas.microsoft.com/office/drawing/2014/main" xmlns="" id="{C1AE53D4-3C43-49FA-AFE5-6476242EC6CE}"/>
               </a:ext>
             </a:extLst>
           </p:cNvPr>
@@ -1269,7 +1270,7 @@
           <p:cNvPr id="5" name="Нижний колонтитул 4">
             <a:extLst>
               <a:ext uri="{FF2B5EF4-FFF2-40B4-BE49-F238E27FC236}">
-                <a16:creationId xmlns="" xmlns:a16="http://schemas.microsoft.com/office/drawing/2014/main" id="{60EF3BBF-03C5-4C17-A7F6-EB1491E05710}"/>
+                <a16:creationId xmlns:a16="http://schemas.microsoft.com/office/drawing/2014/main" xmlns="" id="{60EF3BBF-03C5-4C17-A7F6-EB1491E05710}"/>
               </a:ext>
             </a:extLst>
           </p:cNvPr>
@@ -1294,7 +1295,7 @@
           <p:cNvPr id="6" name="Номер слайда 5">
             <a:extLst>
               <a:ext uri="{FF2B5EF4-FFF2-40B4-BE49-F238E27FC236}">
-                <a16:creationId xmlns="" xmlns:a16="http://schemas.microsoft.com/office/drawing/2014/main" id="{EAEC8252-D4B1-4894-84A2-B847CCB52EF0}"/>
+                <a16:creationId xmlns:a16="http://schemas.microsoft.com/office/drawing/2014/main" xmlns="" id="{EAEC8252-D4B1-4894-84A2-B847CCB52EF0}"/>
               </a:ext>
             </a:extLst>
           </p:cNvPr>
@@ -1353,7 +1354,7 @@
           <p:cNvPr id="2" name="Заголовок 1">
             <a:extLst>
               <a:ext uri="{FF2B5EF4-FFF2-40B4-BE49-F238E27FC236}">
-                <a16:creationId xmlns="" xmlns:a16="http://schemas.microsoft.com/office/drawing/2014/main" id="{C72B89DD-3E56-47CD-B725-5D2A0E0FDC28}"/>
+                <a16:creationId xmlns:a16="http://schemas.microsoft.com/office/drawing/2014/main" xmlns="" id="{C72B89DD-3E56-47CD-B725-5D2A0E0FDC28}"/>
               </a:ext>
             </a:extLst>
           </p:cNvPr>
@@ -1381,7 +1382,7 @@
           <p:cNvPr id="3" name="Объект 2">
             <a:extLst>
               <a:ext uri="{FF2B5EF4-FFF2-40B4-BE49-F238E27FC236}">
-                <a16:creationId xmlns="" xmlns:a16="http://schemas.microsoft.com/office/drawing/2014/main" id="{8D41EF36-8F65-4CA6-927C-9F9183D9CD73}"/>
+                <a16:creationId xmlns:a16="http://schemas.microsoft.com/office/drawing/2014/main" xmlns="" id="{8D41EF36-8F65-4CA6-927C-9F9183D9CD73}"/>
               </a:ext>
             </a:extLst>
           </p:cNvPr>
@@ -1443,7 +1444,7 @@
           <p:cNvPr id="4" name="Объект 3">
             <a:extLst>
               <a:ext uri="{FF2B5EF4-FFF2-40B4-BE49-F238E27FC236}">
-                <a16:creationId xmlns="" xmlns:a16="http://schemas.microsoft.com/office/drawing/2014/main" id="{65226DF4-1E33-42A7-93CF-9A741ED18E47}"/>
+                <a16:creationId xmlns:a16="http://schemas.microsoft.com/office/drawing/2014/main" xmlns="" id="{65226DF4-1E33-42A7-93CF-9A741ED18E47}"/>
               </a:ext>
             </a:extLst>
           </p:cNvPr>
@@ -1505,7 +1506,7 @@
           <p:cNvPr id="5" name="Дата 4">
             <a:extLst>
               <a:ext uri="{FF2B5EF4-FFF2-40B4-BE49-F238E27FC236}">
-                <a16:creationId xmlns="" xmlns:a16="http://schemas.microsoft.com/office/drawing/2014/main" id="{C97AD1ED-0CE1-4EF1-A664-DE13C88D3431}"/>
+                <a16:creationId xmlns:a16="http://schemas.microsoft.com/office/drawing/2014/main" xmlns="" id="{C97AD1ED-0CE1-4EF1-A664-DE13C88D3431}"/>
               </a:ext>
             </a:extLst>
           </p:cNvPr>
@@ -1534,7 +1535,7 @@
           <p:cNvPr id="6" name="Нижний колонтитул 5">
             <a:extLst>
               <a:ext uri="{FF2B5EF4-FFF2-40B4-BE49-F238E27FC236}">
-                <a16:creationId xmlns="" xmlns:a16="http://schemas.microsoft.com/office/drawing/2014/main" id="{9FF64049-3E79-492C-ABC8-8EFF1B085B84}"/>
+                <a16:creationId xmlns:a16="http://schemas.microsoft.com/office/drawing/2014/main" xmlns="" id="{9FF64049-3E79-492C-ABC8-8EFF1B085B84}"/>
               </a:ext>
             </a:extLst>
           </p:cNvPr>
@@ -1559,7 +1560,7 @@
           <p:cNvPr id="7" name="Номер слайда 6">
             <a:extLst>
               <a:ext uri="{FF2B5EF4-FFF2-40B4-BE49-F238E27FC236}">
-                <a16:creationId xmlns="" xmlns:a16="http://schemas.microsoft.com/office/drawing/2014/main" id="{79AAC584-17C2-4586-9D08-DE1AC1A728EA}"/>
+                <a16:creationId xmlns:a16="http://schemas.microsoft.com/office/drawing/2014/main" xmlns="" id="{79AAC584-17C2-4586-9D08-DE1AC1A728EA}"/>
               </a:ext>
             </a:extLst>
           </p:cNvPr>
@@ -1618,7 +1619,7 @@
           <p:cNvPr id="2" name="Заголовок 1">
             <a:extLst>
               <a:ext uri="{FF2B5EF4-FFF2-40B4-BE49-F238E27FC236}">
-                <a16:creationId xmlns="" xmlns:a16="http://schemas.microsoft.com/office/drawing/2014/main" id="{60F3B848-A1D4-4358-83CB-A1B103239F59}"/>
+                <a16:creationId xmlns:a16="http://schemas.microsoft.com/office/drawing/2014/main" xmlns="" id="{60F3B848-A1D4-4358-83CB-A1B103239F59}"/>
               </a:ext>
             </a:extLst>
           </p:cNvPr>
@@ -1651,7 +1652,7 @@
           <p:cNvPr id="3" name="Текст 2">
             <a:extLst>
               <a:ext uri="{FF2B5EF4-FFF2-40B4-BE49-F238E27FC236}">
-                <a16:creationId xmlns="" xmlns:a16="http://schemas.microsoft.com/office/drawing/2014/main" id="{D943C380-2070-498E-8251-4B2B3B5C8BD9}"/>
+                <a16:creationId xmlns:a16="http://schemas.microsoft.com/office/drawing/2014/main" xmlns="" id="{D943C380-2070-498E-8251-4B2B3B5C8BD9}"/>
               </a:ext>
             </a:extLst>
           </p:cNvPr>
@@ -1722,7 +1723,7 @@
           <p:cNvPr id="4" name="Объект 3">
             <a:extLst>
               <a:ext uri="{FF2B5EF4-FFF2-40B4-BE49-F238E27FC236}">
-                <a16:creationId xmlns="" xmlns:a16="http://schemas.microsoft.com/office/drawing/2014/main" id="{0E92997B-E9B2-44AE-927B-59213AD34761}"/>
+                <a16:creationId xmlns:a16="http://schemas.microsoft.com/office/drawing/2014/main" xmlns="" id="{0E92997B-E9B2-44AE-927B-59213AD34761}"/>
               </a:ext>
             </a:extLst>
           </p:cNvPr>
@@ -1784,7 +1785,7 @@
           <p:cNvPr id="5" name="Текст 4">
             <a:extLst>
               <a:ext uri="{FF2B5EF4-FFF2-40B4-BE49-F238E27FC236}">
-                <a16:creationId xmlns="" xmlns:a16="http://schemas.microsoft.com/office/drawing/2014/main" id="{EB16FD49-C4B5-463C-B46D-98699F7C0E7C}"/>
+                <a16:creationId xmlns:a16="http://schemas.microsoft.com/office/drawing/2014/main" xmlns="" id="{EB16FD49-C4B5-463C-B46D-98699F7C0E7C}"/>
               </a:ext>
             </a:extLst>
           </p:cNvPr>
@@ -1855,7 +1856,7 @@
           <p:cNvPr id="6" name="Объект 5">
             <a:extLst>
               <a:ext uri="{FF2B5EF4-FFF2-40B4-BE49-F238E27FC236}">
-                <a16:creationId xmlns="" xmlns:a16="http://schemas.microsoft.com/office/drawing/2014/main" id="{B601820E-324C-4918-B7DA-3DF3B30D7177}"/>
+                <a16:creationId xmlns:a16="http://schemas.microsoft.com/office/drawing/2014/main" xmlns="" id="{B601820E-324C-4918-B7DA-3DF3B30D7177}"/>
               </a:ext>
             </a:extLst>
           </p:cNvPr>
@@ -1917,7 +1918,7 @@
           <p:cNvPr id="7" name="Дата 6">
             <a:extLst>
               <a:ext uri="{FF2B5EF4-FFF2-40B4-BE49-F238E27FC236}">
-                <a16:creationId xmlns="" xmlns:a16="http://schemas.microsoft.com/office/drawing/2014/main" id="{FEB7CCEF-1AF5-4D90-9D12-B2E18674841A}"/>
+                <a16:creationId xmlns:a16="http://schemas.microsoft.com/office/drawing/2014/main" xmlns="" id="{FEB7CCEF-1AF5-4D90-9D12-B2E18674841A}"/>
               </a:ext>
             </a:extLst>
           </p:cNvPr>
@@ -1946,7 +1947,7 @@
           <p:cNvPr id="8" name="Нижний колонтитул 7">
             <a:extLst>
               <a:ext uri="{FF2B5EF4-FFF2-40B4-BE49-F238E27FC236}">
-                <a16:creationId xmlns="" xmlns:a16="http://schemas.microsoft.com/office/drawing/2014/main" id="{DFE8EC3F-B291-4363-AE57-338C6D59AF0A}"/>
+                <a16:creationId xmlns:a16="http://schemas.microsoft.com/office/drawing/2014/main" xmlns="" id="{DFE8EC3F-B291-4363-AE57-338C6D59AF0A}"/>
               </a:ext>
             </a:extLst>
           </p:cNvPr>
@@ -1971,7 +1972,7 @@
           <p:cNvPr id="9" name="Номер слайда 8">
             <a:extLst>
               <a:ext uri="{FF2B5EF4-FFF2-40B4-BE49-F238E27FC236}">
-                <a16:creationId xmlns="" xmlns:a16="http://schemas.microsoft.com/office/drawing/2014/main" id="{8BD73EEC-A93E-4E71-BF4C-AE3C4F5ACC88}"/>
+                <a16:creationId xmlns:a16="http://schemas.microsoft.com/office/drawing/2014/main" xmlns="" id="{8BD73EEC-A93E-4E71-BF4C-AE3C4F5ACC88}"/>
               </a:ext>
             </a:extLst>
           </p:cNvPr>
@@ -2030,7 +2031,7 @@
           <p:cNvPr id="2" name="Заголовок 1">
             <a:extLst>
               <a:ext uri="{FF2B5EF4-FFF2-40B4-BE49-F238E27FC236}">
-                <a16:creationId xmlns="" xmlns:a16="http://schemas.microsoft.com/office/drawing/2014/main" id="{C77B30EC-2412-4D1D-8286-5C357C75B3C2}"/>
+                <a16:creationId xmlns:a16="http://schemas.microsoft.com/office/drawing/2014/main" xmlns="" id="{C77B30EC-2412-4D1D-8286-5C357C75B3C2}"/>
               </a:ext>
             </a:extLst>
           </p:cNvPr>
@@ -2058,7 +2059,7 @@
           <p:cNvPr id="3" name="Дата 2">
             <a:extLst>
               <a:ext uri="{FF2B5EF4-FFF2-40B4-BE49-F238E27FC236}">
-                <a16:creationId xmlns="" xmlns:a16="http://schemas.microsoft.com/office/drawing/2014/main" id="{5209749D-C3F2-4F8C-AF5C-DCA87E62658D}"/>
+                <a16:creationId xmlns:a16="http://schemas.microsoft.com/office/drawing/2014/main" xmlns="" id="{5209749D-C3F2-4F8C-AF5C-DCA87E62658D}"/>
               </a:ext>
             </a:extLst>
           </p:cNvPr>
@@ -2087,7 +2088,7 @@
           <p:cNvPr id="4" name="Нижний колонтитул 3">
             <a:extLst>
               <a:ext uri="{FF2B5EF4-FFF2-40B4-BE49-F238E27FC236}">
-                <a16:creationId xmlns="" xmlns:a16="http://schemas.microsoft.com/office/drawing/2014/main" id="{1655ECA3-E1A6-4FF5-A6B7-F4BBE99106A0}"/>
+                <a16:creationId xmlns:a16="http://schemas.microsoft.com/office/drawing/2014/main" xmlns="" id="{1655ECA3-E1A6-4FF5-A6B7-F4BBE99106A0}"/>
               </a:ext>
             </a:extLst>
           </p:cNvPr>
@@ -2112,7 +2113,7 @@
           <p:cNvPr id="5" name="Номер слайда 4">
             <a:extLst>
               <a:ext uri="{FF2B5EF4-FFF2-40B4-BE49-F238E27FC236}">
-                <a16:creationId xmlns="" xmlns:a16="http://schemas.microsoft.com/office/drawing/2014/main" id="{3E46AE6C-2A03-45EB-AFE6-228A3C6B0BB9}"/>
+                <a16:creationId xmlns:a16="http://schemas.microsoft.com/office/drawing/2014/main" xmlns="" id="{3E46AE6C-2A03-45EB-AFE6-228A3C6B0BB9}"/>
               </a:ext>
             </a:extLst>
           </p:cNvPr>
@@ -2171,7 +2172,7 @@
           <p:cNvPr id="2" name="Дата 1">
             <a:extLst>
               <a:ext uri="{FF2B5EF4-FFF2-40B4-BE49-F238E27FC236}">
-                <a16:creationId xmlns="" xmlns:a16="http://schemas.microsoft.com/office/drawing/2014/main" id="{6E363DB8-5BCD-4153-9B40-4FCAA572AB2B}"/>
+                <a16:creationId xmlns:a16="http://schemas.microsoft.com/office/drawing/2014/main" xmlns="" id="{6E363DB8-5BCD-4153-9B40-4FCAA572AB2B}"/>
               </a:ext>
             </a:extLst>
           </p:cNvPr>
@@ -2200,7 +2201,7 @@
           <p:cNvPr id="3" name="Нижний колонтитул 2">
             <a:extLst>
               <a:ext uri="{FF2B5EF4-FFF2-40B4-BE49-F238E27FC236}">
-                <a16:creationId xmlns="" xmlns:a16="http://schemas.microsoft.com/office/drawing/2014/main" id="{4D739E10-AADE-4AF8-9E1A-D612722DA840}"/>
+                <a16:creationId xmlns:a16="http://schemas.microsoft.com/office/drawing/2014/main" xmlns="" id="{4D739E10-AADE-4AF8-9E1A-D612722DA840}"/>
               </a:ext>
             </a:extLst>
           </p:cNvPr>
@@ -2225,7 +2226,7 @@
           <p:cNvPr id="4" name="Номер слайда 3">
             <a:extLst>
               <a:ext uri="{FF2B5EF4-FFF2-40B4-BE49-F238E27FC236}">
-                <a16:creationId xmlns="" xmlns:a16="http://schemas.microsoft.com/office/drawing/2014/main" id="{2025B663-821C-48E6-A1F8-DECB2638B0C4}"/>
+                <a16:creationId xmlns:a16="http://schemas.microsoft.com/office/drawing/2014/main" xmlns="" id="{2025B663-821C-48E6-A1F8-DECB2638B0C4}"/>
               </a:ext>
             </a:extLst>
           </p:cNvPr>
@@ -2284,7 +2285,7 @@
           <p:cNvPr id="2" name="Заголовок 1">
             <a:extLst>
               <a:ext uri="{FF2B5EF4-FFF2-40B4-BE49-F238E27FC236}">
-                <a16:creationId xmlns="" xmlns:a16="http://schemas.microsoft.com/office/drawing/2014/main" id="{C496CA23-5C0B-4DB7-93CE-09DBCFEFF8C6}"/>
+                <a16:creationId xmlns:a16="http://schemas.microsoft.com/office/drawing/2014/main" xmlns="" id="{C496CA23-5C0B-4DB7-93CE-09DBCFEFF8C6}"/>
               </a:ext>
             </a:extLst>
           </p:cNvPr>
@@ -2321,7 +2322,7 @@
           <p:cNvPr id="3" name="Объект 2">
             <a:extLst>
               <a:ext uri="{FF2B5EF4-FFF2-40B4-BE49-F238E27FC236}">
-                <a16:creationId xmlns="" xmlns:a16="http://schemas.microsoft.com/office/drawing/2014/main" id="{8FEE7C9E-835C-4E23-B7DB-CA75F982714C}"/>
+                <a16:creationId xmlns:a16="http://schemas.microsoft.com/office/drawing/2014/main" xmlns="" id="{8FEE7C9E-835C-4E23-B7DB-CA75F982714C}"/>
               </a:ext>
             </a:extLst>
           </p:cNvPr>
@@ -2411,7 +2412,7 @@
           <p:cNvPr id="4" name="Текст 3">
             <a:extLst>
               <a:ext uri="{FF2B5EF4-FFF2-40B4-BE49-F238E27FC236}">
-                <a16:creationId xmlns="" xmlns:a16="http://schemas.microsoft.com/office/drawing/2014/main" id="{D2090EC4-F236-422B-B756-70947A0143B2}"/>
+                <a16:creationId xmlns:a16="http://schemas.microsoft.com/office/drawing/2014/main" xmlns="" id="{D2090EC4-F236-422B-B756-70947A0143B2}"/>
               </a:ext>
             </a:extLst>
           </p:cNvPr>
@@ -2482,7 +2483,7 @@
           <p:cNvPr id="5" name="Дата 4">
             <a:extLst>
               <a:ext uri="{FF2B5EF4-FFF2-40B4-BE49-F238E27FC236}">
-                <a16:creationId xmlns="" xmlns:a16="http://schemas.microsoft.com/office/drawing/2014/main" id="{87A6C6C3-4A84-49AD-B57A-42BF80AC498A}"/>
+                <a16:creationId xmlns:a16="http://schemas.microsoft.com/office/drawing/2014/main" xmlns="" id="{87A6C6C3-4A84-49AD-B57A-42BF80AC498A}"/>
               </a:ext>
             </a:extLst>
           </p:cNvPr>
@@ -2511,7 +2512,7 @@
           <p:cNvPr id="6" name="Нижний колонтитул 5">
             <a:extLst>
               <a:ext uri="{FF2B5EF4-FFF2-40B4-BE49-F238E27FC236}">
-                <a16:creationId xmlns="" xmlns:a16="http://schemas.microsoft.com/office/drawing/2014/main" id="{C99DBF37-9553-454F-9B96-227B620EF42A}"/>
+                <a16:creationId xmlns:a16="http://schemas.microsoft.com/office/drawing/2014/main" xmlns="" id="{C99DBF37-9553-454F-9B96-227B620EF42A}"/>
               </a:ext>
             </a:extLst>
           </p:cNvPr>
@@ -2536,7 +2537,7 @@
           <p:cNvPr id="7" name="Номер слайда 6">
             <a:extLst>
               <a:ext uri="{FF2B5EF4-FFF2-40B4-BE49-F238E27FC236}">
-                <a16:creationId xmlns="" xmlns:a16="http://schemas.microsoft.com/office/drawing/2014/main" id="{0C384B9A-D64A-48B9-8262-42F6DDDFCE51}"/>
+                <a16:creationId xmlns:a16="http://schemas.microsoft.com/office/drawing/2014/main" xmlns="" id="{0C384B9A-D64A-48B9-8262-42F6DDDFCE51}"/>
               </a:ext>
             </a:extLst>
           </p:cNvPr>
@@ -2595,7 +2596,7 @@
           <p:cNvPr id="2" name="Заголовок 1">
             <a:extLst>
               <a:ext uri="{FF2B5EF4-FFF2-40B4-BE49-F238E27FC236}">
-                <a16:creationId xmlns="" xmlns:a16="http://schemas.microsoft.com/office/drawing/2014/main" id="{BECF3BA1-3282-407F-ADED-A57BE3CCA5BC}"/>
+                <a16:creationId xmlns:a16="http://schemas.microsoft.com/office/drawing/2014/main" xmlns="" id="{BECF3BA1-3282-407F-ADED-A57BE3CCA5BC}"/>
               </a:ext>
             </a:extLst>
           </p:cNvPr>
@@ -2632,7 +2633,7 @@
           <p:cNvPr id="3" name="Рисунок 2">
             <a:extLst>
               <a:ext uri="{FF2B5EF4-FFF2-40B4-BE49-F238E27FC236}">
-                <a16:creationId xmlns="" xmlns:a16="http://schemas.microsoft.com/office/drawing/2014/main" id="{9223AFF8-24A3-40A0-9F7C-3CCEBEFA54BB}"/>
+                <a16:creationId xmlns:a16="http://schemas.microsoft.com/office/drawing/2014/main" xmlns="" id="{9223AFF8-24A3-40A0-9F7C-3CCEBEFA54BB}"/>
               </a:ext>
             </a:extLst>
           </p:cNvPr>
@@ -2699,7 +2700,7 @@
           <p:cNvPr id="4" name="Текст 3">
             <a:extLst>
               <a:ext uri="{FF2B5EF4-FFF2-40B4-BE49-F238E27FC236}">
-                <a16:creationId xmlns="" xmlns:a16="http://schemas.microsoft.com/office/drawing/2014/main" id="{A394EA3E-EE40-4D29-8579-6302D65A891D}"/>
+                <a16:creationId xmlns:a16="http://schemas.microsoft.com/office/drawing/2014/main" xmlns="" id="{A394EA3E-EE40-4D29-8579-6302D65A891D}"/>
               </a:ext>
             </a:extLst>
           </p:cNvPr>
@@ -2770,7 +2771,7 @@
           <p:cNvPr id="5" name="Дата 4">
             <a:extLst>
               <a:ext uri="{FF2B5EF4-FFF2-40B4-BE49-F238E27FC236}">
-                <a16:creationId xmlns="" xmlns:a16="http://schemas.microsoft.com/office/drawing/2014/main" id="{5D6511DC-062C-44C6-8B25-23F0F85577C5}"/>
+                <a16:creationId xmlns:a16="http://schemas.microsoft.com/office/drawing/2014/main" xmlns="" id="{5D6511DC-062C-44C6-8B25-23F0F85577C5}"/>
               </a:ext>
             </a:extLst>
           </p:cNvPr>
@@ -2799,7 +2800,7 @@
           <p:cNvPr id="6" name="Нижний колонтитул 5">
             <a:extLst>
               <a:ext uri="{FF2B5EF4-FFF2-40B4-BE49-F238E27FC236}">
-                <a16:creationId xmlns="" xmlns:a16="http://schemas.microsoft.com/office/drawing/2014/main" id="{DB11BAAA-EB73-4CE7-AA10-385DABFF51A6}"/>
+                <a16:creationId xmlns:a16="http://schemas.microsoft.com/office/drawing/2014/main" xmlns="" id="{DB11BAAA-EB73-4CE7-AA10-385DABFF51A6}"/>
               </a:ext>
             </a:extLst>
           </p:cNvPr>
@@ -2824,7 +2825,7 @@
           <p:cNvPr id="7" name="Номер слайда 6">
             <a:extLst>
               <a:ext uri="{FF2B5EF4-FFF2-40B4-BE49-F238E27FC236}">
-                <a16:creationId xmlns="" xmlns:a16="http://schemas.microsoft.com/office/drawing/2014/main" id="{D1F3A019-7F16-45C5-A3DA-059AD954CAAA}"/>
+                <a16:creationId xmlns:a16="http://schemas.microsoft.com/office/drawing/2014/main" xmlns="" id="{D1F3A019-7F16-45C5-A3DA-059AD954CAAA}"/>
               </a:ext>
             </a:extLst>
           </p:cNvPr>
@@ -2888,7 +2889,7 @@
           <p:cNvPr id="2" name="Заголовок 1">
             <a:extLst>
               <a:ext uri="{FF2B5EF4-FFF2-40B4-BE49-F238E27FC236}">
-                <a16:creationId xmlns="" xmlns:a16="http://schemas.microsoft.com/office/drawing/2014/main" id="{CE3D1D10-30B1-4069-817F-B25A94DDC133}"/>
+                <a16:creationId xmlns:a16="http://schemas.microsoft.com/office/drawing/2014/main" xmlns="" id="{CE3D1D10-30B1-4069-817F-B25A94DDC133}"/>
               </a:ext>
             </a:extLst>
           </p:cNvPr>
@@ -2926,7 +2927,7 @@
           <p:cNvPr id="3" name="Текст 2">
             <a:extLst>
               <a:ext uri="{FF2B5EF4-FFF2-40B4-BE49-F238E27FC236}">
-                <a16:creationId xmlns="" xmlns:a16="http://schemas.microsoft.com/office/drawing/2014/main" id="{90823816-92D9-43AF-A567-9DD33448866B}"/>
+                <a16:creationId xmlns:a16="http://schemas.microsoft.com/office/drawing/2014/main" xmlns="" id="{90823816-92D9-43AF-A567-9DD33448866B}"/>
               </a:ext>
             </a:extLst>
           </p:cNvPr>
@@ -2993,7 +2994,7 @@
           <p:cNvPr id="4" name="Дата 3">
             <a:extLst>
               <a:ext uri="{FF2B5EF4-FFF2-40B4-BE49-F238E27FC236}">
-                <a16:creationId xmlns="" xmlns:a16="http://schemas.microsoft.com/office/drawing/2014/main" id="{5908663A-FB0E-4F9B-9027-8DE45EAA9013}"/>
+                <a16:creationId xmlns:a16="http://schemas.microsoft.com/office/drawing/2014/main" xmlns="" id="{5908663A-FB0E-4F9B-9027-8DE45EAA9013}"/>
               </a:ext>
             </a:extLst>
           </p:cNvPr>
@@ -3040,7 +3041,7 @@
           <p:cNvPr id="5" name="Нижний колонтитул 4">
             <a:extLst>
               <a:ext uri="{FF2B5EF4-FFF2-40B4-BE49-F238E27FC236}">
-                <a16:creationId xmlns="" xmlns:a16="http://schemas.microsoft.com/office/drawing/2014/main" id="{BDAF1F9F-A56A-46C2-AF2B-1727A4B730B3}"/>
+                <a16:creationId xmlns:a16="http://schemas.microsoft.com/office/drawing/2014/main" xmlns="" id="{BDAF1F9F-A56A-46C2-AF2B-1727A4B730B3}"/>
               </a:ext>
             </a:extLst>
           </p:cNvPr>
@@ -3083,7 +3084,7 @@
           <p:cNvPr id="6" name="Номер слайда 5">
             <a:extLst>
               <a:ext uri="{FF2B5EF4-FFF2-40B4-BE49-F238E27FC236}">
-                <a16:creationId xmlns="" xmlns:a16="http://schemas.microsoft.com/office/drawing/2014/main" id="{0C1D5F58-978A-4A4C-A8B7-25F1A545A3DA}"/>
+                <a16:creationId xmlns:a16="http://schemas.microsoft.com/office/drawing/2014/main" xmlns="" id="{0C1D5F58-978A-4A4C-A8B7-25F1A545A3DA}"/>
               </a:ext>
             </a:extLst>
           </p:cNvPr>
@@ -3451,7 +3452,7 @@
           <p:cNvPr id="2" name="Заголовок 1">
             <a:extLst>
               <a:ext uri="{FF2B5EF4-FFF2-40B4-BE49-F238E27FC236}">
-                <a16:creationId xmlns="" xmlns:a16="http://schemas.microsoft.com/office/drawing/2014/main" id="{A57E77A9-FC28-40B1-9404-503D58E5E643}"/>
+                <a16:creationId xmlns:a16="http://schemas.microsoft.com/office/drawing/2014/main" xmlns="" id="{A57E77A9-FC28-40B1-9404-503D58E5E643}"/>
               </a:ext>
             </a:extLst>
           </p:cNvPr>
@@ -3469,21 +3470,18 @@
           <a:p>
             <a:r>
               <a:rPr lang="ru-RU" dirty="0">
-                <a:latin typeface="Times New Roman" panose="02020603050405020304" pitchFamily="18" charset="0"/>
                 <a:cs typeface="Times New Roman" panose="02020603050405020304" pitchFamily="18" charset="0"/>
               </a:rPr>
               <a:t>Семестровый проект «</a:t>
             </a:r>
             <a:r>
               <a:rPr lang="en-US" dirty="0">
-                <a:latin typeface="Times New Roman" panose="02020603050405020304" pitchFamily="18" charset="0"/>
                 <a:cs typeface="Times New Roman" panose="02020603050405020304" pitchFamily="18" charset="0"/>
               </a:rPr>
               <a:t>REAL.NET</a:t>
             </a:r>
             <a:r>
               <a:rPr lang="ru-RU" dirty="0">
-                <a:latin typeface="Times New Roman" panose="02020603050405020304" pitchFamily="18" charset="0"/>
                 <a:cs typeface="Times New Roman" panose="02020603050405020304" pitchFamily="18" charset="0"/>
               </a:rPr>
               <a:t>»</a:t>
@@ -3496,7 +3494,7 @@
           <p:cNvPr id="3" name="Подзаголовок 2">
             <a:extLst>
               <a:ext uri="{FF2B5EF4-FFF2-40B4-BE49-F238E27FC236}">
-                <a16:creationId xmlns="" xmlns:a16="http://schemas.microsoft.com/office/drawing/2014/main" id="{B4D9919D-3207-4D55-B6F1-407A692B7645}"/>
+                <a16:creationId xmlns:a16="http://schemas.microsoft.com/office/drawing/2014/main" xmlns="" id="{B4D9919D-3207-4D55-B6F1-407A692B7645}"/>
               </a:ext>
             </a:extLst>
           </p:cNvPr>
@@ -3520,14 +3518,12 @@
             <a:pPr algn="r"/>
             <a:r>
               <a:rPr lang="ru-RU" dirty="0" err="1">
-                <a:latin typeface="Times New Roman" panose="02020603050405020304" pitchFamily="18" charset="0"/>
                 <a:cs typeface="Times New Roman" panose="02020603050405020304" pitchFamily="18" charset="0"/>
               </a:rPr>
               <a:t>Зайнуллин</a:t>
             </a:r>
             <a:r>
               <a:rPr lang="ru-RU" dirty="0">
-                <a:latin typeface="Times New Roman" panose="02020603050405020304" pitchFamily="18" charset="0"/>
                 <a:cs typeface="Times New Roman" panose="02020603050405020304" pitchFamily="18" charset="0"/>
               </a:rPr>
               <a:t> Егор, 244 группа</a:t>
@@ -3537,14 +3533,12 @@
             <a:pPr algn="r"/>
             <a:r>
               <a:rPr lang="ru-RU" dirty="0" err="1">
-                <a:latin typeface="Times New Roman" panose="02020603050405020304" pitchFamily="18" charset="0"/>
                 <a:cs typeface="Times New Roman" panose="02020603050405020304" pitchFamily="18" charset="0"/>
               </a:rPr>
               <a:t>Сушенцев</a:t>
             </a:r>
             <a:r>
               <a:rPr lang="ru-RU" dirty="0">
-                <a:latin typeface="Times New Roman" panose="02020603050405020304" pitchFamily="18" charset="0"/>
                 <a:cs typeface="Times New Roman" panose="02020603050405020304" pitchFamily="18" charset="0"/>
               </a:rPr>
               <a:t> Денис, 244 группа</a:t>
@@ -3554,14 +3548,12 @@
             <a:pPr algn="r"/>
             <a:r>
               <a:rPr lang="ru-RU" dirty="0" err="1">
-                <a:latin typeface="Times New Roman" panose="02020603050405020304" pitchFamily="18" charset="0"/>
                 <a:cs typeface="Times New Roman" panose="02020603050405020304" pitchFamily="18" charset="0"/>
               </a:rPr>
               <a:t>Кижнеров</a:t>
             </a:r>
             <a:r>
               <a:rPr lang="ru-RU" dirty="0">
-                <a:latin typeface="Times New Roman" panose="02020603050405020304" pitchFamily="18" charset="0"/>
                 <a:cs typeface="Times New Roman" panose="02020603050405020304" pitchFamily="18" charset="0"/>
               </a:rPr>
               <a:t> Павел, 242 группа</a:t>
@@ -3604,7 +3596,7 @@
           <p:cNvPr id="2" name="Заголовок 1">
             <a:extLst>
               <a:ext uri="{FF2B5EF4-FFF2-40B4-BE49-F238E27FC236}">
-                <a16:creationId xmlns="" xmlns:a16="http://schemas.microsoft.com/office/drawing/2014/main" id="{3883AE69-0FC9-4A70-8484-BDEBA005C983}"/>
+                <a16:creationId xmlns:a16="http://schemas.microsoft.com/office/drawing/2014/main" xmlns="" id="{3883AE69-0FC9-4A70-8484-BDEBA005C983}"/>
               </a:ext>
             </a:extLst>
           </p:cNvPr>
@@ -3625,7 +3617,6 @@
             <a:pPr algn="ctr"/>
             <a:r>
               <a:rPr lang="ru-RU" sz="5400" dirty="0">
-                <a:latin typeface="Times New Roman" panose="02020603050405020304" pitchFamily="18" charset="0"/>
                 <a:cs typeface="Times New Roman" panose="02020603050405020304" pitchFamily="18" charset="0"/>
               </a:rPr>
               <a:t>Цели</a:t>
@@ -3638,7 +3629,7 @@
           <p:cNvPr id="3" name="Объект 2">
             <a:extLst>
               <a:ext uri="{FF2B5EF4-FFF2-40B4-BE49-F238E27FC236}">
-                <a16:creationId xmlns="" xmlns:a16="http://schemas.microsoft.com/office/drawing/2014/main" id="{F9D58FBF-75CE-415D-A979-FFA765EB5B4A}"/>
+                <a16:creationId xmlns:a16="http://schemas.microsoft.com/office/drawing/2014/main" xmlns="" id="{F9D58FBF-75CE-415D-A979-FFA765EB5B4A}"/>
               </a:ext>
             </a:extLst>
           </p:cNvPr>
@@ -3658,7 +3649,6 @@
           <a:p>
             <a:r>
               <a:rPr lang="ru-RU" dirty="0">
-                <a:latin typeface="Times New Roman" panose="02020603050405020304" pitchFamily="18" charset="0"/>
                 <a:cs typeface="Times New Roman" panose="02020603050405020304" pitchFamily="18" charset="0"/>
               </a:rPr>
               <a:t>Реализация инструмента для быстрого создания визуальных языков</a:t>
@@ -3667,34 +3657,29 @@
           <a:p>
             <a:r>
               <a:rPr lang="ru-RU" dirty="0">
-                <a:latin typeface="Times New Roman" panose="02020603050405020304" pitchFamily="18" charset="0"/>
                 <a:cs typeface="Times New Roman" panose="02020603050405020304" pitchFamily="18" charset="0"/>
               </a:rPr>
               <a:t>Осуществление идей технологии </a:t>
             </a:r>
             <a:r>
               <a:rPr lang="en-US" dirty="0" err="1">
-                <a:latin typeface="Times New Roman" panose="02020603050405020304" pitchFamily="18" charset="0"/>
                 <a:cs typeface="Times New Roman" panose="02020603050405020304" pitchFamily="18" charset="0"/>
               </a:rPr>
               <a:t>QReal</a:t>
             </a:r>
             <a:r>
               <a:rPr lang="ru-RU" dirty="0">
-                <a:latin typeface="Times New Roman" panose="02020603050405020304" pitchFamily="18" charset="0"/>
                 <a:cs typeface="Times New Roman" panose="02020603050405020304" pitchFamily="18" charset="0"/>
               </a:rPr>
               <a:t> на платформе </a:t>
             </a:r>
             <a:r>
               <a:rPr lang="en-US" dirty="0">
-                <a:latin typeface="Times New Roman" panose="02020603050405020304" pitchFamily="18" charset="0"/>
                 <a:cs typeface="Times New Roman" panose="02020603050405020304" pitchFamily="18" charset="0"/>
               </a:rPr>
               <a:t>.NET</a:t>
             </a:r>
             <a:endParaRPr lang="ru-RU" dirty="0">
-              <a:latin typeface="Times New Roman" panose="02020603050405020304" pitchFamily="18" charset="0"/>
               <a:cs typeface="Times New Roman" panose="02020603050405020304" pitchFamily="18" charset="0"/>
             </a:endParaRPr>
           </a:p>
@@ -3744,7 +3729,7 @@
           <p:cNvPr id="2" name="Заголовок 1">
             <a:extLst>
               <a:ext uri="{FF2B5EF4-FFF2-40B4-BE49-F238E27FC236}">
-                <a16:creationId xmlns="" xmlns:a16="http://schemas.microsoft.com/office/drawing/2014/main" id="{5FEE7F63-D9D3-407F-8E4F-7E446C1F196D}"/>
+                <a16:creationId xmlns:a16="http://schemas.microsoft.com/office/drawing/2014/main" xmlns="" id="{5FEE7F63-D9D3-407F-8E4F-7E446C1F196D}"/>
               </a:ext>
             </a:extLst>
           </p:cNvPr>
@@ -3765,7 +3750,6 @@
             <a:pPr algn="ctr"/>
             <a:r>
               <a:rPr lang="ru-RU" sz="5400" dirty="0">
-                <a:latin typeface="Times New Roman" panose="02020603050405020304" pitchFamily="18" charset="0"/>
                 <a:cs typeface="Times New Roman" panose="02020603050405020304" pitchFamily="18" charset="0"/>
               </a:rPr>
               <a:t>Основные задачи</a:t>
@@ -3778,7 +3762,7 @@
           <p:cNvPr id="3" name="Объект 2">
             <a:extLst>
               <a:ext uri="{FF2B5EF4-FFF2-40B4-BE49-F238E27FC236}">
-                <a16:creationId xmlns="" xmlns:a16="http://schemas.microsoft.com/office/drawing/2014/main" id="{EDB8B475-7563-474C-BC26-1A5A0ECA4B3D}"/>
+                <a16:creationId xmlns:a16="http://schemas.microsoft.com/office/drawing/2014/main" xmlns="" id="{EDB8B475-7563-474C-BC26-1A5A0ECA4B3D}"/>
               </a:ext>
             </a:extLst>
           </p:cNvPr>
@@ -3798,27 +3782,23 @@
           <a:p>
             <a:r>
               <a:rPr lang="ru-RU" dirty="0">
-                <a:latin typeface="Times New Roman" panose="02020603050405020304" pitchFamily="18" charset="0"/>
                 <a:cs typeface="Times New Roman" panose="02020603050405020304" pitchFamily="18" charset="0"/>
               </a:rPr>
               <a:t>Реализация графического редактора и его составляющих с помощью технологии </a:t>
             </a:r>
             <a:r>
               <a:rPr lang="en-US" dirty="0">
-                <a:latin typeface="Times New Roman" panose="02020603050405020304" pitchFamily="18" charset="0"/>
                 <a:cs typeface="Times New Roman" panose="02020603050405020304" pitchFamily="18" charset="0"/>
               </a:rPr>
               <a:t>WPF</a:t>
             </a:r>
             <a:endParaRPr lang="ru-RU" dirty="0">
-              <a:latin typeface="Times New Roman" panose="02020603050405020304" pitchFamily="18" charset="0"/>
               <a:cs typeface="Times New Roman" panose="02020603050405020304" pitchFamily="18" charset="0"/>
             </a:endParaRPr>
           </a:p>
           <a:p>
             <a:r>
               <a:rPr lang="ru-RU" dirty="0">
-                <a:latin typeface="Times New Roman" panose="02020603050405020304" pitchFamily="18" charset="0"/>
                 <a:cs typeface="Times New Roman" panose="02020603050405020304" pitchFamily="18" charset="0"/>
               </a:rPr>
               <a:t>Поддержка расширения функциональности приложения путем добавления плагинов</a:t>
@@ -3827,14 +3807,12 @@
           <a:p>
             <a:r>
               <a:rPr lang="ru-RU" dirty="0">
-                <a:latin typeface="Times New Roman" panose="02020603050405020304" pitchFamily="18" charset="0"/>
                 <a:cs typeface="Times New Roman" panose="02020603050405020304" pitchFamily="18" charset="0"/>
               </a:rPr>
               <a:t>Реализация редактируемых свойств </a:t>
             </a:r>
             <a:r>
               <a:rPr lang="ru-RU" dirty="0" smtClean="0">
-                <a:latin typeface="Times New Roman" panose="02020603050405020304" pitchFamily="18" charset="0"/>
                 <a:cs typeface="Times New Roman" panose="02020603050405020304" pitchFamily="18" charset="0"/>
               </a:rPr>
               <a:t>блоков</a:t>
@@ -3843,33 +3821,28 @@
           <a:p>
             <a:r>
               <a:rPr lang="ru-RU" dirty="0" smtClean="0">
-                <a:latin typeface="Times New Roman" panose="02020603050405020304" pitchFamily="18" charset="0"/>
                 <a:cs typeface="Times New Roman" panose="02020603050405020304" pitchFamily="18" charset="0"/>
               </a:rPr>
               <a:t>Создание объектов на палитре с помощью </a:t>
             </a:r>
             <a:r>
               <a:rPr lang="en-US" dirty="0" smtClean="0">
-                <a:latin typeface="Times New Roman" panose="02020603050405020304" pitchFamily="18" charset="0"/>
                 <a:cs typeface="Times New Roman" panose="02020603050405020304" pitchFamily="18" charset="0"/>
               </a:rPr>
               <a:t>drag-n-drop’</a:t>
             </a:r>
             <a:r>
               <a:rPr lang="ru-RU" dirty="0" smtClean="0">
-                <a:latin typeface="Times New Roman" panose="02020603050405020304" pitchFamily="18" charset="0"/>
                 <a:cs typeface="Times New Roman" panose="02020603050405020304" pitchFamily="18" charset="0"/>
               </a:rPr>
               <a:t>а</a:t>
             </a:r>
             <a:endParaRPr lang="en-US" dirty="0" smtClean="0">
-              <a:latin typeface="Times New Roman" panose="02020603050405020304" pitchFamily="18" charset="0"/>
               <a:cs typeface="Times New Roman" panose="02020603050405020304" pitchFamily="18" charset="0"/>
             </a:endParaRPr>
           </a:p>
           <a:p>
             <a:endParaRPr lang="ru-RU" dirty="0">
-              <a:latin typeface="Times New Roman" panose="02020603050405020304" pitchFamily="18" charset="0"/>
               <a:cs typeface="Times New Roman" panose="02020603050405020304" pitchFamily="18" charset="0"/>
             </a:endParaRPr>
           </a:p>
@@ -3913,7 +3886,7 @@
           <p:cNvPr id="2" name="Заголовок 1">
             <a:extLst>
               <a:ext uri="{FF2B5EF4-FFF2-40B4-BE49-F238E27FC236}">
-                <a16:creationId xmlns="" xmlns:a16="http://schemas.microsoft.com/office/drawing/2014/main" id="{E19E78BF-FD8D-447D-B0EF-E4CF3C5D31B2}"/>
+                <a16:creationId xmlns:a16="http://schemas.microsoft.com/office/drawing/2014/main" xmlns="" id="{E19E78BF-FD8D-447D-B0EF-E4CF3C5D31B2}"/>
               </a:ext>
             </a:extLst>
           </p:cNvPr>
@@ -3934,7 +3907,6 @@
             <a:pPr algn="ctr"/>
             <a:r>
               <a:rPr lang="ru-RU" sz="5400" dirty="0">
-                <a:latin typeface="Times New Roman" panose="02020603050405020304" pitchFamily="18" charset="0"/>
                 <a:cs typeface="Times New Roman" panose="02020603050405020304" pitchFamily="18" charset="0"/>
               </a:rPr>
               <a:t>Некоторые детали реализации</a:t>
@@ -3947,7 +3919,7 @@
           <p:cNvPr id="3" name="Объект 2">
             <a:extLst>
               <a:ext uri="{FF2B5EF4-FFF2-40B4-BE49-F238E27FC236}">
-                <a16:creationId xmlns="" xmlns:a16="http://schemas.microsoft.com/office/drawing/2014/main" id="{0CBA654F-1437-40F1-9D51-363851E0425C}"/>
+                <a16:creationId xmlns:a16="http://schemas.microsoft.com/office/drawing/2014/main" xmlns="" id="{0CBA654F-1437-40F1-9D51-363851E0425C}"/>
               </a:ext>
             </a:extLst>
           </p:cNvPr>
@@ -3967,49 +3939,42 @@
           <a:p>
             <a:r>
               <a:rPr lang="ru-RU" dirty="0">
-                <a:latin typeface="Times New Roman" panose="02020603050405020304" pitchFamily="18" charset="0"/>
                 <a:cs typeface="Times New Roman" panose="02020603050405020304" pitchFamily="18" charset="0"/>
               </a:rPr>
               <a:t>Использование языков </a:t>
             </a:r>
             <a:r>
               <a:rPr lang="en-US" dirty="0">
-                <a:latin typeface="Times New Roman" panose="02020603050405020304" pitchFamily="18" charset="0"/>
                 <a:cs typeface="Times New Roman" panose="02020603050405020304" pitchFamily="18" charset="0"/>
               </a:rPr>
               <a:t>.NET</a:t>
             </a:r>
             <a:r>
               <a:rPr lang="ru-RU" dirty="0">
-                <a:latin typeface="Times New Roman" panose="02020603050405020304" pitchFamily="18" charset="0"/>
                 <a:cs typeface="Times New Roman" panose="02020603050405020304" pitchFamily="18" charset="0"/>
               </a:rPr>
               <a:t> (</a:t>
             </a:r>
             <a:r>
               <a:rPr lang="en-US" dirty="0">
-                <a:latin typeface="Times New Roman" panose="02020603050405020304" pitchFamily="18" charset="0"/>
                 <a:cs typeface="Times New Roman" panose="02020603050405020304" pitchFamily="18" charset="0"/>
               </a:rPr>
               <a:t>C#  </a:t>
             </a:r>
             <a:r>
               <a:rPr lang="ru-RU" dirty="0">
-                <a:latin typeface="Times New Roman" panose="02020603050405020304" pitchFamily="18" charset="0"/>
                 <a:cs typeface="Times New Roman" panose="02020603050405020304" pitchFamily="18" charset="0"/>
               </a:rPr>
               <a:t>и </a:t>
             </a:r>
             <a:r>
               <a:rPr lang="en-US" dirty="0">
-                <a:latin typeface="Times New Roman" panose="02020603050405020304" pitchFamily="18" charset="0"/>
                 <a:cs typeface="Times New Roman" panose="02020603050405020304" pitchFamily="18" charset="0"/>
               </a:rPr>
               <a:t>F#</a:t>
             </a:r>
             <a:r>
               <a:rPr lang="ru-RU" dirty="0">
-                <a:latin typeface="Times New Roman" panose="02020603050405020304" pitchFamily="18" charset="0"/>
                 <a:cs typeface="Times New Roman" panose="02020603050405020304" pitchFamily="18" charset="0"/>
               </a:rPr>
               <a:t>)</a:t>
@@ -4018,62 +3983,53 @@
           <a:p>
             <a:r>
               <a:rPr lang="ru-RU" dirty="0">
-                <a:latin typeface="Times New Roman" panose="02020603050405020304" pitchFamily="18" charset="0"/>
                 <a:cs typeface="Times New Roman" panose="02020603050405020304" pitchFamily="18" charset="0"/>
               </a:rPr>
               <a:t>Применение</a:t>
             </a:r>
             <a:r>
               <a:rPr lang="en-US" dirty="0">
-                <a:latin typeface="Times New Roman" panose="02020603050405020304" pitchFamily="18" charset="0"/>
                 <a:cs typeface="Times New Roman" panose="02020603050405020304" pitchFamily="18" charset="0"/>
               </a:rPr>
               <a:t> </a:t>
             </a:r>
             <a:r>
               <a:rPr lang="ru-RU" dirty="0">
-                <a:latin typeface="Times New Roman" panose="02020603050405020304" pitchFamily="18" charset="0"/>
                 <a:cs typeface="Times New Roman" panose="02020603050405020304" pitchFamily="18" charset="0"/>
               </a:rPr>
               <a:t>технологии</a:t>
             </a:r>
             <a:r>
               <a:rPr lang="en-US" dirty="0">
-                <a:latin typeface="Times New Roman" panose="02020603050405020304" pitchFamily="18" charset="0"/>
                 <a:cs typeface="Times New Roman" panose="02020603050405020304" pitchFamily="18" charset="0"/>
               </a:rPr>
               <a:t> WPF</a:t>
             </a:r>
             <a:endParaRPr lang="ru-RU" dirty="0">
-              <a:latin typeface="Times New Roman" panose="02020603050405020304" pitchFamily="18" charset="0"/>
               <a:cs typeface="Times New Roman" panose="02020603050405020304" pitchFamily="18" charset="0"/>
             </a:endParaRPr>
           </a:p>
           <a:p>
             <a:r>
               <a:rPr lang="ru-RU" dirty="0">
-                <a:latin typeface="Times New Roman" panose="02020603050405020304" pitchFamily="18" charset="0"/>
                 <a:cs typeface="Times New Roman" panose="02020603050405020304" pitchFamily="18" charset="0"/>
               </a:rPr>
               <a:t>Использование библиотеки </a:t>
             </a:r>
             <a:r>
               <a:rPr lang="en-US" dirty="0" err="1">
-                <a:latin typeface="Times New Roman" panose="02020603050405020304" pitchFamily="18" charset="0"/>
                 <a:cs typeface="Times New Roman" panose="02020603050405020304" pitchFamily="18" charset="0"/>
               </a:rPr>
               <a:t>GraphX</a:t>
             </a:r>
             <a:r>
               <a:rPr lang="en-US" dirty="0">
-                <a:latin typeface="Times New Roman" panose="02020603050405020304" pitchFamily="18" charset="0"/>
                 <a:cs typeface="Times New Roman" panose="02020603050405020304" pitchFamily="18" charset="0"/>
               </a:rPr>
               <a:t> </a:t>
             </a:r>
             <a:r>
               <a:rPr lang="ru-RU" dirty="0">
-                <a:latin typeface="Times New Roman" panose="02020603050405020304" pitchFamily="18" charset="0"/>
                 <a:cs typeface="Times New Roman" panose="02020603050405020304" pitchFamily="18" charset="0"/>
               </a:rPr>
               <a:t>для работы с графами</a:t>
@@ -4082,7 +4038,6 @@
           <a:p>
             <a:r>
               <a:rPr lang="ru-RU" dirty="0">
-                <a:latin typeface="Times New Roman" panose="02020603050405020304" pitchFamily="18" charset="0"/>
                 <a:cs typeface="Times New Roman" panose="02020603050405020304" pitchFamily="18" charset="0"/>
               </a:rPr>
               <a:t>Задействование механизма рефлексии</a:t>
@@ -4136,18 +4091,21 @@
         </p:nvSpPr>
         <p:spPr/>
         <p:txBody>
-          <a:bodyPr/>
-          <a:lstStyle/>
-          <a:p>
-            <a:r>
-              <a:rPr lang="ru-RU" dirty="0" err="1" smtClean="0"/>
+          <a:bodyPr>
+            <a:normAutofit/>
+          </a:bodyPr>
+          <a:lstStyle/>
+          <a:p>
+            <a:pPr algn="ctr"/>
+            <a:r>
+              <a:rPr lang="ru-RU" sz="5400" dirty="0" err="1" smtClean="0"/>
               <a:t>Плагинная</a:t>
             </a:r>
             <a:r>
-              <a:rPr lang="ru-RU" dirty="0" smtClean="0"/>
+              <a:rPr lang="ru-RU" sz="5400" dirty="0" smtClean="0"/>
               <a:t> система</a:t>
             </a:r>
-            <a:endParaRPr lang="ru-RU" dirty="0"/>
+            <a:endParaRPr lang="ru-RU" sz="5400" dirty="0"/>
           </a:p>
         </p:txBody>
       </p:sp>
@@ -4257,14 +4215,17 @@
         </p:nvSpPr>
         <p:spPr/>
         <p:txBody>
-          <a:bodyPr/>
-          <a:lstStyle/>
-          <a:p>
-            <a:r>
-              <a:rPr lang="ru-RU" dirty="0" smtClean="0"/>
+          <a:bodyPr>
+            <a:normAutofit/>
+          </a:bodyPr>
+          <a:lstStyle/>
+          <a:p>
+            <a:pPr algn="ctr"/>
+            <a:r>
+              <a:rPr lang="ru-RU" sz="5400" dirty="0" smtClean="0"/>
               <a:t>Редактируемые свойства</a:t>
             </a:r>
-            <a:endParaRPr lang="ru-RU" dirty="0"/>
+            <a:endParaRPr lang="ru-RU" sz="5400" dirty="0"/>
           </a:p>
         </p:txBody>
       </p:sp>
@@ -4374,14 +4335,17 @@
         </p:nvSpPr>
         <p:spPr/>
         <p:txBody>
-          <a:bodyPr/>
-          <a:lstStyle/>
-          <a:p>
-            <a:r>
-              <a:rPr lang="en-US" dirty="0" smtClean="0"/>
+          <a:bodyPr>
+            <a:normAutofit/>
+          </a:bodyPr>
+          <a:lstStyle/>
+          <a:p>
+            <a:pPr algn="ctr"/>
+            <a:r>
+              <a:rPr lang="en-US" sz="5400" dirty="0" smtClean="0"/>
               <a:t>Drag-n-drop</a:t>
             </a:r>
-            <a:endParaRPr lang="ru-RU" dirty="0"/>
+            <a:endParaRPr lang="ru-RU" sz="5400" dirty="0"/>
           </a:p>
         </p:txBody>
       </p:sp>
@@ -4541,13 +4505,7 @@
       </p:grpSpPr>
       <p:sp>
         <p:nvSpPr>
-          <p:cNvPr id="2" name="Заголовок 1">
-            <a:extLst>
-              <a:ext uri="{FF2B5EF4-FFF2-40B4-BE49-F238E27FC236}">
-                <a16:creationId xmlns="" xmlns:a16="http://schemas.microsoft.com/office/drawing/2014/main" id="{3BDA58FE-3AD5-4A37-8347-C89BF167F9EE}"/>
-              </a:ext>
-            </a:extLst>
-          </p:cNvPr>
+          <p:cNvPr id="2" name="Заголовок 1"/>
           <p:cNvSpPr>
             <a:spLocks noGrp="1"/>
           </p:cNvSpPr>
@@ -4564,8 +4522,124 @@
           <a:p>
             <a:pPr algn="ctr"/>
             <a:r>
+              <a:rPr lang="ru-RU" sz="5400" dirty="0" smtClean="0"/>
+              <a:t>Технические средства</a:t>
+            </a:r>
+            <a:endParaRPr lang="ru-RU" sz="5400" dirty="0"/>
+          </a:p>
+        </p:txBody>
+      </p:sp>
+      <p:sp>
+        <p:nvSpPr>
+          <p:cNvPr id="3" name="Объект 2"/>
+          <p:cNvSpPr>
+            <a:spLocks noGrp="1"/>
+          </p:cNvSpPr>
+          <p:nvPr>
+            <p:ph idx="1"/>
+          </p:nvPr>
+        </p:nvSpPr>
+        <p:spPr/>
+        <p:txBody>
+          <a:bodyPr/>
+          <a:lstStyle/>
+          <a:p>
+            <a:r>
+              <a:rPr lang="en-US" dirty="0" err="1" smtClean="0"/>
+              <a:t>GitHub</a:t>
+            </a:r>
+            <a:endParaRPr lang="en-US" dirty="0" smtClean="0"/>
+          </a:p>
+          <a:p>
+            <a:r>
+              <a:rPr lang="en-US" dirty="0" err="1" smtClean="0"/>
+              <a:t>GitHub</a:t>
+            </a:r>
+            <a:r>
+              <a:rPr lang="en-US" dirty="0" smtClean="0"/>
+              <a:t> Projects</a:t>
+            </a:r>
+          </a:p>
+          <a:p>
+            <a:r>
+              <a:rPr lang="en-US" dirty="0" err="1" smtClean="0"/>
+              <a:t>Gitter</a:t>
+            </a:r>
+            <a:endParaRPr lang="en-US" dirty="0" smtClean="0"/>
+          </a:p>
+          <a:p>
+            <a:r>
+              <a:rPr lang="en-US" dirty="0" smtClean="0"/>
+              <a:t>Travis CI &amp; </a:t>
+            </a:r>
+            <a:r>
+              <a:rPr lang="en-US" dirty="0" err="1" smtClean="0"/>
+              <a:t>AppVeyor</a:t>
+            </a:r>
+            <a:r>
+              <a:rPr lang="en-US" dirty="0" smtClean="0"/>
+              <a:t> CI</a:t>
+            </a:r>
+            <a:endParaRPr lang="ru-RU" dirty="0"/>
+          </a:p>
+        </p:txBody>
+      </p:sp>
+    </p:spTree>
+    <p:extLst>
+      <p:ext uri="{BB962C8B-B14F-4D97-AF65-F5344CB8AC3E}">
+        <p14:creationId xmlns:p14="http://schemas.microsoft.com/office/powerpoint/2010/main" val="2997512538"/>
+      </p:ext>
+    </p:extLst>
+  </p:cSld>
+  <p:clrMapOvr>
+    <a:masterClrMapping/>
+  </p:clrMapOvr>
+</p:sld>
+</file>
+
+<file path=ppt/slides/slide9.xml><?xml version="1.0" encoding="utf-8"?>
+<p:sld xmlns:a="http://schemas.openxmlformats.org/drawingml/2006/main" xmlns:r="http://schemas.openxmlformats.org/officeDocument/2006/relationships" xmlns:p="http://schemas.openxmlformats.org/presentationml/2006/main">
+  <p:cSld>
+    <p:spTree>
+      <p:nvGrpSpPr>
+        <p:cNvPr id="1" name=""/>
+        <p:cNvGrpSpPr/>
+        <p:nvPr/>
+      </p:nvGrpSpPr>
+      <p:grpSpPr>
+        <a:xfrm>
+          <a:off x="0" y="0"/>
+          <a:ext cx="0" cy="0"/>
+          <a:chOff x="0" y="0"/>
+          <a:chExt cx="0" cy="0"/>
+        </a:xfrm>
+      </p:grpSpPr>
+      <p:sp>
+        <p:nvSpPr>
+          <p:cNvPr id="2" name="Заголовок 1">
+            <a:extLst>
+              <a:ext uri="{FF2B5EF4-FFF2-40B4-BE49-F238E27FC236}">
+                <a16:creationId xmlns:a16="http://schemas.microsoft.com/office/drawing/2014/main" xmlns="" id="{3BDA58FE-3AD5-4A37-8347-C89BF167F9EE}"/>
+              </a:ext>
+            </a:extLst>
+          </p:cNvPr>
+          <p:cNvSpPr>
+            <a:spLocks noGrp="1"/>
+          </p:cNvSpPr>
+          <p:nvPr>
+            <p:ph type="title"/>
+          </p:nvPr>
+        </p:nvSpPr>
+        <p:spPr/>
+        <p:txBody>
+          <a:bodyPr>
+            <a:normAutofit/>
+          </a:bodyPr>
+          <a:lstStyle/>
+          <a:p>
+            <a:pPr algn="ctr"/>
+            <a:r>
               <a:rPr lang="ru-RU" sz="5400" dirty="0">
-                <a:latin typeface="Times New Roman" panose="02020603050405020304" pitchFamily="18" charset="0"/>
                 <a:cs typeface="Times New Roman" panose="02020603050405020304" pitchFamily="18" charset="0"/>
               </a:rPr>
               <a:t>Результаты</a:t>
@@ -4578,7 +4652,7 @@
           <p:cNvPr id="3" name="Объект 2">
             <a:extLst>
               <a:ext uri="{FF2B5EF4-FFF2-40B4-BE49-F238E27FC236}">
-                <a16:creationId xmlns="" xmlns:a16="http://schemas.microsoft.com/office/drawing/2014/main" id="{F556C1E0-7929-4E3F-BB59-F5DF4190D231}"/>
+                <a16:creationId xmlns:a16="http://schemas.microsoft.com/office/drawing/2014/main" xmlns="" id="{F556C1E0-7929-4E3F-BB59-F5DF4190D231}"/>
               </a:ext>
             </a:extLst>
           </p:cNvPr>
@@ -4598,21 +4672,18 @@
           <a:p>
             <a:r>
               <a:rPr lang="ru-RU" dirty="0">
-                <a:latin typeface="Times New Roman" panose="02020603050405020304" pitchFamily="18" charset="0"/>
                 <a:cs typeface="Times New Roman" panose="02020603050405020304" pitchFamily="18" charset="0"/>
               </a:rPr>
               <a:t>Реализованы основные компоненты графического редактора, поддержка части </a:t>
             </a:r>
             <a:r>
               <a:rPr lang="ru-RU" dirty="0" err="1">
-                <a:latin typeface="Times New Roman" panose="02020603050405020304" pitchFamily="18" charset="0"/>
                 <a:cs typeface="Times New Roman" panose="02020603050405020304" pitchFamily="18" charset="0"/>
               </a:rPr>
               <a:t>графовых</a:t>
             </a:r>
             <a:r>
               <a:rPr lang="ru-RU" dirty="0">
-                <a:latin typeface="Times New Roman" panose="02020603050405020304" pitchFamily="18" charset="0"/>
                 <a:cs typeface="Times New Roman" panose="02020603050405020304" pitchFamily="18" charset="0"/>
               </a:rPr>
               <a:t> языков</a:t>
@@ -4621,7 +4692,6 @@
           <a:p>
             <a:r>
               <a:rPr lang="ru-RU" dirty="0">
-                <a:latin typeface="Times New Roman" panose="02020603050405020304" pitchFamily="18" charset="0"/>
                 <a:cs typeface="Times New Roman" panose="02020603050405020304" pitchFamily="18" charset="0"/>
               </a:rPr>
               <a:t>Реализована возможность добавления плагинов</a:t>
@@ -4630,14 +4700,12 @@
           <a:p>
             <a:r>
               <a:rPr lang="ru-RU" dirty="0">
-                <a:latin typeface="Times New Roman" panose="02020603050405020304" pitchFamily="18" charset="0"/>
                 <a:cs typeface="Times New Roman" panose="02020603050405020304" pitchFamily="18" charset="0"/>
               </a:rPr>
               <a:t>Предоставлена возможность редактировать свойства </a:t>
             </a:r>
             <a:r>
               <a:rPr lang="ru-RU" dirty="0" smtClean="0">
-                <a:latin typeface="Times New Roman" panose="02020603050405020304" pitchFamily="18" charset="0"/>
                 <a:cs typeface="Times New Roman" panose="02020603050405020304" pitchFamily="18" charset="0"/>
               </a:rPr>
               <a:t>объектов</a:t>
@@ -4646,34 +4714,29 @@
           <a:p>
             <a:r>
               <a:rPr lang="ru-RU" dirty="0" smtClean="0">
-                <a:latin typeface="Times New Roman" panose="02020603050405020304" pitchFamily="18" charset="0"/>
                 <a:cs typeface="Times New Roman" panose="02020603050405020304" pitchFamily="18" charset="0"/>
               </a:rPr>
               <a:t>Предоставлена возможность создавать объекты </a:t>
             </a:r>
             <a:r>
               <a:rPr lang="en-US" dirty="0">
-                <a:latin typeface="Times New Roman" panose="02020603050405020304" pitchFamily="18" charset="0"/>
                 <a:cs typeface="Times New Roman" panose="02020603050405020304" pitchFamily="18" charset="0"/>
               </a:rPr>
               <a:t>d</a:t>
             </a:r>
             <a:r>
               <a:rPr lang="en-US" dirty="0" smtClean="0">
-                <a:latin typeface="Times New Roman" panose="02020603050405020304" pitchFamily="18" charset="0"/>
                 <a:cs typeface="Times New Roman" panose="02020603050405020304" pitchFamily="18" charset="0"/>
               </a:rPr>
               <a:t>rag-n-drop’</a:t>
             </a:r>
             <a:r>
               <a:rPr lang="ru-RU" dirty="0" smtClean="0">
-                <a:latin typeface="Times New Roman" panose="02020603050405020304" pitchFamily="18" charset="0"/>
                 <a:cs typeface="Times New Roman" panose="02020603050405020304" pitchFamily="18" charset="0"/>
               </a:rPr>
               <a:t>ом</a:t>
             </a:r>
             <a:endParaRPr lang="ru-RU" dirty="0">
-              <a:latin typeface="Times New Roman" panose="02020603050405020304" pitchFamily="18" charset="0"/>
               <a:cs typeface="Times New Roman" panose="02020603050405020304" pitchFamily="18" charset="0"/>
             </a:endParaRPr>
           </a:p>
@@ -4981,7 +5044,7 @@
   <a:extraClrSchemeLst/>
   <a:extLst>
     <a:ext uri="{05A4C25C-085E-4340-85A3-A5531E510DB2}">
-      <thm15:themeFamily xmlns="" xmlns:thm15="http://schemas.microsoft.com/office/thememl/2012/main" name="Office Theme" id="{62F939B6-93AF-4DB8-9C6B-D6C7DFDC589F}" vid="{4A3C46E8-61CC-4603-A589-7422A47A8E4A}"/>
+      <thm15:themeFamily xmlns:thm15="http://schemas.microsoft.com/office/thememl/2012/main" xmlns="" name="Office Theme" id="{62F939B6-93AF-4DB8-9C6B-D6C7DFDC589F}" vid="{4A3C46E8-61CC-4603-A589-7422A47A8E4A}"/>
     </a:ext>
   </a:extLst>
 </a:theme>

</xml_diff>

<commit_message>
Changed Times New Roman with Calibri font
</commit_message>
<xml_diff>
--- a/REAL.NET.pptx
+++ b/REAL.NET.pptx
@@ -8,12 +8,13 @@
     <p:sldId id="256" r:id="rId2"/>
     <p:sldId id="257" r:id="rId3"/>
     <p:sldId id="258" r:id="rId4"/>
-    <p:sldId id="260" r:id="rId5"/>
-    <p:sldId id="264" r:id="rId6"/>
-    <p:sldId id="262" r:id="rId7"/>
-    <p:sldId id="263" r:id="rId8"/>
-    <p:sldId id="265" r:id="rId9"/>
-    <p:sldId id="259" r:id="rId10"/>
+    <p:sldId id="266" r:id="rId5"/>
+    <p:sldId id="260" r:id="rId6"/>
+    <p:sldId id="264" r:id="rId7"/>
+    <p:sldId id="262" r:id="rId8"/>
+    <p:sldId id="263" r:id="rId9"/>
+    <p:sldId id="265" r:id="rId10"/>
+    <p:sldId id="259" r:id="rId11"/>
   </p:sldIdLst>
   <p:sldSz cx="12192000" cy="6858000"/>
   <p:notesSz cx="6858000" cy="9144000"/>
@@ -114,7 +115,7 @@
   </p:defaultTextStyle>
   <p:extLst>
     <p:ext uri="{EFAFB233-063F-42B5-8137-9DF3F51BA10A}">
-      <p15:sldGuideLst xmlns:p15="http://schemas.microsoft.com/office/powerpoint/2012/main" xmlns=""/>
+      <p15:sldGuideLst xmlns="" xmlns:p15="http://schemas.microsoft.com/office/powerpoint/2012/main"/>
     </p:ext>
   </p:extLst>
 </p:presentation>
@@ -255,7 +256,7 @@
           <p:cNvPr id="2" name="Заголовок 1">
             <a:extLst>
               <a:ext uri="{FF2B5EF4-FFF2-40B4-BE49-F238E27FC236}">
-                <a16:creationId xmlns:a16="http://schemas.microsoft.com/office/drawing/2014/main" xmlns="" id="{37CAFF4F-E106-4FFC-930C-B2CF5F22161A}"/>
+                <a16:creationId xmlns="" xmlns:a16="http://schemas.microsoft.com/office/drawing/2014/main" id="{37CAFF4F-E106-4FFC-930C-B2CF5F22161A}"/>
               </a:ext>
             </a:extLst>
           </p:cNvPr>
@@ -292,7 +293,7 @@
           <p:cNvPr id="3" name="Подзаголовок 2">
             <a:extLst>
               <a:ext uri="{FF2B5EF4-FFF2-40B4-BE49-F238E27FC236}">
-                <a16:creationId xmlns:a16="http://schemas.microsoft.com/office/drawing/2014/main" xmlns="" id="{D931388F-6771-4551-91FD-5E21225AF71E}"/>
+                <a16:creationId xmlns="" xmlns:a16="http://schemas.microsoft.com/office/drawing/2014/main" id="{D931388F-6771-4551-91FD-5E21225AF71E}"/>
               </a:ext>
             </a:extLst>
           </p:cNvPr>
@@ -362,7 +363,7 @@
           <p:cNvPr id="4" name="Дата 3">
             <a:extLst>
               <a:ext uri="{FF2B5EF4-FFF2-40B4-BE49-F238E27FC236}">
-                <a16:creationId xmlns:a16="http://schemas.microsoft.com/office/drawing/2014/main" xmlns="" id="{891E1217-D87F-4D0A-BAC3-AC2EB3EB3948}"/>
+                <a16:creationId xmlns="" xmlns:a16="http://schemas.microsoft.com/office/drawing/2014/main" id="{891E1217-D87F-4D0A-BAC3-AC2EB3EB3948}"/>
               </a:ext>
             </a:extLst>
           </p:cNvPr>
@@ -391,7 +392,7 @@
           <p:cNvPr id="5" name="Нижний колонтитул 4">
             <a:extLst>
               <a:ext uri="{FF2B5EF4-FFF2-40B4-BE49-F238E27FC236}">
-                <a16:creationId xmlns:a16="http://schemas.microsoft.com/office/drawing/2014/main" xmlns="" id="{2E38F155-81BE-4451-BA4A-4A4A2FC39B0B}"/>
+                <a16:creationId xmlns="" xmlns:a16="http://schemas.microsoft.com/office/drawing/2014/main" id="{2E38F155-81BE-4451-BA4A-4A4A2FC39B0B}"/>
               </a:ext>
             </a:extLst>
           </p:cNvPr>
@@ -416,7 +417,7 @@
           <p:cNvPr id="6" name="Номер слайда 5">
             <a:extLst>
               <a:ext uri="{FF2B5EF4-FFF2-40B4-BE49-F238E27FC236}">
-                <a16:creationId xmlns:a16="http://schemas.microsoft.com/office/drawing/2014/main" xmlns="" id="{D4AF2960-2CA3-4194-B038-7D2E7F666E01}"/>
+                <a16:creationId xmlns="" xmlns:a16="http://schemas.microsoft.com/office/drawing/2014/main" id="{D4AF2960-2CA3-4194-B038-7D2E7F666E01}"/>
               </a:ext>
             </a:extLst>
           </p:cNvPr>
@@ -475,7 +476,7 @@
           <p:cNvPr id="2" name="Заголовок 1">
             <a:extLst>
               <a:ext uri="{FF2B5EF4-FFF2-40B4-BE49-F238E27FC236}">
-                <a16:creationId xmlns:a16="http://schemas.microsoft.com/office/drawing/2014/main" xmlns="" id="{CB1EEEF4-4B96-4913-8187-25000DB5172B}"/>
+                <a16:creationId xmlns="" xmlns:a16="http://schemas.microsoft.com/office/drawing/2014/main" id="{CB1EEEF4-4B96-4913-8187-25000DB5172B}"/>
               </a:ext>
             </a:extLst>
           </p:cNvPr>
@@ -503,7 +504,7 @@
           <p:cNvPr id="3" name="Вертикальный текст 2">
             <a:extLst>
               <a:ext uri="{FF2B5EF4-FFF2-40B4-BE49-F238E27FC236}">
-                <a16:creationId xmlns:a16="http://schemas.microsoft.com/office/drawing/2014/main" xmlns="" id="{851313DB-3E90-4C47-904F-3DB8D80F491E}"/>
+                <a16:creationId xmlns="" xmlns:a16="http://schemas.microsoft.com/office/drawing/2014/main" id="{851313DB-3E90-4C47-904F-3DB8D80F491E}"/>
               </a:ext>
             </a:extLst>
           </p:cNvPr>
@@ -560,7 +561,7 @@
           <p:cNvPr id="4" name="Дата 3">
             <a:extLst>
               <a:ext uri="{FF2B5EF4-FFF2-40B4-BE49-F238E27FC236}">
-                <a16:creationId xmlns:a16="http://schemas.microsoft.com/office/drawing/2014/main" xmlns="" id="{F2D1EEC3-8F71-4969-9A6A-70F2FB8269C4}"/>
+                <a16:creationId xmlns="" xmlns:a16="http://schemas.microsoft.com/office/drawing/2014/main" id="{F2D1EEC3-8F71-4969-9A6A-70F2FB8269C4}"/>
               </a:ext>
             </a:extLst>
           </p:cNvPr>
@@ -589,7 +590,7 @@
           <p:cNvPr id="5" name="Нижний колонтитул 4">
             <a:extLst>
               <a:ext uri="{FF2B5EF4-FFF2-40B4-BE49-F238E27FC236}">
-                <a16:creationId xmlns:a16="http://schemas.microsoft.com/office/drawing/2014/main" xmlns="" id="{22444CCD-343D-48B0-AA57-298076F7BD70}"/>
+                <a16:creationId xmlns="" xmlns:a16="http://schemas.microsoft.com/office/drawing/2014/main" id="{22444CCD-343D-48B0-AA57-298076F7BD70}"/>
               </a:ext>
             </a:extLst>
           </p:cNvPr>
@@ -614,7 +615,7 @@
           <p:cNvPr id="6" name="Номер слайда 5">
             <a:extLst>
               <a:ext uri="{FF2B5EF4-FFF2-40B4-BE49-F238E27FC236}">
-                <a16:creationId xmlns:a16="http://schemas.microsoft.com/office/drawing/2014/main" xmlns="" id="{75FEDECC-87A2-471F-AEF3-D994F28C85D3}"/>
+                <a16:creationId xmlns="" xmlns:a16="http://schemas.microsoft.com/office/drawing/2014/main" id="{75FEDECC-87A2-471F-AEF3-D994F28C85D3}"/>
               </a:ext>
             </a:extLst>
           </p:cNvPr>
@@ -673,7 +674,7 @@
           <p:cNvPr id="2" name="Вертикальный заголовок 1">
             <a:extLst>
               <a:ext uri="{FF2B5EF4-FFF2-40B4-BE49-F238E27FC236}">
-                <a16:creationId xmlns:a16="http://schemas.microsoft.com/office/drawing/2014/main" xmlns="" id="{E01EC5FD-8E6D-4585-834B-2BA4D8BE2230}"/>
+                <a16:creationId xmlns="" xmlns:a16="http://schemas.microsoft.com/office/drawing/2014/main" id="{E01EC5FD-8E6D-4585-834B-2BA4D8BE2230}"/>
               </a:ext>
             </a:extLst>
           </p:cNvPr>
@@ -706,7 +707,7 @@
           <p:cNvPr id="3" name="Вертикальный текст 2">
             <a:extLst>
               <a:ext uri="{FF2B5EF4-FFF2-40B4-BE49-F238E27FC236}">
-                <a16:creationId xmlns:a16="http://schemas.microsoft.com/office/drawing/2014/main" xmlns="" id="{A0AF2BCF-B7A9-4273-A036-65D48EC35AFB}"/>
+                <a16:creationId xmlns="" xmlns:a16="http://schemas.microsoft.com/office/drawing/2014/main" id="{A0AF2BCF-B7A9-4273-A036-65D48EC35AFB}"/>
               </a:ext>
             </a:extLst>
           </p:cNvPr>
@@ -768,7 +769,7 @@
           <p:cNvPr id="4" name="Дата 3">
             <a:extLst>
               <a:ext uri="{FF2B5EF4-FFF2-40B4-BE49-F238E27FC236}">
-                <a16:creationId xmlns:a16="http://schemas.microsoft.com/office/drawing/2014/main" xmlns="" id="{FD0D1C6D-69CF-457C-91C7-F377F3740FD7}"/>
+                <a16:creationId xmlns="" xmlns:a16="http://schemas.microsoft.com/office/drawing/2014/main" id="{FD0D1C6D-69CF-457C-91C7-F377F3740FD7}"/>
               </a:ext>
             </a:extLst>
           </p:cNvPr>
@@ -797,7 +798,7 @@
           <p:cNvPr id="5" name="Нижний колонтитул 4">
             <a:extLst>
               <a:ext uri="{FF2B5EF4-FFF2-40B4-BE49-F238E27FC236}">
-                <a16:creationId xmlns:a16="http://schemas.microsoft.com/office/drawing/2014/main" xmlns="" id="{B4E51A0A-6E5C-4D13-BEEB-CD5E87DE7A55}"/>
+                <a16:creationId xmlns="" xmlns:a16="http://schemas.microsoft.com/office/drawing/2014/main" id="{B4E51A0A-6E5C-4D13-BEEB-CD5E87DE7A55}"/>
               </a:ext>
             </a:extLst>
           </p:cNvPr>
@@ -822,7 +823,7 @@
           <p:cNvPr id="6" name="Номер слайда 5">
             <a:extLst>
               <a:ext uri="{FF2B5EF4-FFF2-40B4-BE49-F238E27FC236}">
-                <a16:creationId xmlns:a16="http://schemas.microsoft.com/office/drawing/2014/main" xmlns="" id="{DDBC26EC-1A2D-4432-9144-2DB20ABD8101}"/>
+                <a16:creationId xmlns="" xmlns:a16="http://schemas.microsoft.com/office/drawing/2014/main" id="{DDBC26EC-1A2D-4432-9144-2DB20ABD8101}"/>
               </a:ext>
             </a:extLst>
           </p:cNvPr>
@@ -881,7 +882,7 @@
           <p:cNvPr id="2" name="Заголовок 1">
             <a:extLst>
               <a:ext uri="{FF2B5EF4-FFF2-40B4-BE49-F238E27FC236}">
-                <a16:creationId xmlns:a16="http://schemas.microsoft.com/office/drawing/2014/main" xmlns="" id="{93F15F7B-3F3F-4BCF-A278-ED76E11675D5}"/>
+                <a16:creationId xmlns="" xmlns:a16="http://schemas.microsoft.com/office/drawing/2014/main" id="{93F15F7B-3F3F-4BCF-A278-ED76E11675D5}"/>
               </a:ext>
             </a:extLst>
           </p:cNvPr>
@@ -909,7 +910,7 @@
           <p:cNvPr id="3" name="Объект 2">
             <a:extLst>
               <a:ext uri="{FF2B5EF4-FFF2-40B4-BE49-F238E27FC236}">
-                <a16:creationId xmlns:a16="http://schemas.microsoft.com/office/drawing/2014/main" xmlns="" id="{53CE5BDC-C0F2-4C9D-82E4-E7AB75BD3541}"/>
+                <a16:creationId xmlns="" xmlns:a16="http://schemas.microsoft.com/office/drawing/2014/main" id="{53CE5BDC-C0F2-4C9D-82E4-E7AB75BD3541}"/>
               </a:ext>
             </a:extLst>
           </p:cNvPr>
@@ -966,7 +967,7 @@
           <p:cNvPr id="4" name="Дата 3">
             <a:extLst>
               <a:ext uri="{FF2B5EF4-FFF2-40B4-BE49-F238E27FC236}">
-                <a16:creationId xmlns:a16="http://schemas.microsoft.com/office/drawing/2014/main" xmlns="" id="{7A58E51C-CAC9-4ED0-A790-E5CFBAE9031B}"/>
+                <a16:creationId xmlns="" xmlns:a16="http://schemas.microsoft.com/office/drawing/2014/main" id="{7A58E51C-CAC9-4ED0-A790-E5CFBAE9031B}"/>
               </a:ext>
             </a:extLst>
           </p:cNvPr>
@@ -995,7 +996,7 @@
           <p:cNvPr id="5" name="Нижний колонтитул 4">
             <a:extLst>
               <a:ext uri="{FF2B5EF4-FFF2-40B4-BE49-F238E27FC236}">
-                <a16:creationId xmlns:a16="http://schemas.microsoft.com/office/drawing/2014/main" xmlns="" id="{ABB2258F-C224-4F1E-B5B7-B244967A5C26}"/>
+                <a16:creationId xmlns="" xmlns:a16="http://schemas.microsoft.com/office/drawing/2014/main" id="{ABB2258F-C224-4F1E-B5B7-B244967A5C26}"/>
               </a:ext>
             </a:extLst>
           </p:cNvPr>
@@ -1020,7 +1021,7 @@
           <p:cNvPr id="6" name="Номер слайда 5">
             <a:extLst>
               <a:ext uri="{FF2B5EF4-FFF2-40B4-BE49-F238E27FC236}">
-                <a16:creationId xmlns:a16="http://schemas.microsoft.com/office/drawing/2014/main" xmlns="" id="{5FC87BB2-F189-4F29-B9B4-B32305682BA5}"/>
+                <a16:creationId xmlns="" xmlns:a16="http://schemas.microsoft.com/office/drawing/2014/main" id="{5FC87BB2-F189-4F29-B9B4-B32305682BA5}"/>
               </a:ext>
             </a:extLst>
           </p:cNvPr>
@@ -1079,7 +1080,7 @@
           <p:cNvPr id="2" name="Заголовок 1">
             <a:extLst>
               <a:ext uri="{FF2B5EF4-FFF2-40B4-BE49-F238E27FC236}">
-                <a16:creationId xmlns:a16="http://schemas.microsoft.com/office/drawing/2014/main" xmlns="" id="{605F2F98-82CD-48E0-91F5-FB2E59327BB2}"/>
+                <a16:creationId xmlns="" xmlns:a16="http://schemas.microsoft.com/office/drawing/2014/main" id="{605F2F98-82CD-48E0-91F5-FB2E59327BB2}"/>
               </a:ext>
             </a:extLst>
           </p:cNvPr>
@@ -1116,7 +1117,7 @@
           <p:cNvPr id="3" name="Текст 2">
             <a:extLst>
               <a:ext uri="{FF2B5EF4-FFF2-40B4-BE49-F238E27FC236}">
-                <a16:creationId xmlns:a16="http://schemas.microsoft.com/office/drawing/2014/main" xmlns="" id="{E55186E3-53AF-41EA-B7C6-F3B318EEB171}"/>
+                <a16:creationId xmlns="" xmlns:a16="http://schemas.microsoft.com/office/drawing/2014/main" id="{E55186E3-53AF-41EA-B7C6-F3B318EEB171}"/>
               </a:ext>
             </a:extLst>
           </p:cNvPr>
@@ -1241,7 +1242,7 @@
           <p:cNvPr id="4" name="Дата 3">
             <a:extLst>
               <a:ext uri="{FF2B5EF4-FFF2-40B4-BE49-F238E27FC236}">
-                <a16:creationId xmlns:a16="http://schemas.microsoft.com/office/drawing/2014/main" xmlns="" id="{C1AE53D4-3C43-49FA-AFE5-6476242EC6CE}"/>
+                <a16:creationId xmlns="" xmlns:a16="http://schemas.microsoft.com/office/drawing/2014/main" id="{C1AE53D4-3C43-49FA-AFE5-6476242EC6CE}"/>
               </a:ext>
             </a:extLst>
           </p:cNvPr>
@@ -1270,7 +1271,7 @@
           <p:cNvPr id="5" name="Нижний колонтитул 4">
             <a:extLst>
               <a:ext uri="{FF2B5EF4-FFF2-40B4-BE49-F238E27FC236}">
-                <a16:creationId xmlns:a16="http://schemas.microsoft.com/office/drawing/2014/main" xmlns="" id="{60EF3BBF-03C5-4C17-A7F6-EB1491E05710}"/>
+                <a16:creationId xmlns="" xmlns:a16="http://schemas.microsoft.com/office/drawing/2014/main" id="{60EF3BBF-03C5-4C17-A7F6-EB1491E05710}"/>
               </a:ext>
             </a:extLst>
           </p:cNvPr>
@@ -1295,7 +1296,7 @@
           <p:cNvPr id="6" name="Номер слайда 5">
             <a:extLst>
               <a:ext uri="{FF2B5EF4-FFF2-40B4-BE49-F238E27FC236}">
-                <a16:creationId xmlns:a16="http://schemas.microsoft.com/office/drawing/2014/main" xmlns="" id="{EAEC8252-D4B1-4894-84A2-B847CCB52EF0}"/>
+                <a16:creationId xmlns="" xmlns:a16="http://schemas.microsoft.com/office/drawing/2014/main" id="{EAEC8252-D4B1-4894-84A2-B847CCB52EF0}"/>
               </a:ext>
             </a:extLst>
           </p:cNvPr>
@@ -1354,7 +1355,7 @@
           <p:cNvPr id="2" name="Заголовок 1">
             <a:extLst>
               <a:ext uri="{FF2B5EF4-FFF2-40B4-BE49-F238E27FC236}">
-                <a16:creationId xmlns:a16="http://schemas.microsoft.com/office/drawing/2014/main" xmlns="" id="{C72B89DD-3E56-47CD-B725-5D2A0E0FDC28}"/>
+                <a16:creationId xmlns="" xmlns:a16="http://schemas.microsoft.com/office/drawing/2014/main" id="{C72B89DD-3E56-47CD-B725-5D2A0E0FDC28}"/>
               </a:ext>
             </a:extLst>
           </p:cNvPr>
@@ -1382,7 +1383,7 @@
           <p:cNvPr id="3" name="Объект 2">
             <a:extLst>
               <a:ext uri="{FF2B5EF4-FFF2-40B4-BE49-F238E27FC236}">
-                <a16:creationId xmlns:a16="http://schemas.microsoft.com/office/drawing/2014/main" xmlns="" id="{8D41EF36-8F65-4CA6-927C-9F9183D9CD73}"/>
+                <a16:creationId xmlns="" xmlns:a16="http://schemas.microsoft.com/office/drawing/2014/main" id="{8D41EF36-8F65-4CA6-927C-9F9183D9CD73}"/>
               </a:ext>
             </a:extLst>
           </p:cNvPr>
@@ -1444,7 +1445,7 @@
           <p:cNvPr id="4" name="Объект 3">
             <a:extLst>
               <a:ext uri="{FF2B5EF4-FFF2-40B4-BE49-F238E27FC236}">
-                <a16:creationId xmlns:a16="http://schemas.microsoft.com/office/drawing/2014/main" xmlns="" id="{65226DF4-1E33-42A7-93CF-9A741ED18E47}"/>
+                <a16:creationId xmlns="" xmlns:a16="http://schemas.microsoft.com/office/drawing/2014/main" id="{65226DF4-1E33-42A7-93CF-9A741ED18E47}"/>
               </a:ext>
             </a:extLst>
           </p:cNvPr>
@@ -1506,7 +1507,7 @@
           <p:cNvPr id="5" name="Дата 4">
             <a:extLst>
               <a:ext uri="{FF2B5EF4-FFF2-40B4-BE49-F238E27FC236}">
-                <a16:creationId xmlns:a16="http://schemas.microsoft.com/office/drawing/2014/main" xmlns="" id="{C97AD1ED-0CE1-4EF1-A664-DE13C88D3431}"/>
+                <a16:creationId xmlns="" xmlns:a16="http://schemas.microsoft.com/office/drawing/2014/main" id="{C97AD1ED-0CE1-4EF1-A664-DE13C88D3431}"/>
               </a:ext>
             </a:extLst>
           </p:cNvPr>
@@ -1535,7 +1536,7 @@
           <p:cNvPr id="6" name="Нижний колонтитул 5">
             <a:extLst>
               <a:ext uri="{FF2B5EF4-FFF2-40B4-BE49-F238E27FC236}">
-                <a16:creationId xmlns:a16="http://schemas.microsoft.com/office/drawing/2014/main" xmlns="" id="{9FF64049-3E79-492C-ABC8-8EFF1B085B84}"/>
+                <a16:creationId xmlns="" xmlns:a16="http://schemas.microsoft.com/office/drawing/2014/main" id="{9FF64049-3E79-492C-ABC8-8EFF1B085B84}"/>
               </a:ext>
             </a:extLst>
           </p:cNvPr>
@@ -1560,7 +1561,7 @@
           <p:cNvPr id="7" name="Номер слайда 6">
             <a:extLst>
               <a:ext uri="{FF2B5EF4-FFF2-40B4-BE49-F238E27FC236}">
-                <a16:creationId xmlns:a16="http://schemas.microsoft.com/office/drawing/2014/main" xmlns="" id="{79AAC584-17C2-4586-9D08-DE1AC1A728EA}"/>
+                <a16:creationId xmlns="" xmlns:a16="http://schemas.microsoft.com/office/drawing/2014/main" id="{79AAC584-17C2-4586-9D08-DE1AC1A728EA}"/>
               </a:ext>
             </a:extLst>
           </p:cNvPr>
@@ -1619,7 +1620,7 @@
           <p:cNvPr id="2" name="Заголовок 1">
             <a:extLst>
               <a:ext uri="{FF2B5EF4-FFF2-40B4-BE49-F238E27FC236}">
-                <a16:creationId xmlns:a16="http://schemas.microsoft.com/office/drawing/2014/main" xmlns="" id="{60F3B848-A1D4-4358-83CB-A1B103239F59}"/>
+                <a16:creationId xmlns="" xmlns:a16="http://schemas.microsoft.com/office/drawing/2014/main" id="{60F3B848-A1D4-4358-83CB-A1B103239F59}"/>
               </a:ext>
             </a:extLst>
           </p:cNvPr>
@@ -1652,7 +1653,7 @@
           <p:cNvPr id="3" name="Текст 2">
             <a:extLst>
               <a:ext uri="{FF2B5EF4-FFF2-40B4-BE49-F238E27FC236}">
-                <a16:creationId xmlns:a16="http://schemas.microsoft.com/office/drawing/2014/main" xmlns="" id="{D943C380-2070-498E-8251-4B2B3B5C8BD9}"/>
+                <a16:creationId xmlns="" xmlns:a16="http://schemas.microsoft.com/office/drawing/2014/main" id="{D943C380-2070-498E-8251-4B2B3B5C8BD9}"/>
               </a:ext>
             </a:extLst>
           </p:cNvPr>
@@ -1723,7 +1724,7 @@
           <p:cNvPr id="4" name="Объект 3">
             <a:extLst>
               <a:ext uri="{FF2B5EF4-FFF2-40B4-BE49-F238E27FC236}">
-                <a16:creationId xmlns:a16="http://schemas.microsoft.com/office/drawing/2014/main" xmlns="" id="{0E92997B-E9B2-44AE-927B-59213AD34761}"/>
+                <a16:creationId xmlns="" xmlns:a16="http://schemas.microsoft.com/office/drawing/2014/main" id="{0E92997B-E9B2-44AE-927B-59213AD34761}"/>
               </a:ext>
             </a:extLst>
           </p:cNvPr>
@@ -1785,7 +1786,7 @@
           <p:cNvPr id="5" name="Текст 4">
             <a:extLst>
               <a:ext uri="{FF2B5EF4-FFF2-40B4-BE49-F238E27FC236}">
-                <a16:creationId xmlns:a16="http://schemas.microsoft.com/office/drawing/2014/main" xmlns="" id="{EB16FD49-C4B5-463C-B46D-98699F7C0E7C}"/>
+                <a16:creationId xmlns="" xmlns:a16="http://schemas.microsoft.com/office/drawing/2014/main" id="{EB16FD49-C4B5-463C-B46D-98699F7C0E7C}"/>
               </a:ext>
             </a:extLst>
           </p:cNvPr>
@@ -1856,7 +1857,7 @@
           <p:cNvPr id="6" name="Объект 5">
             <a:extLst>
               <a:ext uri="{FF2B5EF4-FFF2-40B4-BE49-F238E27FC236}">
-                <a16:creationId xmlns:a16="http://schemas.microsoft.com/office/drawing/2014/main" xmlns="" id="{B601820E-324C-4918-B7DA-3DF3B30D7177}"/>
+                <a16:creationId xmlns="" xmlns:a16="http://schemas.microsoft.com/office/drawing/2014/main" id="{B601820E-324C-4918-B7DA-3DF3B30D7177}"/>
               </a:ext>
             </a:extLst>
           </p:cNvPr>
@@ -1918,7 +1919,7 @@
           <p:cNvPr id="7" name="Дата 6">
             <a:extLst>
               <a:ext uri="{FF2B5EF4-FFF2-40B4-BE49-F238E27FC236}">
-                <a16:creationId xmlns:a16="http://schemas.microsoft.com/office/drawing/2014/main" xmlns="" id="{FEB7CCEF-1AF5-4D90-9D12-B2E18674841A}"/>
+                <a16:creationId xmlns="" xmlns:a16="http://schemas.microsoft.com/office/drawing/2014/main" id="{FEB7CCEF-1AF5-4D90-9D12-B2E18674841A}"/>
               </a:ext>
             </a:extLst>
           </p:cNvPr>
@@ -1947,7 +1948,7 @@
           <p:cNvPr id="8" name="Нижний колонтитул 7">
             <a:extLst>
               <a:ext uri="{FF2B5EF4-FFF2-40B4-BE49-F238E27FC236}">
-                <a16:creationId xmlns:a16="http://schemas.microsoft.com/office/drawing/2014/main" xmlns="" id="{DFE8EC3F-B291-4363-AE57-338C6D59AF0A}"/>
+                <a16:creationId xmlns="" xmlns:a16="http://schemas.microsoft.com/office/drawing/2014/main" id="{DFE8EC3F-B291-4363-AE57-338C6D59AF0A}"/>
               </a:ext>
             </a:extLst>
           </p:cNvPr>
@@ -1972,7 +1973,7 @@
           <p:cNvPr id="9" name="Номер слайда 8">
             <a:extLst>
               <a:ext uri="{FF2B5EF4-FFF2-40B4-BE49-F238E27FC236}">
-                <a16:creationId xmlns:a16="http://schemas.microsoft.com/office/drawing/2014/main" xmlns="" id="{8BD73EEC-A93E-4E71-BF4C-AE3C4F5ACC88}"/>
+                <a16:creationId xmlns="" xmlns:a16="http://schemas.microsoft.com/office/drawing/2014/main" id="{8BD73EEC-A93E-4E71-BF4C-AE3C4F5ACC88}"/>
               </a:ext>
             </a:extLst>
           </p:cNvPr>
@@ -2031,7 +2032,7 @@
           <p:cNvPr id="2" name="Заголовок 1">
             <a:extLst>
               <a:ext uri="{FF2B5EF4-FFF2-40B4-BE49-F238E27FC236}">
-                <a16:creationId xmlns:a16="http://schemas.microsoft.com/office/drawing/2014/main" xmlns="" id="{C77B30EC-2412-4D1D-8286-5C357C75B3C2}"/>
+                <a16:creationId xmlns="" xmlns:a16="http://schemas.microsoft.com/office/drawing/2014/main" id="{C77B30EC-2412-4D1D-8286-5C357C75B3C2}"/>
               </a:ext>
             </a:extLst>
           </p:cNvPr>
@@ -2059,7 +2060,7 @@
           <p:cNvPr id="3" name="Дата 2">
             <a:extLst>
               <a:ext uri="{FF2B5EF4-FFF2-40B4-BE49-F238E27FC236}">
-                <a16:creationId xmlns:a16="http://schemas.microsoft.com/office/drawing/2014/main" xmlns="" id="{5209749D-C3F2-4F8C-AF5C-DCA87E62658D}"/>
+                <a16:creationId xmlns="" xmlns:a16="http://schemas.microsoft.com/office/drawing/2014/main" id="{5209749D-C3F2-4F8C-AF5C-DCA87E62658D}"/>
               </a:ext>
             </a:extLst>
           </p:cNvPr>
@@ -2088,7 +2089,7 @@
           <p:cNvPr id="4" name="Нижний колонтитул 3">
             <a:extLst>
               <a:ext uri="{FF2B5EF4-FFF2-40B4-BE49-F238E27FC236}">
-                <a16:creationId xmlns:a16="http://schemas.microsoft.com/office/drawing/2014/main" xmlns="" id="{1655ECA3-E1A6-4FF5-A6B7-F4BBE99106A0}"/>
+                <a16:creationId xmlns="" xmlns:a16="http://schemas.microsoft.com/office/drawing/2014/main" id="{1655ECA3-E1A6-4FF5-A6B7-F4BBE99106A0}"/>
               </a:ext>
             </a:extLst>
           </p:cNvPr>
@@ -2113,7 +2114,7 @@
           <p:cNvPr id="5" name="Номер слайда 4">
             <a:extLst>
               <a:ext uri="{FF2B5EF4-FFF2-40B4-BE49-F238E27FC236}">
-                <a16:creationId xmlns:a16="http://schemas.microsoft.com/office/drawing/2014/main" xmlns="" id="{3E46AE6C-2A03-45EB-AFE6-228A3C6B0BB9}"/>
+                <a16:creationId xmlns="" xmlns:a16="http://schemas.microsoft.com/office/drawing/2014/main" id="{3E46AE6C-2A03-45EB-AFE6-228A3C6B0BB9}"/>
               </a:ext>
             </a:extLst>
           </p:cNvPr>
@@ -2172,7 +2173,7 @@
           <p:cNvPr id="2" name="Дата 1">
             <a:extLst>
               <a:ext uri="{FF2B5EF4-FFF2-40B4-BE49-F238E27FC236}">
-                <a16:creationId xmlns:a16="http://schemas.microsoft.com/office/drawing/2014/main" xmlns="" id="{6E363DB8-5BCD-4153-9B40-4FCAA572AB2B}"/>
+                <a16:creationId xmlns="" xmlns:a16="http://schemas.microsoft.com/office/drawing/2014/main" id="{6E363DB8-5BCD-4153-9B40-4FCAA572AB2B}"/>
               </a:ext>
             </a:extLst>
           </p:cNvPr>
@@ -2201,7 +2202,7 @@
           <p:cNvPr id="3" name="Нижний колонтитул 2">
             <a:extLst>
               <a:ext uri="{FF2B5EF4-FFF2-40B4-BE49-F238E27FC236}">
-                <a16:creationId xmlns:a16="http://schemas.microsoft.com/office/drawing/2014/main" xmlns="" id="{4D739E10-AADE-4AF8-9E1A-D612722DA840}"/>
+                <a16:creationId xmlns="" xmlns:a16="http://schemas.microsoft.com/office/drawing/2014/main" id="{4D739E10-AADE-4AF8-9E1A-D612722DA840}"/>
               </a:ext>
             </a:extLst>
           </p:cNvPr>
@@ -2226,7 +2227,7 @@
           <p:cNvPr id="4" name="Номер слайда 3">
             <a:extLst>
               <a:ext uri="{FF2B5EF4-FFF2-40B4-BE49-F238E27FC236}">
-                <a16:creationId xmlns:a16="http://schemas.microsoft.com/office/drawing/2014/main" xmlns="" id="{2025B663-821C-48E6-A1F8-DECB2638B0C4}"/>
+                <a16:creationId xmlns="" xmlns:a16="http://schemas.microsoft.com/office/drawing/2014/main" id="{2025B663-821C-48E6-A1F8-DECB2638B0C4}"/>
               </a:ext>
             </a:extLst>
           </p:cNvPr>
@@ -2285,7 +2286,7 @@
           <p:cNvPr id="2" name="Заголовок 1">
             <a:extLst>
               <a:ext uri="{FF2B5EF4-FFF2-40B4-BE49-F238E27FC236}">
-                <a16:creationId xmlns:a16="http://schemas.microsoft.com/office/drawing/2014/main" xmlns="" id="{C496CA23-5C0B-4DB7-93CE-09DBCFEFF8C6}"/>
+                <a16:creationId xmlns="" xmlns:a16="http://schemas.microsoft.com/office/drawing/2014/main" id="{C496CA23-5C0B-4DB7-93CE-09DBCFEFF8C6}"/>
               </a:ext>
             </a:extLst>
           </p:cNvPr>
@@ -2322,7 +2323,7 @@
           <p:cNvPr id="3" name="Объект 2">
             <a:extLst>
               <a:ext uri="{FF2B5EF4-FFF2-40B4-BE49-F238E27FC236}">
-                <a16:creationId xmlns:a16="http://schemas.microsoft.com/office/drawing/2014/main" xmlns="" id="{8FEE7C9E-835C-4E23-B7DB-CA75F982714C}"/>
+                <a16:creationId xmlns="" xmlns:a16="http://schemas.microsoft.com/office/drawing/2014/main" id="{8FEE7C9E-835C-4E23-B7DB-CA75F982714C}"/>
               </a:ext>
             </a:extLst>
           </p:cNvPr>
@@ -2412,7 +2413,7 @@
           <p:cNvPr id="4" name="Текст 3">
             <a:extLst>
               <a:ext uri="{FF2B5EF4-FFF2-40B4-BE49-F238E27FC236}">
-                <a16:creationId xmlns:a16="http://schemas.microsoft.com/office/drawing/2014/main" xmlns="" id="{D2090EC4-F236-422B-B756-70947A0143B2}"/>
+                <a16:creationId xmlns="" xmlns:a16="http://schemas.microsoft.com/office/drawing/2014/main" id="{D2090EC4-F236-422B-B756-70947A0143B2}"/>
               </a:ext>
             </a:extLst>
           </p:cNvPr>
@@ -2483,7 +2484,7 @@
           <p:cNvPr id="5" name="Дата 4">
             <a:extLst>
               <a:ext uri="{FF2B5EF4-FFF2-40B4-BE49-F238E27FC236}">
-                <a16:creationId xmlns:a16="http://schemas.microsoft.com/office/drawing/2014/main" xmlns="" id="{87A6C6C3-4A84-49AD-B57A-42BF80AC498A}"/>
+                <a16:creationId xmlns="" xmlns:a16="http://schemas.microsoft.com/office/drawing/2014/main" id="{87A6C6C3-4A84-49AD-B57A-42BF80AC498A}"/>
               </a:ext>
             </a:extLst>
           </p:cNvPr>
@@ -2512,7 +2513,7 @@
           <p:cNvPr id="6" name="Нижний колонтитул 5">
             <a:extLst>
               <a:ext uri="{FF2B5EF4-FFF2-40B4-BE49-F238E27FC236}">
-                <a16:creationId xmlns:a16="http://schemas.microsoft.com/office/drawing/2014/main" xmlns="" id="{C99DBF37-9553-454F-9B96-227B620EF42A}"/>
+                <a16:creationId xmlns="" xmlns:a16="http://schemas.microsoft.com/office/drawing/2014/main" id="{C99DBF37-9553-454F-9B96-227B620EF42A}"/>
               </a:ext>
             </a:extLst>
           </p:cNvPr>
@@ -2537,7 +2538,7 @@
           <p:cNvPr id="7" name="Номер слайда 6">
             <a:extLst>
               <a:ext uri="{FF2B5EF4-FFF2-40B4-BE49-F238E27FC236}">
-                <a16:creationId xmlns:a16="http://schemas.microsoft.com/office/drawing/2014/main" xmlns="" id="{0C384B9A-D64A-48B9-8262-42F6DDDFCE51}"/>
+                <a16:creationId xmlns="" xmlns:a16="http://schemas.microsoft.com/office/drawing/2014/main" id="{0C384B9A-D64A-48B9-8262-42F6DDDFCE51}"/>
               </a:ext>
             </a:extLst>
           </p:cNvPr>
@@ -2596,7 +2597,7 @@
           <p:cNvPr id="2" name="Заголовок 1">
             <a:extLst>
               <a:ext uri="{FF2B5EF4-FFF2-40B4-BE49-F238E27FC236}">
-                <a16:creationId xmlns:a16="http://schemas.microsoft.com/office/drawing/2014/main" xmlns="" id="{BECF3BA1-3282-407F-ADED-A57BE3CCA5BC}"/>
+                <a16:creationId xmlns="" xmlns:a16="http://schemas.microsoft.com/office/drawing/2014/main" id="{BECF3BA1-3282-407F-ADED-A57BE3CCA5BC}"/>
               </a:ext>
             </a:extLst>
           </p:cNvPr>
@@ -2633,7 +2634,7 @@
           <p:cNvPr id="3" name="Рисунок 2">
             <a:extLst>
               <a:ext uri="{FF2B5EF4-FFF2-40B4-BE49-F238E27FC236}">
-                <a16:creationId xmlns:a16="http://schemas.microsoft.com/office/drawing/2014/main" xmlns="" id="{9223AFF8-24A3-40A0-9F7C-3CCEBEFA54BB}"/>
+                <a16:creationId xmlns="" xmlns:a16="http://schemas.microsoft.com/office/drawing/2014/main" id="{9223AFF8-24A3-40A0-9F7C-3CCEBEFA54BB}"/>
               </a:ext>
             </a:extLst>
           </p:cNvPr>
@@ -2700,7 +2701,7 @@
           <p:cNvPr id="4" name="Текст 3">
             <a:extLst>
               <a:ext uri="{FF2B5EF4-FFF2-40B4-BE49-F238E27FC236}">
-                <a16:creationId xmlns:a16="http://schemas.microsoft.com/office/drawing/2014/main" xmlns="" id="{A394EA3E-EE40-4D29-8579-6302D65A891D}"/>
+                <a16:creationId xmlns="" xmlns:a16="http://schemas.microsoft.com/office/drawing/2014/main" id="{A394EA3E-EE40-4D29-8579-6302D65A891D}"/>
               </a:ext>
             </a:extLst>
           </p:cNvPr>
@@ -2771,7 +2772,7 @@
           <p:cNvPr id="5" name="Дата 4">
             <a:extLst>
               <a:ext uri="{FF2B5EF4-FFF2-40B4-BE49-F238E27FC236}">
-                <a16:creationId xmlns:a16="http://schemas.microsoft.com/office/drawing/2014/main" xmlns="" id="{5D6511DC-062C-44C6-8B25-23F0F85577C5}"/>
+                <a16:creationId xmlns="" xmlns:a16="http://schemas.microsoft.com/office/drawing/2014/main" id="{5D6511DC-062C-44C6-8B25-23F0F85577C5}"/>
               </a:ext>
             </a:extLst>
           </p:cNvPr>
@@ -2800,7 +2801,7 @@
           <p:cNvPr id="6" name="Нижний колонтитул 5">
             <a:extLst>
               <a:ext uri="{FF2B5EF4-FFF2-40B4-BE49-F238E27FC236}">
-                <a16:creationId xmlns:a16="http://schemas.microsoft.com/office/drawing/2014/main" xmlns="" id="{DB11BAAA-EB73-4CE7-AA10-385DABFF51A6}"/>
+                <a16:creationId xmlns="" xmlns:a16="http://schemas.microsoft.com/office/drawing/2014/main" id="{DB11BAAA-EB73-4CE7-AA10-385DABFF51A6}"/>
               </a:ext>
             </a:extLst>
           </p:cNvPr>
@@ -2825,7 +2826,7 @@
           <p:cNvPr id="7" name="Номер слайда 6">
             <a:extLst>
               <a:ext uri="{FF2B5EF4-FFF2-40B4-BE49-F238E27FC236}">
-                <a16:creationId xmlns:a16="http://schemas.microsoft.com/office/drawing/2014/main" xmlns="" id="{D1F3A019-7F16-45C5-A3DA-059AD954CAAA}"/>
+                <a16:creationId xmlns="" xmlns:a16="http://schemas.microsoft.com/office/drawing/2014/main" id="{D1F3A019-7F16-45C5-A3DA-059AD954CAAA}"/>
               </a:ext>
             </a:extLst>
           </p:cNvPr>
@@ -2889,7 +2890,7 @@
           <p:cNvPr id="2" name="Заголовок 1">
             <a:extLst>
               <a:ext uri="{FF2B5EF4-FFF2-40B4-BE49-F238E27FC236}">
-                <a16:creationId xmlns:a16="http://schemas.microsoft.com/office/drawing/2014/main" xmlns="" id="{CE3D1D10-30B1-4069-817F-B25A94DDC133}"/>
+                <a16:creationId xmlns="" xmlns:a16="http://schemas.microsoft.com/office/drawing/2014/main" id="{CE3D1D10-30B1-4069-817F-B25A94DDC133}"/>
               </a:ext>
             </a:extLst>
           </p:cNvPr>
@@ -2927,7 +2928,7 @@
           <p:cNvPr id="3" name="Текст 2">
             <a:extLst>
               <a:ext uri="{FF2B5EF4-FFF2-40B4-BE49-F238E27FC236}">
-                <a16:creationId xmlns:a16="http://schemas.microsoft.com/office/drawing/2014/main" xmlns="" id="{90823816-92D9-43AF-A567-9DD33448866B}"/>
+                <a16:creationId xmlns="" xmlns:a16="http://schemas.microsoft.com/office/drawing/2014/main" id="{90823816-92D9-43AF-A567-9DD33448866B}"/>
               </a:ext>
             </a:extLst>
           </p:cNvPr>
@@ -2994,7 +2995,7 @@
           <p:cNvPr id="4" name="Дата 3">
             <a:extLst>
               <a:ext uri="{FF2B5EF4-FFF2-40B4-BE49-F238E27FC236}">
-                <a16:creationId xmlns:a16="http://schemas.microsoft.com/office/drawing/2014/main" xmlns="" id="{5908663A-FB0E-4F9B-9027-8DE45EAA9013}"/>
+                <a16:creationId xmlns="" xmlns:a16="http://schemas.microsoft.com/office/drawing/2014/main" id="{5908663A-FB0E-4F9B-9027-8DE45EAA9013}"/>
               </a:ext>
             </a:extLst>
           </p:cNvPr>
@@ -3041,7 +3042,7 @@
           <p:cNvPr id="5" name="Нижний колонтитул 4">
             <a:extLst>
               <a:ext uri="{FF2B5EF4-FFF2-40B4-BE49-F238E27FC236}">
-                <a16:creationId xmlns:a16="http://schemas.microsoft.com/office/drawing/2014/main" xmlns="" id="{BDAF1F9F-A56A-46C2-AF2B-1727A4B730B3}"/>
+                <a16:creationId xmlns="" xmlns:a16="http://schemas.microsoft.com/office/drawing/2014/main" id="{BDAF1F9F-A56A-46C2-AF2B-1727A4B730B3}"/>
               </a:ext>
             </a:extLst>
           </p:cNvPr>
@@ -3084,7 +3085,7 @@
           <p:cNvPr id="6" name="Номер слайда 5">
             <a:extLst>
               <a:ext uri="{FF2B5EF4-FFF2-40B4-BE49-F238E27FC236}">
-                <a16:creationId xmlns:a16="http://schemas.microsoft.com/office/drawing/2014/main" xmlns="" id="{0C1D5F58-978A-4A4C-A8B7-25F1A545A3DA}"/>
+                <a16:creationId xmlns="" xmlns:a16="http://schemas.microsoft.com/office/drawing/2014/main" id="{0C1D5F58-978A-4A4C-A8B7-25F1A545A3DA}"/>
               </a:ext>
             </a:extLst>
           </p:cNvPr>
@@ -3452,7 +3453,7 @@
           <p:cNvPr id="2" name="Заголовок 1">
             <a:extLst>
               <a:ext uri="{FF2B5EF4-FFF2-40B4-BE49-F238E27FC236}">
-                <a16:creationId xmlns:a16="http://schemas.microsoft.com/office/drawing/2014/main" xmlns="" id="{A57E77A9-FC28-40B1-9404-503D58E5E643}"/>
+                <a16:creationId xmlns="" xmlns:a16="http://schemas.microsoft.com/office/drawing/2014/main" id="{A57E77A9-FC28-40B1-9404-503D58E5E643}"/>
               </a:ext>
             </a:extLst>
           </p:cNvPr>
@@ -3494,7 +3495,7 @@
           <p:cNvPr id="3" name="Подзаголовок 2">
             <a:extLst>
               <a:ext uri="{FF2B5EF4-FFF2-40B4-BE49-F238E27FC236}">
-                <a16:creationId xmlns:a16="http://schemas.microsoft.com/office/drawing/2014/main" xmlns="" id="{B4D9919D-3207-4D55-B6F1-407A692B7645}"/>
+                <a16:creationId xmlns="" xmlns:a16="http://schemas.microsoft.com/office/drawing/2014/main" id="{B4D9919D-3207-4D55-B6F1-407A692B7645}"/>
               </a:ext>
             </a:extLst>
           </p:cNvPr>
@@ -3565,6 +3566,150 @@
     <p:extLst>
       <p:ext uri="{BB962C8B-B14F-4D97-AF65-F5344CB8AC3E}">
         <p14:creationId xmlns:p14="http://schemas.microsoft.com/office/powerpoint/2010/main" val="1518799690"/>
+      </p:ext>
+    </p:extLst>
+  </p:cSld>
+  <p:clrMapOvr>
+    <a:masterClrMapping/>
+  </p:clrMapOvr>
+</p:sld>
+</file>
+
+<file path=ppt/slides/slide10.xml><?xml version="1.0" encoding="utf-8"?>
+<p:sld xmlns:a="http://schemas.openxmlformats.org/drawingml/2006/main" xmlns:r="http://schemas.openxmlformats.org/officeDocument/2006/relationships" xmlns:p="http://schemas.openxmlformats.org/presentationml/2006/main">
+  <p:cSld>
+    <p:spTree>
+      <p:nvGrpSpPr>
+        <p:cNvPr id="1" name=""/>
+        <p:cNvGrpSpPr/>
+        <p:nvPr/>
+      </p:nvGrpSpPr>
+      <p:grpSpPr>
+        <a:xfrm>
+          <a:off x="0" y="0"/>
+          <a:ext cx="0" cy="0"/>
+          <a:chOff x="0" y="0"/>
+          <a:chExt cx="0" cy="0"/>
+        </a:xfrm>
+      </p:grpSpPr>
+      <p:sp>
+        <p:nvSpPr>
+          <p:cNvPr id="2" name="Заголовок 1">
+            <a:extLst>
+              <a:ext uri="{FF2B5EF4-FFF2-40B4-BE49-F238E27FC236}">
+                <a16:creationId xmlns="" xmlns:a16="http://schemas.microsoft.com/office/drawing/2014/main" id="{3BDA58FE-3AD5-4A37-8347-C89BF167F9EE}"/>
+              </a:ext>
+            </a:extLst>
+          </p:cNvPr>
+          <p:cNvSpPr>
+            <a:spLocks noGrp="1"/>
+          </p:cNvSpPr>
+          <p:nvPr>
+            <p:ph type="title"/>
+          </p:nvPr>
+        </p:nvSpPr>
+        <p:spPr/>
+        <p:txBody>
+          <a:bodyPr>
+            <a:normAutofit/>
+          </a:bodyPr>
+          <a:lstStyle/>
+          <a:p>
+            <a:pPr algn="ctr"/>
+            <a:r>
+              <a:rPr lang="ru-RU" sz="5400" dirty="0">
+                <a:cs typeface="Times New Roman" panose="02020603050405020304" pitchFamily="18" charset="0"/>
+              </a:rPr>
+              <a:t>Результаты</a:t>
+            </a:r>
+          </a:p>
+        </p:txBody>
+      </p:sp>
+      <p:sp>
+        <p:nvSpPr>
+          <p:cNvPr id="3" name="Объект 2">
+            <a:extLst>
+              <a:ext uri="{FF2B5EF4-FFF2-40B4-BE49-F238E27FC236}">
+                <a16:creationId xmlns="" xmlns:a16="http://schemas.microsoft.com/office/drawing/2014/main" id="{F556C1E0-7929-4E3F-BB59-F5DF4190D231}"/>
+              </a:ext>
+            </a:extLst>
+          </p:cNvPr>
+          <p:cNvSpPr>
+            <a:spLocks noGrp="1"/>
+          </p:cNvSpPr>
+          <p:nvPr>
+            <p:ph idx="1"/>
+          </p:nvPr>
+        </p:nvSpPr>
+        <p:spPr/>
+        <p:txBody>
+          <a:bodyPr vert="horz" lIns="91440" tIns="45720" rIns="91440" bIns="45720" rtlCol="0" anchor="t">
+            <a:normAutofit/>
+          </a:bodyPr>
+          <a:lstStyle/>
+          <a:p>
+            <a:r>
+              <a:rPr lang="ru-RU" dirty="0" smtClean="0">
+                <a:cs typeface="Times New Roman" panose="02020603050405020304" pitchFamily="18" charset="0"/>
+              </a:rPr>
+              <a:t>Реализована </a:t>
+            </a:r>
+            <a:r>
+              <a:rPr lang="ru-RU" dirty="0">
+                <a:cs typeface="Times New Roman" panose="02020603050405020304" pitchFamily="18" charset="0"/>
+              </a:rPr>
+              <a:t>возможность добавления плагинов</a:t>
+            </a:r>
+          </a:p>
+          <a:p>
+            <a:r>
+              <a:rPr lang="ru-RU" dirty="0">
+                <a:cs typeface="Times New Roman" panose="02020603050405020304" pitchFamily="18" charset="0"/>
+              </a:rPr>
+              <a:t>Предоставлена возможность редактировать свойства </a:t>
+            </a:r>
+            <a:r>
+              <a:rPr lang="ru-RU" dirty="0" smtClean="0">
+                <a:cs typeface="Times New Roman" panose="02020603050405020304" pitchFamily="18" charset="0"/>
+              </a:rPr>
+              <a:t>объектов</a:t>
+            </a:r>
+          </a:p>
+          <a:p>
+            <a:r>
+              <a:rPr lang="ru-RU" dirty="0" smtClean="0">
+                <a:cs typeface="Times New Roman" panose="02020603050405020304" pitchFamily="18" charset="0"/>
+              </a:rPr>
+              <a:t>Предоставлена возможность создавать объекты </a:t>
+            </a:r>
+            <a:r>
+              <a:rPr lang="en-US" dirty="0">
+                <a:cs typeface="Times New Roman" panose="02020603050405020304" pitchFamily="18" charset="0"/>
+              </a:rPr>
+              <a:t>d</a:t>
+            </a:r>
+            <a:r>
+              <a:rPr lang="en-US" dirty="0" smtClean="0">
+                <a:cs typeface="Times New Roman" panose="02020603050405020304" pitchFamily="18" charset="0"/>
+              </a:rPr>
+              <a:t>rag-n-drop’</a:t>
+            </a:r>
+            <a:r>
+              <a:rPr lang="ru-RU" dirty="0" smtClean="0">
+                <a:cs typeface="Times New Roman" panose="02020603050405020304" pitchFamily="18" charset="0"/>
+              </a:rPr>
+              <a:t>ом</a:t>
+            </a:r>
+            <a:endParaRPr lang="ru-RU" dirty="0">
+              <a:cs typeface="Times New Roman" panose="02020603050405020304" pitchFamily="18" charset="0"/>
+            </a:endParaRPr>
+          </a:p>
+        </p:txBody>
+      </p:sp>
+    </p:spTree>
+    <p:extLst>
+      <p:ext uri="{BB962C8B-B14F-4D97-AF65-F5344CB8AC3E}">
+        <p14:creationId xmlns:p14="http://schemas.microsoft.com/office/powerpoint/2010/main" val="1891035315"/>
       </p:ext>
     </p:extLst>
   </p:cSld>
@@ -3596,7 +3741,7 @@
           <p:cNvPr id="2" name="Заголовок 1">
             <a:extLst>
               <a:ext uri="{FF2B5EF4-FFF2-40B4-BE49-F238E27FC236}">
-                <a16:creationId xmlns:a16="http://schemas.microsoft.com/office/drawing/2014/main" xmlns="" id="{3883AE69-0FC9-4A70-8484-BDEBA005C983}"/>
+                <a16:creationId xmlns="" xmlns:a16="http://schemas.microsoft.com/office/drawing/2014/main" id="{3883AE69-0FC9-4A70-8484-BDEBA005C983}"/>
               </a:ext>
             </a:extLst>
           </p:cNvPr>
@@ -3629,7 +3774,7 @@
           <p:cNvPr id="3" name="Объект 2">
             <a:extLst>
               <a:ext uri="{FF2B5EF4-FFF2-40B4-BE49-F238E27FC236}">
-                <a16:creationId xmlns:a16="http://schemas.microsoft.com/office/drawing/2014/main" xmlns="" id="{F9D58FBF-75CE-415D-A979-FFA765EB5B4A}"/>
+                <a16:creationId xmlns="" xmlns:a16="http://schemas.microsoft.com/office/drawing/2014/main" id="{F9D58FBF-75CE-415D-A979-FFA765EB5B4A}"/>
               </a:ext>
             </a:extLst>
           </p:cNvPr>
@@ -3729,7 +3874,7 @@
           <p:cNvPr id="2" name="Заголовок 1">
             <a:extLst>
               <a:ext uri="{FF2B5EF4-FFF2-40B4-BE49-F238E27FC236}">
-                <a16:creationId xmlns:a16="http://schemas.microsoft.com/office/drawing/2014/main" xmlns="" id="{5FEE7F63-D9D3-407F-8E4F-7E446C1F196D}"/>
+                <a16:creationId xmlns="" xmlns:a16="http://schemas.microsoft.com/office/drawing/2014/main" id="{5FEE7F63-D9D3-407F-8E4F-7E446C1F196D}"/>
               </a:ext>
             </a:extLst>
           </p:cNvPr>
@@ -3762,7 +3907,7 @@
           <p:cNvPr id="3" name="Объект 2">
             <a:extLst>
               <a:ext uri="{FF2B5EF4-FFF2-40B4-BE49-F238E27FC236}">
-                <a16:creationId xmlns:a16="http://schemas.microsoft.com/office/drawing/2014/main" xmlns="" id="{EDB8B475-7563-474C-BC26-1A5A0ECA4B3D}"/>
+                <a16:creationId xmlns="" xmlns:a16="http://schemas.microsoft.com/office/drawing/2014/main" id="{EDB8B475-7563-474C-BC26-1A5A0ECA4B3D}"/>
               </a:ext>
             </a:extLst>
           </p:cNvPr>
@@ -3883,10 +4028,66 @@
       </p:grpSpPr>
       <p:sp>
         <p:nvSpPr>
+          <p:cNvPr id="2" name="Заголовок 1"/>
+          <p:cNvSpPr>
+            <a:spLocks noGrp="1"/>
+          </p:cNvSpPr>
+          <p:nvPr>
+            <p:ph type="title"/>
+          </p:nvPr>
+        </p:nvSpPr>
+        <p:spPr/>
+        <p:txBody>
+          <a:bodyPr>
+            <a:normAutofit/>
+          </a:bodyPr>
+          <a:lstStyle/>
+          <a:p>
+            <a:pPr algn="ctr"/>
+            <a:r>
+              <a:rPr lang="ru-RU" sz="5400" dirty="0" smtClean="0"/>
+              <a:t>Общая архитектура</a:t>
+            </a:r>
+            <a:endParaRPr lang="ru-RU" sz="5400" dirty="0"/>
+          </a:p>
+        </p:txBody>
+      </p:sp>
+    </p:spTree>
+    <p:extLst>
+      <p:ext uri="{BB962C8B-B14F-4D97-AF65-F5344CB8AC3E}">
+        <p14:creationId xmlns:p14="http://schemas.microsoft.com/office/powerpoint/2010/main" val="1318574655"/>
+      </p:ext>
+    </p:extLst>
+  </p:cSld>
+  <p:clrMapOvr>
+    <a:masterClrMapping/>
+  </p:clrMapOvr>
+</p:sld>
+</file>
+
+<file path=ppt/slides/slide5.xml><?xml version="1.0" encoding="utf-8"?>
+<p:sld xmlns:a="http://schemas.openxmlformats.org/drawingml/2006/main" xmlns:r="http://schemas.openxmlformats.org/officeDocument/2006/relationships" xmlns:p="http://schemas.openxmlformats.org/presentationml/2006/main">
+  <p:cSld>
+    <p:spTree>
+      <p:nvGrpSpPr>
+        <p:cNvPr id="1" name=""/>
+        <p:cNvGrpSpPr/>
+        <p:nvPr/>
+      </p:nvGrpSpPr>
+      <p:grpSpPr>
+        <a:xfrm>
+          <a:off x="0" y="0"/>
+          <a:ext cx="0" cy="0"/>
+          <a:chOff x="0" y="0"/>
+          <a:chExt cx="0" cy="0"/>
+        </a:xfrm>
+      </p:grpSpPr>
+      <p:sp>
+        <p:nvSpPr>
           <p:cNvPr id="2" name="Заголовок 1">
             <a:extLst>
               <a:ext uri="{FF2B5EF4-FFF2-40B4-BE49-F238E27FC236}">
-                <a16:creationId xmlns:a16="http://schemas.microsoft.com/office/drawing/2014/main" xmlns="" id="{E19E78BF-FD8D-447D-B0EF-E4CF3C5D31B2}"/>
+                <a16:creationId xmlns="" xmlns:a16="http://schemas.microsoft.com/office/drawing/2014/main" id="{E19E78BF-FD8D-447D-B0EF-E4CF3C5D31B2}"/>
               </a:ext>
             </a:extLst>
           </p:cNvPr>
@@ -3919,7 +4120,7 @@
           <p:cNvPr id="3" name="Объект 2">
             <a:extLst>
               <a:ext uri="{FF2B5EF4-FFF2-40B4-BE49-F238E27FC236}">
-                <a16:creationId xmlns:a16="http://schemas.microsoft.com/office/drawing/2014/main" xmlns="" id="{0CBA654F-1437-40F1-9D51-363851E0425C}"/>
+                <a16:creationId xmlns="" xmlns:a16="http://schemas.microsoft.com/office/drawing/2014/main" id="{0CBA654F-1437-40F1-9D51-363851E0425C}"/>
               </a:ext>
             </a:extLst>
           </p:cNvPr>
@@ -4062,7 +4263,7 @@
 </p:sld>
 </file>
 
-<file path=ppt/slides/slide5.xml><?xml version="1.0" encoding="utf-8"?>
+<file path=ppt/slides/slide6.xml><?xml version="1.0" encoding="utf-8"?>
 <p:sld xmlns:a="http://schemas.openxmlformats.org/drawingml/2006/main" xmlns:r="http://schemas.openxmlformats.org/officeDocument/2006/relationships" xmlns:p="http://schemas.openxmlformats.org/presentationml/2006/main">
   <p:cSld>
     <p:spTree>
@@ -4186,7 +4387,7 @@
 </p:sld>
 </file>
 
-<file path=ppt/slides/slide6.xml><?xml version="1.0" encoding="utf-8"?>
+<file path=ppt/slides/slide7.xml><?xml version="1.0" encoding="utf-8"?>
 <p:sld xmlns:a="http://schemas.openxmlformats.org/drawingml/2006/main" xmlns:r="http://schemas.openxmlformats.org/officeDocument/2006/relationships" xmlns:p="http://schemas.openxmlformats.org/presentationml/2006/main">
   <p:cSld>
     <p:spTree>
@@ -4231,7 +4432,7 @@
       </p:sp>
       <p:pic>
         <p:nvPicPr>
-          <p:cNvPr id="4098" name="Picture 2"/>
+          <p:cNvPr id="1026" name="Picture 2"/>
           <p:cNvPicPr>
             <a:picLocks noChangeAspect="1" noChangeArrowheads="1"/>
           </p:cNvPicPr>
@@ -4252,8 +4453,8 @@
         </p:blipFill>
         <p:spPr bwMode="auto">
           <a:xfrm>
-            <a:off x="2168768" y="1512275"/>
-            <a:ext cx="7877909" cy="4923693"/>
+            <a:off x="1802494" y="1495203"/>
+            <a:ext cx="8342992" cy="5215159"/>
           </a:xfrm>
           <a:prstGeom prst="rect">
             <a:avLst/>
@@ -4306,7 +4507,7 @@
 </p:sld>
 </file>
 
-<file path=ppt/slides/slide7.xml><?xml version="1.0" encoding="utf-8"?>
+<file path=ppt/slides/slide8.xml><?xml version="1.0" encoding="utf-8"?>
 <p:sld xmlns:a="http://schemas.openxmlformats.org/drawingml/2006/main" xmlns:r="http://schemas.openxmlformats.org/officeDocument/2006/relationships" xmlns:p="http://schemas.openxmlformats.org/presentationml/2006/main">
   <p:cSld>
     <p:spTree>
@@ -4351,13 +4552,13 @@
       </p:sp>
       <p:pic>
         <p:nvPicPr>
-          <p:cNvPr id="5122" name="Picture 2"/>
+          <p:cNvPr id="2050" name="Picture 2"/>
           <p:cNvPicPr>
             <a:picLocks noChangeAspect="1" noChangeArrowheads="1"/>
           </p:cNvPicPr>
           <p:nvPr/>
         </p:nvPicPr>
-        <p:blipFill rotWithShape="1">
+        <p:blipFill>
           <a:blip r:embed="rId2">
             <a:extLst>
               <a:ext uri="{28A0092B-C50C-407E-A947-70E740481C1C}">
@@ -4365,13 +4566,15 @@
               </a:ext>
             </a:extLst>
           </a:blip>
-          <a:srcRect l="44937"/>
-          <a:stretch/>
+          <a:srcRect/>
+          <a:stretch>
+            <a:fillRect/>
+          </a:stretch>
         </p:blipFill>
         <p:spPr bwMode="auto">
           <a:xfrm>
-            <a:off x="1031630" y="1770187"/>
-            <a:ext cx="4079628" cy="4630614"/>
+            <a:off x="7329715" y="1776650"/>
+            <a:ext cx="3817256" cy="4781308"/>
           </a:xfrm>
           <a:prstGeom prst="rect">
             <a:avLst/>
@@ -4413,13 +4616,13 @@
       </p:pic>
       <p:pic>
         <p:nvPicPr>
-          <p:cNvPr id="5123" name="Picture 3"/>
+          <p:cNvPr id="2051" name="Picture 3"/>
           <p:cNvPicPr>
             <a:picLocks noChangeAspect="1" noChangeArrowheads="1"/>
           </p:cNvPicPr>
           <p:nvPr/>
         </p:nvPicPr>
-        <p:blipFill rotWithShape="1">
+        <p:blipFill>
           <a:blip r:embed="rId3">
             <a:extLst>
               <a:ext uri="{28A0092B-C50C-407E-A947-70E740481C1C}">
@@ -4427,13 +4630,15 @@
               </a:ext>
             </a:extLst>
           </a:blip>
-          <a:srcRect l="50000"/>
-          <a:stretch/>
+          <a:srcRect/>
+          <a:stretch>
+            <a:fillRect/>
+          </a:stretch>
         </p:blipFill>
         <p:spPr bwMode="auto">
           <a:xfrm>
-            <a:off x="7549663" y="1726226"/>
-            <a:ext cx="3739660" cy="4674575"/>
+            <a:off x="802821" y="1776651"/>
+            <a:ext cx="4220536" cy="4781308"/>
           </a:xfrm>
           <a:prstGeom prst="rect">
             <a:avLst/>
@@ -4486,117 +4691,6 @@
 </p:sld>
 </file>
 
-<file path=ppt/slides/slide8.xml><?xml version="1.0" encoding="utf-8"?>
-<p:sld xmlns:a="http://schemas.openxmlformats.org/drawingml/2006/main" xmlns:r="http://schemas.openxmlformats.org/officeDocument/2006/relationships" xmlns:p="http://schemas.openxmlformats.org/presentationml/2006/main">
-  <p:cSld>
-    <p:spTree>
-      <p:nvGrpSpPr>
-        <p:cNvPr id="1" name=""/>
-        <p:cNvGrpSpPr/>
-        <p:nvPr/>
-      </p:nvGrpSpPr>
-      <p:grpSpPr>
-        <a:xfrm>
-          <a:off x="0" y="0"/>
-          <a:ext cx="0" cy="0"/>
-          <a:chOff x="0" y="0"/>
-          <a:chExt cx="0" cy="0"/>
-        </a:xfrm>
-      </p:grpSpPr>
-      <p:sp>
-        <p:nvSpPr>
-          <p:cNvPr id="2" name="Заголовок 1"/>
-          <p:cNvSpPr>
-            <a:spLocks noGrp="1"/>
-          </p:cNvSpPr>
-          <p:nvPr>
-            <p:ph type="title"/>
-          </p:nvPr>
-        </p:nvSpPr>
-        <p:spPr/>
-        <p:txBody>
-          <a:bodyPr>
-            <a:normAutofit/>
-          </a:bodyPr>
-          <a:lstStyle/>
-          <a:p>
-            <a:pPr algn="ctr"/>
-            <a:r>
-              <a:rPr lang="ru-RU" sz="5400" dirty="0" smtClean="0"/>
-              <a:t>Технические средства</a:t>
-            </a:r>
-            <a:endParaRPr lang="ru-RU" sz="5400" dirty="0"/>
-          </a:p>
-        </p:txBody>
-      </p:sp>
-      <p:sp>
-        <p:nvSpPr>
-          <p:cNvPr id="3" name="Объект 2"/>
-          <p:cNvSpPr>
-            <a:spLocks noGrp="1"/>
-          </p:cNvSpPr>
-          <p:nvPr>
-            <p:ph idx="1"/>
-          </p:nvPr>
-        </p:nvSpPr>
-        <p:spPr/>
-        <p:txBody>
-          <a:bodyPr/>
-          <a:lstStyle/>
-          <a:p>
-            <a:r>
-              <a:rPr lang="en-US" dirty="0" err="1" smtClean="0"/>
-              <a:t>GitHub</a:t>
-            </a:r>
-            <a:endParaRPr lang="en-US" dirty="0" smtClean="0"/>
-          </a:p>
-          <a:p>
-            <a:r>
-              <a:rPr lang="en-US" dirty="0" err="1" smtClean="0"/>
-              <a:t>GitHub</a:t>
-            </a:r>
-            <a:r>
-              <a:rPr lang="en-US" dirty="0" smtClean="0"/>
-              <a:t> Projects</a:t>
-            </a:r>
-          </a:p>
-          <a:p>
-            <a:r>
-              <a:rPr lang="en-US" dirty="0" err="1" smtClean="0"/>
-              <a:t>Gitter</a:t>
-            </a:r>
-            <a:endParaRPr lang="en-US" dirty="0" smtClean="0"/>
-          </a:p>
-          <a:p>
-            <a:r>
-              <a:rPr lang="en-US" dirty="0" smtClean="0"/>
-              <a:t>Travis CI &amp; </a:t>
-            </a:r>
-            <a:r>
-              <a:rPr lang="en-US" dirty="0" err="1" smtClean="0"/>
-              <a:t>AppVeyor</a:t>
-            </a:r>
-            <a:r>
-              <a:rPr lang="en-US" dirty="0" smtClean="0"/>
-              <a:t> CI</a:t>
-            </a:r>
-            <a:endParaRPr lang="ru-RU" dirty="0"/>
-          </a:p>
-        </p:txBody>
-      </p:sp>
-    </p:spTree>
-    <p:extLst>
-      <p:ext uri="{BB962C8B-B14F-4D97-AF65-F5344CB8AC3E}">
-        <p14:creationId xmlns:p14="http://schemas.microsoft.com/office/powerpoint/2010/main" val="2997512538"/>
-      </p:ext>
-    </p:extLst>
-  </p:cSld>
-  <p:clrMapOvr>
-    <a:masterClrMapping/>
-  </p:clrMapOvr>
-</p:sld>
-</file>
-
 <file path=ppt/slides/slide9.xml><?xml version="1.0" encoding="utf-8"?>
 <p:sld xmlns:a="http://schemas.openxmlformats.org/drawingml/2006/main" xmlns:r="http://schemas.openxmlformats.org/officeDocument/2006/relationships" xmlns:p="http://schemas.openxmlformats.org/presentationml/2006/main">
   <p:cSld>
@@ -4616,13 +4710,7 @@
       </p:grpSpPr>
       <p:sp>
         <p:nvSpPr>
-          <p:cNvPr id="2" name="Заголовок 1">
-            <a:extLst>
-              <a:ext uri="{FF2B5EF4-FFF2-40B4-BE49-F238E27FC236}">
-                <a16:creationId xmlns:a16="http://schemas.microsoft.com/office/drawing/2014/main" xmlns="" id="{3BDA58FE-3AD5-4A37-8347-C89BF167F9EE}"/>
-              </a:ext>
-            </a:extLst>
-          </p:cNvPr>
+          <p:cNvPr id="2" name="Заголовок 1"/>
           <p:cNvSpPr>
             <a:spLocks noGrp="1"/>
           </p:cNvSpPr>
@@ -4639,23 +4727,16 @@
           <a:p>
             <a:pPr algn="ctr"/>
             <a:r>
-              <a:rPr lang="ru-RU" sz="5400" dirty="0">
-                <a:cs typeface="Times New Roman" panose="02020603050405020304" pitchFamily="18" charset="0"/>
-              </a:rPr>
-              <a:t>Результаты</a:t>
-            </a:r>
-          </a:p>
-        </p:txBody>
-      </p:sp>
-      <p:sp>
-        <p:nvSpPr>
-          <p:cNvPr id="3" name="Объект 2">
-            <a:extLst>
-              <a:ext uri="{FF2B5EF4-FFF2-40B4-BE49-F238E27FC236}">
-                <a16:creationId xmlns:a16="http://schemas.microsoft.com/office/drawing/2014/main" xmlns="" id="{F556C1E0-7929-4E3F-BB59-F5DF4190D231}"/>
-              </a:ext>
-            </a:extLst>
-          </p:cNvPr>
+              <a:rPr lang="ru-RU" sz="5400" dirty="0" smtClean="0"/>
+              <a:t>Технические средства</a:t>
+            </a:r>
+            <a:endParaRPr lang="ru-RU" sz="5400" dirty="0"/>
+          </a:p>
+        </p:txBody>
+      </p:sp>
+      <p:sp>
+        <p:nvSpPr>
+          <p:cNvPr id="3" name="Объект 2"/>
           <p:cNvSpPr>
             <a:spLocks noGrp="1"/>
           </p:cNvSpPr>
@@ -4665,87 +4746,53 @@
         </p:nvSpPr>
         <p:spPr/>
         <p:txBody>
-          <a:bodyPr vert="horz" lIns="91440" tIns="45720" rIns="91440" bIns="45720" rtlCol="0" anchor="t">
-            <a:normAutofit/>
-          </a:bodyPr>
-          <a:lstStyle/>
-          <a:p>
-            <a:r>
-              <a:rPr lang="ru-RU" dirty="0">
-                <a:cs typeface="Times New Roman" panose="02020603050405020304" pitchFamily="18" charset="0"/>
-              </a:rPr>
-              <a:t>Реализованы основные компоненты графического редактора, поддержка части </a:t>
-            </a:r>
-            <a:r>
-              <a:rPr lang="ru-RU" dirty="0" err="1">
-                <a:cs typeface="Times New Roman" panose="02020603050405020304" pitchFamily="18" charset="0"/>
-              </a:rPr>
-              <a:t>графовых</a:t>
-            </a:r>
-            <a:r>
-              <a:rPr lang="ru-RU" dirty="0">
-                <a:cs typeface="Times New Roman" panose="02020603050405020304" pitchFamily="18" charset="0"/>
-              </a:rPr>
-              <a:t> языков</a:t>
-            </a:r>
-          </a:p>
-          <a:p>
-            <a:r>
-              <a:rPr lang="ru-RU" dirty="0">
-                <a:cs typeface="Times New Roman" panose="02020603050405020304" pitchFamily="18" charset="0"/>
-              </a:rPr>
-              <a:t>Реализована возможность добавления плагинов</a:t>
-            </a:r>
-          </a:p>
-          <a:p>
-            <a:r>
-              <a:rPr lang="ru-RU" dirty="0">
-                <a:cs typeface="Times New Roman" panose="02020603050405020304" pitchFamily="18" charset="0"/>
-              </a:rPr>
-              <a:t>Предоставлена возможность редактировать свойства </a:t>
-            </a:r>
-            <a:r>
-              <a:rPr lang="ru-RU" dirty="0" smtClean="0">
-                <a:cs typeface="Times New Roman" panose="02020603050405020304" pitchFamily="18" charset="0"/>
-              </a:rPr>
-              <a:t>объектов</a:t>
-            </a:r>
-          </a:p>
-          <a:p>
-            <a:r>
-              <a:rPr lang="ru-RU" dirty="0" smtClean="0">
-                <a:cs typeface="Times New Roman" panose="02020603050405020304" pitchFamily="18" charset="0"/>
-              </a:rPr>
-              <a:t>Предоставлена возможность создавать объекты </a:t>
-            </a:r>
-            <a:r>
-              <a:rPr lang="en-US" dirty="0">
-                <a:cs typeface="Times New Roman" panose="02020603050405020304" pitchFamily="18" charset="0"/>
-              </a:rPr>
-              <a:t>d</a:t>
-            </a:r>
-            <a:r>
-              <a:rPr lang="en-US" dirty="0" smtClean="0">
-                <a:cs typeface="Times New Roman" panose="02020603050405020304" pitchFamily="18" charset="0"/>
-              </a:rPr>
-              <a:t>rag-n-drop’</a:t>
-            </a:r>
-            <a:r>
-              <a:rPr lang="ru-RU" dirty="0" smtClean="0">
-                <a:cs typeface="Times New Roman" panose="02020603050405020304" pitchFamily="18" charset="0"/>
-              </a:rPr>
-              <a:t>ом</a:t>
-            </a:r>
-            <a:endParaRPr lang="ru-RU" dirty="0">
-              <a:cs typeface="Times New Roman" panose="02020603050405020304" pitchFamily="18" charset="0"/>
-            </a:endParaRPr>
+          <a:bodyPr/>
+          <a:lstStyle/>
+          <a:p>
+            <a:r>
+              <a:rPr lang="en-US" dirty="0" err="1" smtClean="0"/>
+              <a:t>GitHub</a:t>
+            </a:r>
+            <a:endParaRPr lang="en-US" dirty="0" smtClean="0"/>
+          </a:p>
+          <a:p>
+            <a:r>
+              <a:rPr lang="en-US" dirty="0" err="1" smtClean="0"/>
+              <a:t>GitHub</a:t>
+            </a:r>
+            <a:r>
+              <a:rPr lang="en-US" dirty="0" smtClean="0"/>
+              <a:t> Projects</a:t>
+            </a:r>
+          </a:p>
+          <a:p>
+            <a:r>
+              <a:rPr lang="en-US" dirty="0" err="1" smtClean="0"/>
+              <a:t>Gitter</a:t>
+            </a:r>
+            <a:endParaRPr lang="en-US" dirty="0" smtClean="0"/>
+          </a:p>
+          <a:p>
+            <a:r>
+              <a:rPr lang="en-US" dirty="0" smtClean="0"/>
+              <a:t>Travis CI &amp; </a:t>
+            </a:r>
+            <a:r>
+              <a:rPr lang="en-US" dirty="0" err="1" smtClean="0"/>
+              <a:t>AppVeyor</a:t>
+            </a:r>
+            <a:r>
+              <a:rPr lang="en-US" dirty="0" smtClean="0"/>
+              <a:t> CI</a:t>
+            </a:r>
+            <a:endParaRPr lang="ru-RU" dirty="0"/>
           </a:p>
         </p:txBody>
       </p:sp>
     </p:spTree>
     <p:extLst>
       <p:ext uri="{BB962C8B-B14F-4D97-AF65-F5344CB8AC3E}">
-        <p14:creationId xmlns:p14="http://schemas.microsoft.com/office/powerpoint/2010/main" val="1891035315"/>
+        <p14:creationId xmlns:p14="http://schemas.microsoft.com/office/powerpoint/2010/main" val="2997512538"/>
       </p:ext>
     </p:extLst>
   </p:cSld>
@@ -5044,7 +5091,7 @@
   <a:extraClrSchemeLst/>
   <a:extLst>
     <a:ext uri="{05A4C25C-085E-4340-85A3-A5531E510DB2}">
-      <thm15:themeFamily xmlns:thm15="http://schemas.microsoft.com/office/thememl/2012/main" xmlns="" name="Office Theme" id="{62F939B6-93AF-4DB8-9C6B-D6C7DFDC589F}" vid="{4A3C46E8-61CC-4603-A589-7422A47A8E4A}"/>
+      <thm15:themeFamily xmlns="" xmlns:thm15="http://schemas.microsoft.com/office/thememl/2012/main" name="Office Theme" id="{62F939B6-93AF-4DB8-9C6B-D6C7DFDC589F}" vid="{4A3C46E8-61CC-4603-A589-7422A47A8E4A}"/>
     </a:ext>
   </a:extLst>
 </a:theme>

</xml_diff>

<commit_message>
"Task" instead of "project" (cause we did only a small part of all project)
</commit_message>
<xml_diff>
--- a/REAL.NET.pptx
+++ b/REAL.NET.pptx
@@ -115,7 +115,18 @@
   </p:defaultTextStyle>
   <p:extLst>
     <p:ext uri="{EFAFB233-063F-42B5-8137-9DF3F51BA10A}">
-      <p15:sldGuideLst xmlns="" xmlns:p15="http://schemas.microsoft.com/office/powerpoint/2012/main"/>
+      <p15:sldGuideLst xmlns:p15="http://schemas.microsoft.com/office/powerpoint/2012/main">
+        <p15:guide id="1" orient="horz" pos="2160">
+          <p15:clr>
+            <a:srgbClr val="A4A3A4"/>
+          </p15:clr>
+        </p15:guide>
+        <p15:guide id="2" pos="3840">
+          <p15:clr>
+            <a:srgbClr val="A4A3A4"/>
+          </p15:clr>
+        </p15:guide>
+      </p15:sldGuideLst>
     </p:ext>
   </p:extLst>
 </p:presentation>
@@ -256,7 +267,7 @@
           <p:cNvPr id="2" name="Заголовок 1">
             <a:extLst>
               <a:ext uri="{FF2B5EF4-FFF2-40B4-BE49-F238E27FC236}">
-                <a16:creationId xmlns="" xmlns:a16="http://schemas.microsoft.com/office/drawing/2014/main" id="{37CAFF4F-E106-4FFC-930C-B2CF5F22161A}"/>
+                <a16:creationId xmlns:a16="http://schemas.microsoft.com/office/drawing/2014/main" id="{37CAFF4F-E106-4FFC-930C-B2CF5F22161A}"/>
               </a:ext>
             </a:extLst>
           </p:cNvPr>
@@ -293,7 +304,7 @@
           <p:cNvPr id="3" name="Подзаголовок 2">
             <a:extLst>
               <a:ext uri="{FF2B5EF4-FFF2-40B4-BE49-F238E27FC236}">
-                <a16:creationId xmlns="" xmlns:a16="http://schemas.microsoft.com/office/drawing/2014/main" id="{D931388F-6771-4551-91FD-5E21225AF71E}"/>
+                <a16:creationId xmlns:a16="http://schemas.microsoft.com/office/drawing/2014/main" id="{D931388F-6771-4551-91FD-5E21225AF71E}"/>
               </a:ext>
             </a:extLst>
           </p:cNvPr>
@@ -363,7 +374,7 @@
           <p:cNvPr id="4" name="Дата 3">
             <a:extLst>
               <a:ext uri="{FF2B5EF4-FFF2-40B4-BE49-F238E27FC236}">
-                <a16:creationId xmlns="" xmlns:a16="http://schemas.microsoft.com/office/drawing/2014/main" id="{891E1217-D87F-4D0A-BAC3-AC2EB3EB3948}"/>
+                <a16:creationId xmlns:a16="http://schemas.microsoft.com/office/drawing/2014/main" id="{891E1217-D87F-4D0A-BAC3-AC2EB3EB3948}"/>
               </a:ext>
             </a:extLst>
           </p:cNvPr>
@@ -392,7 +403,7 @@
           <p:cNvPr id="5" name="Нижний колонтитул 4">
             <a:extLst>
               <a:ext uri="{FF2B5EF4-FFF2-40B4-BE49-F238E27FC236}">
-                <a16:creationId xmlns="" xmlns:a16="http://schemas.microsoft.com/office/drawing/2014/main" id="{2E38F155-81BE-4451-BA4A-4A4A2FC39B0B}"/>
+                <a16:creationId xmlns:a16="http://schemas.microsoft.com/office/drawing/2014/main" id="{2E38F155-81BE-4451-BA4A-4A4A2FC39B0B}"/>
               </a:ext>
             </a:extLst>
           </p:cNvPr>
@@ -417,7 +428,7 @@
           <p:cNvPr id="6" name="Номер слайда 5">
             <a:extLst>
               <a:ext uri="{FF2B5EF4-FFF2-40B4-BE49-F238E27FC236}">
-                <a16:creationId xmlns="" xmlns:a16="http://schemas.microsoft.com/office/drawing/2014/main" id="{D4AF2960-2CA3-4194-B038-7D2E7F666E01}"/>
+                <a16:creationId xmlns:a16="http://schemas.microsoft.com/office/drawing/2014/main" id="{D4AF2960-2CA3-4194-B038-7D2E7F666E01}"/>
               </a:ext>
             </a:extLst>
           </p:cNvPr>
@@ -476,7 +487,7 @@
           <p:cNvPr id="2" name="Заголовок 1">
             <a:extLst>
               <a:ext uri="{FF2B5EF4-FFF2-40B4-BE49-F238E27FC236}">
-                <a16:creationId xmlns="" xmlns:a16="http://schemas.microsoft.com/office/drawing/2014/main" id="{CB1EEEF4-4B96-4913-8187-25000DB5172B}"/>
+                <a16:creationId xmlns:a16="http://schemas.microsoft.com/office/drawing/2014/main" id="{CB1EEEF4-4B96-4913-8187-25000DB5172B}"/>
               </a:ext>
             </a:extLst>
           </p:cNvPr>
@@ -504,7 +515,7 @@
           <p:cNvPr id="3" name="Вертикальный текст 2">
             <a:extLst>
               <a:ext uri="{FF2B5EF4-FFF2-40B4-BE49-F238E27FC236}">
-                <a16:creationId xmlns="" xmlns:a16="http://schemas.microsoft.com/office/drawing/2014/main" id="{851313DB-3E90-4C47-904F-3DB8D80F491E}"/>
+                <a16:creationId xmlns:a16="http://schemas.microsoft.com/office/drawing/2014/main" id="{851313DB-3E90-4C47-904F-3DB8D80F491E}"/>
               </a:ext>
             </a:extLst>
           </p:cNvPr>
@@ -561,7 +572,7 @@
           <p:cNvPr id="4" name="Дата 3">
             <a:extLst>
               <a:ext uri="{FF2B5EF4-FFF2-40B4-BE49-F238E27FC236}">
-                <a16:creationId xmlns="" xmlns:a16="http://schemas.microsoft.com/office/drawing/2014/main" id="{F2D1EEC3-8F71-4969-9A6A-70F2FB8269C4}"/>
+                <a16:creationId xmlns:a16="http://schemas.microsoft.com/office/drawing/2014/main" id="{F2D1EEC3-8F71-4969-9A6A-70F2FB8269C4}"/>
               </a:ext>
             </a:extLst>
           </p:cNvPr>
@@ -590,7 +601,7 @@
           <p:cNvPr id="5" name="Нижний колонтитул 4">
             <a:extLst>
               <a:ext uri="{FF2B5EF4-FFF2-40B4-BE49-F238E27FC236}">
-                <a16:creationId xmlns="" xmlns:a16="http://schemas.microsoft.com/office/drawing/2014/main" id="{22444CCD-343D-48B0-AA57-298076F7BD70}"/>
+                <a16:creationId xmlns:a16="http://schemas.microsoft.com/office/drawing/2014/main" id="{22444CCD-343D-48B0-AA57-298076F7BD70}"/>
               </a:ext>
             </a:extLst>
           </p:cNvPr>
@@ -615,7 +626,7 @@
           <p:cNvPr id="6" name="Номер слайда 5">
             <a:extLst>
               <a:ext uri="{FF2B5EF4-FFF2-40B4-BE49-F238E27FC236}">
-                <a16:creationId xmlns="" xmlns:a16="http://schemas.microsoft.com/office/drawing/2014/main" id="{75FEDECC-87A2-471F-AEF3-D994F28C85D3}"/>
+                <a16:creationId xmlns:a16="http://schemas.microsoft.com/office/drawing/2014/main" id="{75FEDECC-87A2-471F-AEF3-D994F28C85D3}"/>
               </a:ext>
             </a:extLst>
           </p:cNvPr>
@@ -674,7 +685,7 @@
           <p:cNvPr id="2" name="Вертикальный заголовок 1">
             <a:extLst>
               <a:ext uri="{FF2B5EF4-FFF2-40B4-BE49-F238E27FC236}">
-                <a16:creationId xmlns="" xmlns:a16="http://schemas.microsoft.com/office/drawing/2014/main" id="{E01EC5FD-8E6D-4585-834B-2BA4D8BE2230}"/>
+                <a16:creationId xmlns:a16="http://schemas.microsoft.com/office/drawing/2014/main" id="{E01EC5FD-8E6D-4585-834B-2BA4D8BE2230}"/>
               </a:ext>
             </a:extLst>
           </p:cNvPr>
@@ -707,7 +718,7 @@
           <p:cNvPr id="3" name="Вертикальный текст 2">
             <a:extLst>
               <a:ext uri="{FF2B5EF4-FFF2-40B4-BE49-F238E27FC236}">
-                <a16:creationId xmlns="" xmlns:a16="http://schemas.microsoft.com/office/drawing/2014/main" id="{A0AF2BCF-B7A9-4273-A036-65D48EC35AFB}"/>
+                <a16:creationId xmlns:a16="http://schemas.microsoft.com/office/drawing/2014/main" id="{A0AF2BCF-B7A9-4273-A036-65D48EC35AFB}"/>
               </a:ext>
             </a:extLst>
           </p:cNvPr>
@@ -769,7 +780,7 @@
           <p:cNvPr id="4" name="Дата 3">
             <a:extLst>
               <a:ext uri="{FF2B5EF4-FFF2-40B4-BE49-F238E27FC236}">
-                <a16:creationId xmlns="" xmlns:a16="http://schemas.microsoft.com/office/drawing/2014/main" id="{FD0D1C6D-69CF-457C-91C7-F377F3740FD7}"/>
+                <a16:creationId xmlns:a16="http://schemas.microsoft.com/office/drawing/2014/main" id="{FD0D1C6D-69CF-457C-91C7-F377F3740FD7}"/>
               </a:ext>
             </a:extLst>
           </p:cNvPr>
@@ -798,7 +809,7 @@
           <p:cNvPr id="5" name="Нижний колонтитул 4">
             <a:extLst>
               <a:ext uri="{FF2B5EF4-FFF2-40B4-BE49-F238E27FC236}">
-                <a16:creationId xmlns="" xmlns:a16="http://schemas.microsoft.com/office/drawing/2014/main" id="{B4E51A0A-6E5C-4D13-BEEB-CD5E87DE7A55}"/>
+                <a16:creationId xmlns:a16="http://schemas.microsoft.com/office/drawing/2014/main" id="{B4E51A0A-6E5C-4D13-BEEB-CD5E87DE7A55}"/>
               </a:ext>
             </a:extLst>
           </p:cNvPr>
@@ -823,7 +834,7 @@
           <p:cNvPr id="6" name="Номер слайда 5">
             <a:extLst>
               <a:ext uri="{FF2B5EF4-FFF2-40B4-BE49-F238E27FC236}">
-                <a16:creationId xmlns="" xmlns:a16="http://schemas.microsoft.com/office/drawing/2014/main" id="{DDBC26EC-1A2D-4432-9144-2DB20ABD8101}"/>
+                <a16:creationId xmlns:a16="http://schemas.microsoft.com/office/drawing/2014/main" id="{DDBC26EC-1A2D-4432-9144-2DB20ABD8101}"/>
               </a:ext>
             </a:extLst>
           </p:cNvPr>
@@ -882,7 +893,7 @@
           <p:cNvPr id="2" name="Заголовок 1">
             <a:extLst>
               <a:ext uri="{FF2B5EF4-FFF2-40B4-BE49-F238E27FC236}">
-                <a16:creationId xmlns="" xmlns:a16="http://schemas.microsoft.com/office/drawing/2014/main" id="{93F15F7B-3F3F-4BCF-A278-ED76E11675D5}"/>
+                <a16:creationId xmlns:a16="http://schemas.microsoft.com/office/drawing/2014/main" id="{93F15F7B-3F3F-4BCF-A278-ED76E11675D5}"/>
               </a:ext>
             </a:extLst>
           </p:cNvPr>
@@ -910,7 +921,7 @@
           <p:cNvPr id="3" name="Объект 2">
             <a:extLst>
               <a:ext uri="{FF2B5EF4-FFF2-40B4-BE49-F238E27FC236}">
-                <a16:creationId xmlns="" xmlns:a16="http://schemas.microsoft.com/office/drawing/2014/main" id="{53CE5BDC-C0F2-4C9D-82E4-E7AB75BD3541}"/>
+                <a16:creationId xmlns:a16="http://schemas.microsoft.com/office/drawing/2014/main" id="{53CE5BDC-C0F2-4C9D-82E4-E7AB75BD3541}"/>
               </a:ext>
             </a:extLst>
           </p:cNvPr>
@@ -967,7 +978,7 @@
           <p:cNvPr id="4" name="Дата 3">
             <a:extLst>
               <a:ext uri="{FF2B5EF4-FFF2-40B4-BE49-F238E27FC236}">
-                <a16:creationId xmlns="" xmlns:a16="http://schemas.microsoft.com/office/drawing/2014/main" id="{7A58E51C-CAC9-4ED0-A790-E5CFBAE9031B}"/>
+                <a16:creationId xmlns:a16="http://schemas.microsoft.com/office/drawing/2014/main" id="{7A58E51C-CAC9-4ED0-A790-E5CFBAE9031B}"/>
               </a:ext>
             </a:extLst>
           </p:cNvPr>
@@ -996,7 +1007,7 @@
           <p:cNvPr id="5" name="Нижний колонтитул 4">
             <a:extLst>
               <a:ext uri="{FF2B5EF4-FFF2-40B4-BE49-F238E27FC236}">
-                <a16:creationId xmlns="" xmlns:a16="http://schemas.microsoft.com/office/drawing/2014/main" id="{ABB2258F-C224-4F1E-B5B7-B244967A5C26}"/>
+                <a16:creationId xmlns:a16="http://schemas.microsoft.com/office/drawing/2014/main" id="{ABB2258F-C224-4F1E-B5B7-B244967A5C26}"/>
               </a:ext>
             </a:extLst>
           </p:cNvPr>
@@ -1021,7 +1032,7 @@
           <p:cNvPr id="6" name="Номер слайда 5">
             <a:extLst>
               <a:ext uri="{FF2B5EF4-FFF2-40B4-BE49-F238E27FC236}">
-                <a16:creationId xmlns="" xmlns:a16="http://schemas.microsoft.com/office/drawing/2014/main" id="{5FC87BB2-F189-4F29-B9B4-B32305682BA5}"/>
+                <a16:creationId xmlns:a16="http://schemas.microsoft.com/office/drawing/2014/main" id="{5FC87BB2-F189-4F29-B9B4-B32305682BA5}"/>
               </a:ext>
             </a:extLst>
           </p:cNvPr>
@@ -1080,7 +1091,7 @@
           <p:cNvPr id="2" name="Заголовок 1">
             <a:extLst>
               <a:ext uri="{FF2B5EF4-FFF2-40B4-BE49-F238E27FC236}">
-                <a16:creationId xmlns="" xmlns:a16="http://schemas.microsoft.com/office/drawing/2014/main" id="{605F2F98-82CD-48E0-91F5-FB2E59327BB2}"/>
+                <a16:creationId xmlns:a16="http://schemas.microsoft.com/office/drawing/2014/main" id="{605F2F98-82CD-48E0-91F5-FB2E59327BB2}"/>
               </a:ext>
             </a:extLst>
           </p:cNvPr>
@@ -1117,7 +1128,7 @@
           <p:cNvPr id="3" name="Текст 2">
             <a:extLst>
               <a:ext uri="{FF2B5EF4-FFF2-40B4-BE49-F238E27FC236}">
-                <a16:creationId xmlns="" xmlns:a16="http://schemas.microsoft.com/office/drawing/2014/main" id="{E55186E3-53AF-41EA-B7C6-F3B318EEB171}"/>
+                <a16:creationId xmlns:a16="http://schemas.microsoft.com/office/drawing/2014/main" id="{E55186E3-53AF-41EA-B7C6-F3B318EEB171}"/>
               </a:ext>
             </a:extLst>
           </p:cNvPr>
@@ -1242,7 +1253,7 @@
           <p:cNvPr id="4" name="Дата 3">
             <a:extLst>
               <a:ext uri="{FF2B5EF4-FFF2-40B4-BE49-F238E27FC236}">
-                <a16:creationId xmlns="" xmlns:a16="http://schemas.microsoft.com/office/drawing/2014/main" id="{C1AE53D4-3C43-49FA-AFE5-6476242EC6CE}"/>
+                <a16:creationId xmlns:a16="http://schemas.microsoft.com/office/drawing/2014/main" id="{C1AE53D4-3C43-49FA-AFE5-6476242EC6CE}"/>
               </a:ext>
             </a:extLst>
           </p:cNvPr>
@@ -1271,7 +1282,7 @@
           <p:cNvPr id="5" name="Нижний колонтитул 4">
             <a:extLst>
               <a:ext uri="{FF2B5EF4-FFF2-40B4-BE49-F238E27FC236}">
-                <a16:creationId xmlns="" xmlns:a16="http://schemas.microsoft.com/office/drawing/2014/main" id="{60EF3BBF-03C5-4C17-A7F6-EB1491E05710}"/>
+                <a16:creationId xmlns:a16="http://schemas.microsoft.com/office/drawing/2014/main" id="{60EF3BBF-03C5-4C17-A7F6-EB1491E05710}"/>
               </a:ext>
             </a:extLst>
           </p:cNvPr>
@@ -1296,7 +1307,7 @@
           <p:cNvPr id="6" name="Номер слайда 5">
             <a:extLst>
               <a:ext uri="{FF2B5EF4-FFF2-40B4-BE49-F238E27FC236}">
-                <a16:creationId xmlns="" xmlns:a16="http://schemas.microsoft.com/office/drawing/2014/main" id="{EAEC8252-D4B1-4894-84A2-B847CCB52EF0}"/>
+                <a16:creationId xmlns:a16="http://schemas.microsoft.com/office/drawing/2014/main" id="{EAEC8252-D4B1-4894-84A2-B847CCB52EF0}"/>
               </a:ext>
             </a:extLst>
           </p:cNvPr>
@@ -1355,7 +1366,7 @@
           <p:cNvPr id="2" name="Заголовок 1">
             <a:extLst>
               <a:ext uri="{FF2B5EF4-FFF2-40B4-BE49-F238E27FC236}">
-                <a16:creationId xmlns="" xmlns:a16="http://schemas.microsoft.com/office/drawing/2014/main" id="{C72B89DD-3E56-47CD-B725-5D2A0E0FDC28}"/>
+                <a16:creationId xmlns:a16="http://schemas.microsoft.com/office/drawing/2014/main" id="{C72B89DD-3E56-47CD-B725-5D2A0E0FDC28}"/>
               </a:ext>
             </a:extLst>
           </p:cNvPr>
@@ -1383,7 +1394,7 @@
           <p:cNvPr id="3" name="Объект 2">
             <a:extLst>
               <a:ext uri="{FF2B5EF4-FFF2-40B4-BE49-F238E27FC236}">
-                <a16:creationId xmlns="" xmlns:a16="http://schemas.microsoft.com/office/drawing/2014/main" id="{8D41EF36-8F65-4CA6-927C-9F9183D9CD73}"/>
+                <a16:creationId xmlns:a16="http://schemas.microsoft.com/office/drawing/2014/main" id="{8D41EF36-8F65-4CA6-927C-9F9183D9CD73}"/>
               </a:ext>
             </a:extLst>
           </p:cNvPr>
@@ -1445,7 +1456,7 @@
           <p:cNvPr id="4" name="Объект 3">
             <a:extLst>
               <a:ext uri="{FF2B5EF4-FFF2-40B4-BE49-F238E27FC236}">
-                <a16:creationId xmlns="" xmlns:a16="http://schemas.microsoft.com/office/drawing/2014/main" id="{65226DF4-1E33-42A7-93CF-9A741ED18E47}"/>
+                <a16:creationId xmlns:a16="http://schemas.microsoft.com/office/drawing/2014/main" id="{65226DF4-1E33-42A7-93CF-9A741ED18E47}"/>
               </a:ext>
             </a:extLst>
           </p:cNvPr>
@@ -1507,7 +1518,7 @@
           <p:cNvPr id="5" name="Дата 4">
             <a:extLst>
               <a:ext uri="{FF2B5EF4-FFF2-40B4-BE49-F238E27FC236}">
-                <a16:creationId xmlns="" xmlns:a16="http://schemas.microsoft.com/office/drawing/2014/main" id="{C97AD1ED-0CE1-4EF1-A664-DE13C88D3431}"/>
+                <a16:creationId xmlns:a16="http://schemas.microsoft.com/office/drawing/2014/main" id="{C97AD1ED-0CE1-4EF1-A664-DE13C88D3431}"/>
               </a:ext>
             </a:extLst>
           </p:cNvPr>
@@ -1536,7 +1547,7 @@
           <p:cNvPr id="6" name="Нижний колонтитул 5">
             <a:extLst>
               <a:ext uri="{FF2B5EF4-FFF2-40B4-BE49-F238E27FC236}">
-                <a16:creationId xmlns="" xmlns:a16="http://schemas.microsoft.com/office/drawing/2014/main" id="{9FF64049-3E79-492C-ABC8-8EFF1B085B84}"/>
+                <a16:creationId xmlns:a16="http://schemas.microsoft.com/office/drawing/2014/main" id="{9FF64049-3E79-492C-ABC8-8EFF1B085B84}"/>
               </a:ext>
             </a:extLst>
           </p:cNvPr>
@@ -1561,7 +1572,7 @@
           <p:cNvPr id="7" name="Номер слайда 6">
             <a:extLst>
               <a:ext uri="{FF2B5EF4-FFF2-40B4-BE49-F238E27FC236}">
-                <a16:creationId xmlns="" xmlns:a16="http://schemas.microsoft.com/office/drawing/2014/main" id="{79AAC584-17C2-4586-9D08-DE1AC1A728EA}"/>
+                <a16:creationId xmlns:a16="http://schemas.microsoft.com/office/drawing/2014/main" id="{79AAC584-17C2-4586-9D08-DE1AC1A728EA}"/>
               </a:ext>
             </a:extLst>
           </p:cNvPr>
@@ -1620,7 +1631,7 @@
           <p:cNvPr id="2" name="Заголовок 1">
             <a:extLst>
               <a:ext uri="{FF2B5EF4-FFF2-40B4-BE49-F238E27FC236}">
-                <a16:creationId xmlns="" xmlns:a16="http://schemas.microsoft.com/office/drawing/2014/main" id="{60F3B848-A1D4-4358-83CB-A1B103239F59}"/>
+                <a16:creationId xmlns:a16="http://schemas.microsoft.com/office/drawing/2014/main" id="{60F3B848-A1D4-4358-83CB-A1B103239F59}"/>
               </a:ext>
             </a:extLst>
           </p:cNvPr>
@@ -1653,7 +1664,7 @@
           <p:cNvPr id="3" name="Текст 2">
             <a:extLst>
               <a:ext uri="{FF2B5EF4-FFF2-40B4-BE49-F238E27FC236}">
-                <a16:creationId xmlns="" xmlns:a16="http://schemas.microsoft.com/office/drawing/2014/main" id="{D943C380-2070-498E-8251-4B2B3B5C8BD9}"/>
+                <a16:creationId xmlns:a16="http://schemas.microsoft.com/office/drawing/2014/main" id="{D943C380-2070-498E-8251-4B2B3B5C8BD9}"/>
               </a:ext>
             </a:extLst>
           </p:cNvPr>
@@ -1724,7 +1735,7 @@
           <p:cNvPr id="4" name="Объект 3">
             <a:extLst>
               <a:ext uri="{FF2B5EF4-FFF2-40B4-BE49-F238E27FC236}">
-                <a16:creationId xmlns="" xmlns:a16="http://schemas.microsoft.com/office/drawing/2014/main" id="{0E92997B-E9B2-44AE-927B-59213AD34761}"/>
+                <a16:creationId xmlns:a16="http://schemas.microsoft.com/office/drawing/2014/main" id="{0E92997B-E9B2-44AE-927B-59213AD34761}"/>
               </a:ext>
             </a:extLst>
           </p:cNvPr>
@@ -1786,7 +1797,7 @@
           <p:cNvPr id="5" name="Текст 4">
             <a:extLst>
               <a:ext uri="{FF2B5EF4-FFF2-40B4-BE49-F238E27FC236}">
-                <a16:creationId xmlns="" xmlns:a16="http://schemas.microsoft.com/office/drawing/2014/main" id="{EB16FD49-C4B5-463C-B46D-98699F7C0E7C}"/>
+                <a16:creationId xmlns:a16="http://schemas.microsoft.com/office/drawing/2014/main" id="{EB16FD49-C4B5-463C-B46D-98699F7C0E7C}"/>
               </a:ext>
             </a:extLst>
           </p:cNvPr>
@@ -1857,7 +1868,7 @@
           <p:cNvPr id="6" name="Объект 5">
             <a:extLst>
               <a:ext uri="{FF2B5EF4-FFF2-40B4-BE49-F238E27FC236}">
-                <a16:creationId xmlns="" xmlns:a16="http://schemas.microsoft.com/office/drawing/2014/main" id="{B601820E-324C-4918-B7DA-3DF3B30D7177}"/>
+                <a16:creationId xmlns:a16="http://schemas.microsoft.com/office/drawing/2014/main" id="{B601820E-324C-4918-B7DA-3DF3B30D7177}"/>
               </a:ext>
             </a:extLst>
           </p:cNvPr>
@@ -1919,7 +1930,7 @@
           <p:cNvPr id="7" name="Дата 6">
             <a:extLst>
               <a:ext uri="{FF2B5EF4-FFF2-40B4-BE49-F238E27FC236}">
-                <a16:creationId xmlns="" xmlns:a16="http://schemas.microsoft.com/office/drawing/2014/main" id="{FEB7CCEF-1AF5-4D90-9D12-B2E18674841A}"/>
+                <a16:creationId xmlns:a16="http://schemas.microsoft.com/office/drawing/2014/main" id="{FEB7CCEF-1AF5-4D90-9D12-B2E18674841A}"/>
               </a:ext>
             </a:extLst>
           </p:cNvPr>
@@ -1948,7 +1959,7 @@
           <p:cNvPr id="8" name="Нижний колонтитул 7">
             <a:extLst>
               <a:ext uri="{FF2B5EF4-FFF2-40B4-BE49-F238E27FC236}">
-                <a16:creationId xmlns="" xmlns:a16="http://schemas.microsoft.com/office/drawing/2014/main" id="{DFE8EC3F-B291-4363-AE57-338C6D59AF0A}"/>
+                <a16:creationId xmlns:a16="http://schemas.microsoft.com/office/drawing/2014/main" id="{DFE8EC3F-B291-4363-AE57-338C6D59AF0A}"/>
               </a:ext>
             </a:extLst>
           </p:cNvPr>
@@ -1973,7 +1984,7 @@
           <p:cNvPr id="9" name="Номер слайда 8">
             <a:extLst>
               <a:ext uri="{FF2B5EF4-FFF2-40B4-BE49-F238E27FC236}">
-                <a16:creationId xmlns="" xmlns:a16="http://schemas.microsoft.com/office/drawing/2014/main" id="{8BD73EEC-A93E-4E71-BF4C-AE3C4F5ACC88}"/>
+                <a16:creationId xmlns:a16="http://schemas.microsoft.com/office/drawing/2014/main" id="{8BD73EEC-A93E-4E71-BF4C-AE3C4F5ACC88}"/>
               </a:ext>
             </a:extLst>
           </p:cNvPr>
@@ -2032,7 +2043,7 @@
           <p:cNvPr id="2" name="Заголовок 1">
             <a:extLst>
               <a:ext uri="{FF2B5EF4-FFF2-40B4-BE49-F238E27FC236}">
-                <a16:creationId xmlns="" xmlns:a16="http://schemas.microsoft.com/office/drawing/2014/main" id="{C77B30EC-2412-4D1D-8286-5C357C75B3C2}"/>
+                <a16:creationId xmlns:a16="http://schemas.microsoft.com/office/drawing/2014/main" id="{C77B30EC-2412-4D1D-8286-5C357C75B3C2}"/>
               </a:ext>
             </a:extLst>
           </p:cNvPr>
@@ -2060,7 +2071,7 @@
           <p:cNvPr id="3" name="Дата 2">
             <a:extLst>
               <a:ext uri="{FF2B5EF4-FFF2-40B4-BE49-F238E27FC236}">
-                <a16:creationId xmlns="" xmlns:a16="http://schemas.microsoft.com/office/drawing/2014/main" id="{5209749D-C3F2-4F8C-AF5C-DCA87E62658D}"/>
+                <a16:creationId xmlns:a16="http://schemas.microsoft.com/office/drawing/2014/main" id="{5209749D-C3F2-4F8C-AF5C-DCA87E62658D}"/>
               </a:ext>
             </a:extLst>
           </p:cNvPr>
@@ -2089,7 +2100,7 @@
           <p:cNvPr id="4" name="Нижний колонтитул 3">
             <a:extLst>
               <a:ext uri="{FF2B5EF4-FFF2-40B4-BE49-F238E27FC236}">
-                <a16:creationId xmlns="" xmlns:a16="http://schemas.microsoft.com/office/drawing/2014/main" id="{1655ECA3-E1A6-4FF5-A6B7-F4BBE99106A0}"/>
+                <a16:creationId xmlns:a16="http://schemas.microsoft.com/office/drawing/2014/main" id="{1655ECA3-E1A6-4FF5-A6B7-F4BBE99106A0}"/>
               </a:ext>
             </a:extLst>
           </p:cNvPr>
@@ -2114,7 +2125,7 @@
           <p:cNvPr id="5" name="Номер слайда 4">
             <a:extLst>
               <a:ext uri="{FF2B5EF4-FFF2-40B4-BE49-F238E27FC236}">
-                <a16:creationId xmlns="" xmlns:a16="http://schemas.microsoft.com/office/drawing/2014/main" id="{3E46AE6C-2A03-45EB-AFE6-228A3C6B0BB9}"/>
+                <a16:creationId xmlns:a16="http://schemas.microsoft.com/office/drawing/2014/main" id="{3E46AE6C-2A03-45EB-AFE6-228A3C6B0BB9}"/>
               </a:ext>
             </a:extLst>
           </p:cNvPr>
@@ -2173,7 +2184,7 @@
           <p:cNvPr id="2" name="Дата 1">
             <a:extLst>
               <a:ext uri="{FF2B5EF4-FFF2-40B4-BE49-F238E27FC236}">
-                <a16:creationId xmlns="" xmlns:a16="http://schemas.microsoft.com/office/drawing/2014/main" id="{6E363DB8-5BCD-4153-9B40-4FCAA572AB2B}"/>
+                <a16:creationId xmlns:a16="http://schemas.microsoft.com/office/drawing/2014/main" id="{6E363DB8-5BCD-4153-9B40-4FCAA572AB2B}"/>
               </a:ext>
             </a:extLst>
           </p:cNvPr>
@@ -2202,7 +2213,7 @@
           <p:cNvPr id="3" name="Нижний колонтитул 2">
             <a:extLst>
               <a:ext uri="{FF2B5EF4-FFF2-40B4-BE49-F238E27FC236}">
-                <a16:creationId xmlns="" xmlns:a16="http://schemas.microsoft.com/office/drawing/2014/main" id="{4D739E10-AADE-4AF8-9E1A-D612722DA840}"/>
+                <a16:creationId xmlns:a16="http://schemas.microsoft.com/office/drawing/2014/main" id="{4D739E10-AADE-4AF8-9E1A-D612722DA840}"/>
               </a:ext>
             </a:extLst>
           </p:cNvPr>
@@ -2227,7 +2238,7 @@
           <p:cNvPr id="4" name="Номер слайда 3">
             <a:extLst>
               <a:ext uri="{FF2B5EF4-FFF2-40B4-BE49-F238E27FC236}">
-                <a16:creationId xmlns="" xmlns:a16="http://schemas.microsoft.com/office/drawing/2014/main" id="{2025B663-821C-48E6-A1F8-DECB2638B0C4}"/>
+                <a16:creationId xmlns:a16="http://schemas.microsoft.com/office/drawing/2014/main" id="{2025B663-821C-48E6-A1F8-DECB2638B0C4}"/>
               </a:ext>
             </a:extLst>
           </p:cNvPr>
@@ -2286,7 +2297,7 @@
           <p:cNvPr id="2" name="Заголовок 1">
             <a:extLst>
               <a:ext uri="{FF2B5EF4-FFF2-40B4-BE49-F238E27FC236}">
-                <a16:creationId xmlns="" xmlns:a16="http://schemas.microsoft.com/office/drawing/2014/main" id="{C496CA23-5C0B-4DB7-93CE-09DBCFEFF8C6}"/>
+                <a16:creationId xmlns:a16="http://schemas.microsoft.com/office/drawing/2014/main" id="{C496CA23-5C0B-4DB7-93CE-09DBCFEFF8C6}"/>
               </a:ext>
             </a:extLst>
           </p:cNvPr>
@@ -2323,7 +2334,7 @@
           <p:cNvPr id="3" name="Объект 2">
             <a:extLst>
               <a:ext uri="{FF2B5EF4-FFF2-40B4-BE49-F238E27FC236}">
-                <a16:creationId xmlns="" xmlns:a16="http://schemas.microsoft.com/office/drawing/2014/main" id="{8FEE7C9E-835C-4E23-B7DB-CA75F982714C}"/>
+                <a16:creationId xmlns:a16="http://schemas.microsoft.com/office/drawing/2014/main" id="{8FEE7C9E-835C-4E23-B7DB-CA75F982714C}"/>
               </a:ext>
             </a:extLst>
           </p:cNvPr>
@@ -2413,7 +2424,7 @@
           <p:cNvPr id="4" name="Текст 3">
             <a:extLst>
               <a:ext uri="{FF2B5EF4-FFF2-40B4-BE49-F238E27FC236}">
-                <a16:creationId xmlns="" xmlns:a16="http://schemas.microsoft.com/office/drawing/2014/main" id="{D2090EC4-F236-422B-B756-70947A0143B2}"/>
+                <a16:creationId xmlns:a16="http://schemas.microsoft.com/office/drawing/2014/main" id="{D2090EC4-F236-422B-B756-70947A0143B2}"/>
               </a:ext>
             </a:extLst>
           </p:cNvPr>
@@ -2484,7 +2495,7 @@
           <p:cNvPr id="5" name="Дата 4">
             <a:extLst>
               <a:ext uri="{FF2B5EF4-FFF2-40B4-BE49-F238E27FC236}">
-                <a16:creationId xmlns="" xmlns:a16="http://schemas.microsoft.com/office/drawing/2014/main" id="{87A6C6C3-4A84-49AD-B57A-42BF80AC498A}"/>
+                <a16:creationId xmlns:a16="http://schemas.microsoft.com/office/drawing/2014/main" id="{87A6C6C3-4A84-49AD-B57A-42BF80AC498A}"/>
               </a:ext>
             </a:extLst>
           </p:cNvPr>
@@ -2513,7 +2524,7 @@
           <p:cNvPr id="6" name="Нижний колонтитул 5">
             <a:extLst>
               <a:ext uri="{FF2B5EF4-FFF2-40B4-BE49-F238E27FC236}">
-                <a16:creationId xmlns="" xmlns:a16="http://schemas.microsoft.com/office/drawing/2014/main" id="{C99DBF37-9553-454F-9B96-227B620EF42A}"/>
+                <a16:creationId xmlns:a16="http://schemas.microsoft.com/office/drawing/2014/main" id="{C99DBF37-9553-454F-9B96-227B620EF42A}"/>
               </a:ext>
             </a:extLst>
           </p:cNvPr>
@@ -2538,7 +2549,7 @@
           <p:cNvPr id="7" name="Номер слайда 6">
             <a:extLst>
               <a:ext uri="{FF2B5EF4-FFF2-40B4-BE49-F238E27FC236}">
-                <a16:creationId xmlns="" xmlns:a16="http://schemas.microsoft.com/office/drawing/2014/main" id="{0C384B9A-D64A-48B9-8262-42F6DDDFCE51}"/>
+                <a16:creationId xmlns:a16="http://schemas.microsoft.com/office/drawing/2014/main" id="{0C384B9A-D64A-48B9-8262-42F6DDDFCE51}"/>
               </a:ext>
             </a:extLst>
           </p:cNvPr>
@@ -2597,7 +2608,7 @@
           <p:cNvPr id="2" name="Заголовок 1">
             <a:extLst>
               <a:ext uri="{FF2B5EF4-FFF2-40B4-BE49-F238E27FC236}">
-                <a16:creationId xmlns="" xmlns:a16="http://schemas.microsoft.com/office/drawing/2014/main" id="{BECF3BA1-3282-407F-ADED-A57BE3CCA5BC}"/>
+                <a16:creationId xmlns:a16="http://schemas.microsoft.com/office/drawing/2014/main" id="{BECF3BA1-3282-407F-ADED-A57BE3CCA5BC}"/>
               </a:ext>
             </a:extLst>
           </p:cNvPr>
@@ -2634,7 +2645,7 @@
           <p:cNvPr id="3" name="Рисунок 2">
             <a:extLst>
               <a:ext uri="{FF2B5EF4-FFF2-40B4-BE49-F238E27FC236}">
-                <a16:creationId xmlns="" xmlns:a16="http://schemas.microsoft.com/office/drawing/2014/main" id="{9223AFF8-24A3-40A0-9F7C-3CCEBEFA54BB}"/>
+                <a16:creationId xmlns:a16="http://schemas.microsoft.com/office/drawing/2014/main" id="{9223AFF8-24A3-40A0-9F7C-3CCEBEFA54BB}"/>
               </a:ext>
             </a:extLst>
           </p:cNvPr>
@@ -2701,7 +2712,7 @@
           <p:cNvPr id="4" name="Текст 3">
             <a:extLst>
               <a:ext uri="{FF2B5EF4-FFF2-40B4-BE49-F238E27FC236}">
-                <a16:creationId xmlns="" xmlns:a16="http://schemas.microsoft.com/office/drawing/2014/main" id="{A394EA3E-EE40-4D29-8579-6302D65A891D}"/>
+                <a16:creationId xmlns:a16="http://schemas.microsoft.com/office/drawing/2014/main" id="{A394EA3E-EE40-4D29-8579-6302D65A891D}"/>
               </a:ext>
             </a:extLst>
           </p:cNvPr>
@@ -2772,7 +2783,7 @@
           <p:cNvPr id="5" name="Дата 4">
             <a:extLst>
               <a:ext uri="{FF2B5EF4-FFF2-40B4-BE49-F238E27FC236}">
-                <a16:creationId xmlns="" xmlns:a16="http://schemas.microsoft.com/office/drawing/2014/main" id="{5D6511DC-062C-44C6-8B25-23F0F85577C5}"/>
+                <a16:creationId xmlns:a16="http://schemas.microsoft.com/office/drawing/2014/main" id="{5D6511DC-062C-44C6-8B25-23F0F85577C5}"/>
               </a:ext>
             </a:extLst>
           </p:cNvPr>
@@ -2801,7 +2812,7 @@
           <p:cNvPr id="6" name="Нижний колонтитул 5">
             <a:extLst>
               <a:ext uri="{FF2B5EF4-FFF2-40B4-BE49-F238E27FC236}">
-                <a16:creationId xmlns="" xmlns:a16="http://schemas.microsoft.com/office/drawing/2014/main" id="{DB11BAAA-EB73-4CE7-AA10-385DABFF51A6}"/>
+                <a16:creationId xmlns:a16="http://schemas.microsoft.com/office/drawing/2014/main" id="{DB11BAAA-EB73-4CE7-AA10-385DABFF51A6}"/>
               </a:ext>
             </a:extLst>
           </p:cNvPr>
@@ -2826,7 +2837,7 @@
           <p:cNvPr id="7" name="Номер слайда 6">
             <a:extLst>
               <a:ext uri="{FF2B5EF4-FFF2-40B4-BE49-F238E27FC236}">
-                <a16:creationId xmlns="" xmlns:a16="http://schemas.microsoft.com/office/drawing/2014/main" id="{D1F3A019-7F16-45C5-A3DA-059AD954CAAA}"/>
+                <a16:creationId xmlns:a16="http://schemas.microsoft.com/office/drawing/2014/main" id="{D1F3A019-7F16-45C5-A3DA-059AD954CAAA}"/>
               </a:ext>
             </a:extLst>
           </p:cNvPr>
@@ -2890,7 +2901,7 @@
           <p:cNvPr id="2" name="Заголовок 1">
             <a:extLst>
               <a:ext uri="{FF2B5EF4-FFF2-40B4-BE49-F238E27FC236}">
-                <a16:creationId xmlns="" xmlns:a16="http://schemas.microsoft.com/office/drawing/2014/main" id="{CE3D1D10-30B1-4069-817F-B25A94DDC133}"/>
+                <a16:creationId xmlns:a16="http://schemas.microsoft.com/office/drawing/2014/main" id="{CE3D1D10-30B1-4069-817F-B25A94DDC133}"/>
               </a:ext>
             </a:extLst>
           </p:cNvPr>
@@ -2928,7 +2939,7 @@
           <p:cNvPr id="3" name="Текст 2">
             <a:extLst>
               <a:ext uri="{FF2B5EF4-FFF2-40B4-BE49-F238E27FC236}">
-                <a16:creationId xmlns="" xmlns:a16="http://schemas.microsoft.com/office/drawing/2014/main" id="{90823816-92D9-43AF-A567-9DD33448866B}"/>
+                <a16:creationId xmlns:a16="http://schemas.microsoft.com/office/drawing/2014/main" id="{90823816-92D9-43AF-A567-9DD33448866B}"/>
               </a:ext>
             </a:extLst>
           </p:cNvPr>
@@ -2995,7 +3006,7 @@
           <p:cNvPr id="4" name="Дата 3">
             <a:extLst>
               <a:ext uri="{FF2B5EF4-FFF2-40B4-BE49-F238E27FC236}">
-                <a16:creationId xmlns="" xmlns:a16="http://schemas.microsoft.com/office/drawing/2014/main" id="{5908663A-FB0E-4F9B-9027-8DE45EAA9013}"/>
+                <a16:creationId xmlns:a16="http://schemas.microsoft.com/office/drawing/2014/main" id="{5908663A-FB0E-4F9B-9027-8DE45EAA9013}"/>
               </a:ext>
             </a:extLst>
           </p:cNvPr>
@@ -3042,7 +3053,7 @@
           <p:cNvPr id="5" name="Нижний колонтитул 4">
             <a:extLst>
               <a:ext uri="{FF2B5EF4-FFF2-40B4-BE49-F238E27FC236}">
-                <a16:creationId xmlns="" xmlns:a16="http://schemas.microsoft.com/office/drawing/2014/main" id="{BDAF1F9F-A56A-46C2-AF2B-1727A4B730B3}"/>
+                <a16:creationId xmlns:a16="http://schemas.microsoft.com/office/drawing/2014/main" id="{BDAF1F9F-A56A-46C2-AF2B-1727A4B730B3}"/>
               </a:ext>
             </a:extLst>
           </p:cNvPr>
@@ -3085,7 +3096,7 @@
           <p:cNvPr id="6" name="Номер слайда 5">
             <a:extLst>
               <a:ext uri="{FF2B5EF4-FFF2-40B4-BE49-F238E27FC236}">
-                <a16:creationId xmlns="" xmlns:a16="http://schemas.microsoft.com/office/drawing/2014/main" id="{0C1D5F58-978A-4A4C-A8B7-25F1A545A3DA}"/>
+                <a16:creationId xmlns:a16="http://schemas.microsoft.com/office/drawing/2014/main" id="{0C1D5F58-978A-4A4C-A8B7-25F1A545A3DA}"/>
               </a:ext>
             </a:extLst>
           </p:cNvPr>
@@ -3453,7 +3464,7 @@
           <p:cNvPr id="2" name="Заголовок 1">
             <a:extLst>
               <a:ext uri="{FF2B5EF4-FFF2-40B4-BE49-F238E27FC236}">
-                <a16:creationId xmlns="" xmlns:a16="http://schemas.microsoft.com/office/drawing/2014/main" id="{A57E77A9-FC28-40B1-9404-503D58E5E643}"/>
+                <a16:creationId xmlns:a16="http://schemas.microsoft.com/office/drawing/2014/main" id="{A57E77A9-FC28-40B1-9404-503D58E5E643}"/>
               </a:ext>
             </a:extLst>
           </p:cNvPr>
@@ -3469,11 +3480,17 @@
           <a:bodyPr/>
           <a:lstStyle/>
           <a:p>
+            <a:r>
+              <a:rPr lang="ru-RU" smtClean="0">
+                <a:cs typeface="Times New Roman" panose="02020603050405020304" pitchFamily="18" charset="0"/>
+              </a:rPr>
+              <a:t>Семестровая задача </a:t>
+            </a:r>
             <a:r>
               <a:rPr lang="ru-RU" dirty="0">
                 <a:cs typeface="Times New Roman" panose="02020603050405020304" pitchFamily="18" charset="0"/>
               </a:rPr>
-              <a:t>Семестровый проект «</a:t>
+              <a:t>«</a:t>
             </a:r>
             <a:r>
               <a:rPr lang="en-US" dirty="0">
@@ -3495,7 +3512,7 @@
           <p:cNvPr id="3" name="Подзаголовок 2">
             <a:extLst>
               <a:ext uri="{FF2B5EF4-FFF2-40B4-BE49-F238E27FC236}">
-                <a16:creationId xmlns="" xmlns:a16="http://schemas.microsoft.com/office/drawing/2014/main" id="{B4D9919D-3207-4D55-B6F1-407A692B7645}"/>
+                <a16:creationId xmlns:a16="http://schemas.microsoft.com/office/drawing/2014/main" id="{B4D9919D-3207-4D55-B6F1-407A692B7645}"/>
               </a:ext>
             </a:extLst>
           </p:cNvPr>
@@ -3597,7 +3614,7 @@
           <p:cNvPr id="2" name="Заголовок 1">
             <a:extLst>
               <a:ext uri="{FF2B5EF4-FFF2-40B4-BE49-F238E27FC236}">
-                <a16:creationId xmlns="" xmlns:a16="http://schemas.microsoft.com/office/drawing/2014/main" id="{3BDA58FE-3AD5-4A37-8347-C89BF167F9EE}"/>
+                <a16:creationId xmlns:a16="http://schemas.microsoft.com/office/drawing/2014/main" id="{3BDA58FE-3AD5-4A37-8347-C89BF167F9EE}"/>
               </a:ext>
             </a:extLst>
           </p:cNvPr>
@@ -3630,7 +3647,7 @@
           <p:cNvPr id="3" name="Объект 2">
             <a:extLst>
               <a:ext uri="{FF2B5EF4-FFF2-40B4-BE49-F238E27FC236}">
-                <a16:creationId xmlns="" xmlns:a16="http://schemas.microsoft.com/office/drawing/2014/main" id="{F556C1E0-7929-4E3F-BB59-F5DF4190D231}"/>
+                <a16:creationId xmlns:a16="http://schemas.microsoft.com/office/drawing/2014/main" id="{F556C1E0-7929-4E3F-BB59-F5DF4190D231}"/>
               </a:ext>
             </a:extLst>
           </p:cNvPr>
@@ -3741,7 +3758,7 @@
           <p:cNvPr id="2" name="Заголовок 1">
             <a:extLst>
               <a:ext uri="{FF2B5EF4-FFF2-40B4-BE49-F238E27FC236}">
-                <a16:creationId xmlns="" xmlns:a16="http://schemas.microsoft.com/office/drawing/2014/main" id="{3883AE69-0FC9-4A70-8484-BDEBA005C983}"/>
+                <a16:creationId xmlns:a16="http://schemas.microsoft.com/office/drawing/2014/main" id="{3883AE69-0FC9-4A70-8484-BDEBA005C983}"/>
               </a:ext>
             </a:extLst>
           </p:cNvPr>
@@ -3774,7 +3791,7 @@
           <p:cNvPr id="3" name="Объект 2">
             <a:extLst>
               <a:ext uri="{FF2B5EF4-FFF2-40B4-BE49-F238E27FC236}">
-                <a16:creationId xmlns="" xmlns:a16="http://schemas.microsoft.com/office/drawing/2014/main" id="{F9D58FBF-75CE-415D-A979-FFA765EB5B4A}"/>
+                <a16:creationId xmlns:a16="http://schemas.microsoft.com/office/drawing/2014/main" id="{F9D58FBF-75CE-415D-A979-FFA765EB5B4A}"/>
               </a:ext>
             </a:extLst>
           </p:cNvPr>
@@ -3874,7 +3891,7 @@
           <p:cNvPr id="2" name="Заголовок 1">
             <a:extLst>
               <a:ext uri="{FF2B5EF4-FFF2-40B4-BE49-F238E27FC236}">
-                <a16:creationId xmlns="" xmlns:a16="http://schemas.microsoft.com/office/drawing/2014/main" id="{5FEE7F63-D9D3-407F-8E4F-7E446C1F196D}"/>
+                <a16:creationId xmlns:a16="http://schemas.microsoft.com/office/drawing/2014/main" id="{5FEE7F63-D9D3-407F-8E4F-7E446C1F196D}"/>
               </a:ext>
             </a:extLst>
           </p:cNvPr>
@@ -3907,7 +3924,7 @@
           <p:cNvPr id="3" name="Объект 2">
             <a:extLst>
               <a:ext uri="{FF2B5EF4-FFF2-40B4-BE49-F238E27FC236}">
-                <a16:creationId xmlns="" xmlns:a16="http://schemas.microsoft.com/office/drawing/2014/main" id="{EDB8B475-7563-474C-BC26-1A5A0ECA4B3D}"/>
+                <a16:creationId xmlns:a16="http://schemas.microsoft.com/office/drawing/2014/main" id="{EDB8B475-7563-474C-BC26-1A5A0ECA4B3D}"/>
               </a:ext>
             </a:extLst>
           </p:cNvPr>
@@ -4087,7 +4104,7 @@
           <p:cNvPr id="2" name="Заголовок 1">
             <a:extLst>
               <a:ext uri="{FF2B5EF4-FFF2-40B4-BE49-F238E27FC236}">
-                <a16:creationId xmlns="" xmlns:a16="http://schemas.microsoft.com/office/drawing/2014/main" id="{E19E78BF-FD8D-447D-B0EF-E4CF3C5D31B2}"/>
+                <a16:creationId xmlns:a16="http://schemas.microsoft.com/office/drawing/2014/main" id="{E19E78BF-FD8D-447D-B0EF-E4CF3C5D31B2}"/>
               </a:ext>
             </a:extLst>
           </p:cNvPr>
@@ -4120,7 +4137,7 @@
           <p:cNvPr id="3" name="Объект 2">
             <a:extLst>
               <a:ext uri="{FF2B5EF4-FFF2-40B4-BE49-F238E27FC236}">
-                <a16:creationId xmlns="" xmlns:a16="http://schemas.microsoft.com/office/drawing/2014/main" id="{0CBA654F-1437-40F1-9D51-363851E0425C}"/>
+                <a16:creationId xmlns:a16="http://schemas.microsoft.com/office/drawing/2014/main" id="{0CBA654F-1437-40F1-9D51-363851E0425C}"/>
               </a:ext>
             </a:extLst>
           </p:cNvPr>
@@ -5091,7 +5108,7 @@
   <a:extraClrSchemeLst/>
   <a:extLst>
     <a:ext uri="{05A4C25C-085E-4340-85A3-A5531E510DB2}">
-      <thm15:themeFamily xmlns="" xmlns:thm15="http://schemas.microsoft.com/office/thememl/2012/main" name="Office Theme" id="{62F939B6-93AF-4DB8-9C6B-D6C7DFDC589F}" vid="{4A3C46E8-61CC-4603-A589-7422A47A8E4A}"/>
+      <thm15:themeFamily xmlns:thm15="http://schemas.microsoft.com/office/thememl/2012/main" name="Office Theme" id="{62F939B6-93AF-4DB8-9C6B-D6C7DFDC589F}" vid="{4A3C46E8-61CC-4603-A589-7422A47A8E4A}"/>
     </a:ext>
   </a:extLst>
 </a:theme>

</xml_diff>

<commit_message>
Added some information to the third slide
</commit_message>
<xml_diff>
--- a/REAL.NET.pptx
+++ b/REAL.NET.pptx
@@ -3946,7 +3946,19 @@
               <a:rPr lang="ru-RU" dirty="0">
                 <a:cs typeface="Times New Roman" panose="02020603050405020304" pitchFamily="18" charset="0"/>
               </a:rPr>
-              <a:t>Реализация графического редактора и его составляющих с помощью технологии </a:t>
+              <a:t>Реализация </a:t>
+            </a:r>
+            <a:r>
+              <a:rPr lang="ru-RU" dirty="0" smtClean="0">
+                <a:cs typeface="Times New Roman" panose="02020603050405020304" pitchFamily="18" charset="0"/>
+              </a:rPr>
+              <a:t>части составляющих графического редактора с помощью </a:t>
+            </a:r>
+            <a:r>
+              <a:rPr lang="ru-RU" dirty="0">
+                <a:cs typeface="Times New Roman" panose="02020603050405020304" pitchFamily="18" charset="0"/>
+              </a:rPr>
+              <a:t>технологии </a:t>
             </a:r>
             <a:r>
               <a:rPr lang="en-US" dirty="0">
@@ -3998,6 +4010,26 @@
                 <a:cs typeface="Times New Roman" panose="02020603050405020304" pitchFamily="18" charset="0"/>
               </a:rPr>
               <a:t>а</a:t>
+            </a:r>
+          </a:p>
+          <a:p>
+            <a:r>
+              <a:rPr lang="ru-RU" dirty="0" smtClean="0">
+                <a:cs typeface="Times New Roman" panose="02020603050405020304" pitchFamily="18" charset="0"/>
+              </a:rPr>
+              <a:t>Выбор доступных в </a:t>
+            </a:r>
+            <a:r>
+              <a:rPr lang="ru-RU" dirty="0" err="1" smtClean="0">
+                <a:cs typeface="Times New Roman" panose="02020603050405020304" pitchFamily="18" charset="0"/>
+              </a:rPr>
+              <a:t>репозитории</a:t>
+            </a:r>
+            <a:r>
+              <a:rPr lang="ru-RU" dirty="0" smtClean="0">
+                <a:cs typeface="Times New Roman" panose="02020603050405020304" pitchFamily="18" charset="0"/>
+              </a:rPr>
+              <a:t> моделей, отображение их в редакторе</a:t>
             </a:r>
             <a:endParaRPr lang="en-US" dirty="0" smtClean="0">
               <a:cs typeface="Times New Roman" panose="02020603050405020304" pitchFamily="18" charset="0"/>

</xml_diff>

<commit_message>
Added new slide which describes a task, connected with model's list
</commit_message>
<xml_diff>
--- a/REAL.NET.pptx
+++ b/REAL.NET.pptx
@@ -13,8 +13,9 @@
     <p:sldId id="264" r:id="rId7"/>
     <p:sldId id="262" r:id="rId8"/>
     <p:sldId id="263" r:id="rId9"/>
-    <p:sldId id="265" r:id="rId10"/>
-    <p:sldId id="259" r:id="rId11"/>
+    <p:sldId id="267" r:id="rId10"/>
+    <p:sldId id="265" r:id="rId11"/>
+    <p:sldId id="259" r:id="rId12"/>
   </p:sldIdLst>
   <p:sldSz cx="12192000" cy="6858000"/>
   <p:notesSz cx="6858000" cy="9144000"/>
@@ -3611,6 +3612,124 @@
       </p:grpSpPr>
       <p:sp>
         <p:nvSpPr>
+          <p:cNvPr id="2" name="Заголовок 1"/>
+          <p:cNvSpPr>
+            <a:spLocks noGrp="1"/>
+          </p:cNvSpPr>
+          <p:nvPr>
+            <p:ph type="title"/>
+          </p:nvPr>
+        </p:nvSpPr>
+        <p:spPr/>
+        <p:txBody>
+          <a:bodyPr>
+            <a:normAutofit/>
+          </a:bodyPr>
+          <a:lstStyle/>
+          <a:p>
+            <a:pPr algn="ctr"/>
+            <a:r>
+              <a:rPr lang="ru-RU" sz="5400" dirty="0" smtClean="0"/>
+              <a:t>Технические средства</a:t>
+            </a:r>
+            <a:endParaRPr lang="ru-RU" sz="5400" dirty="0"/>
+          </a:p>
+        </p:txBody>
+      </p:sp>
+      <p:sp>
+        <p:nvSpPr>
+          <p:cNvPr id="3" name="Объект 2"/>
+          <p:cNvSpPr>
+            <a:spLocks noGrp="1"/>
+          </p:cNvSpPr>
+          <p:nvPr>
+            <p:ph idx="1"/>
+          </p:nvPr>
+        </p:nvSpPr>
+        <p:spPr/>
+        <p:txBody>
+          <a:bodyPr/>
+          <a:lstStyle/>
+          <a:p>
+            <a:r>
+              <a:rPr lang="en-US" dirty="0" err="1" smtClean="0"/>
+              <a:t>GitHub</a:t>
+            </a:r>
+            <a:endParaRPr lang="en-US" dirty="0" smtClean="0"/>
+          </a:p>
+          <a:p>
+            <a:r>
+              <a:rPr lang="en-US" dirty="0" err="1" smtClean="0"/>
+              <a:t>GitHub</a:t>
+            </a:r>
+            <a:r>
+              <a:rPr lang="en-US" dirty="0" smtClean="0"/>
+              <a:t> Projects</a:t>
+            </a:r>
+          </a:p>
+          <a:p>
+            <a:r>
+              <a:rPr lang="en-US" dirty="0" err="1" smtClean="0"/>
+              <a:t>Gitter</a:t>
+            </a:r>
+            <a:endParaRPr lang="en-US" dirty="0" smtClean="0"/>
+          </a:p>
+          <a:p>
+            <a:r>
+              <a:rPr lang="en-US" dirty="0" smtClean="0"/>
+              <a:t>Travis CI &amp; </a:t>
+            </a:r>
+            <a:r>
+              <a:rPr lang="en-US" dirty="0" err="1" smtClean="0"/>
+              <a:t>AppVeyor</a:t>
+            </a:r>
+            <a:r>
+              <a:rPr lang="en-US" dirty="0" smtClean="0"/>
+              <a:t> CI</a:t>
+            </a:r>
+            <a:endParaRPr lang="ru-RU" dirty="0"/>
+          </a:p>
+        </p:txBody>
+      </p:sp>
+    </p:spTree>
+    <p:extLst>
+      <p:ext uri="{BB962C8B-B14F-4D97-AF65-F5344CB8AC3E}">
+        <p14:creationId xmlns:p14="http://schemas.microsoft.com/office/powerpoint/2010/main" val="2997512538"/>
+      </p:ext>
+    </p:extLst>
+  </p:cSld>
+  <p:clrMapOvr>
+    <a:masterClrMapping/>
+  </p:clrMapOvr>
+  <p:timing>
+    <p:tnLst>
+      <p:par>
+        <p:cTn id="1" dur="indefinite" restart="never" nodeType="tmRoot"/>
+      </p:par>
+    </p:tnLst>
+  </p:timing>
+</p:sld>
+</file>
+
+<file path=ppt/slides/slide11.xml><?xml version="1.0" encoding="utf-8"?>
+<p:sld xmlns:a="http://schemas.openxmlformats.org/drawingml/2006/main" xmlns:r="http://schemas.openxmlformats.org/officeDocument/2006/relationships" xmlns:p="http://schemas.openxmlformats.org/presentationml/2006/main">
+  <p:cSld>
+    <p:spTree>
+      <p:nvGrpSpPr>
+        <p:cNvPr id="1" name=""/>
+        <p:cNvGrpSpPr/>
+        <p:nvPr/>
+      </p:nvGrpSpPr>
+      <p:grpSpPr>
+        <a:xfrm>
+          <a:off x="0" y="0"/>
+          <a:ext cx="0" cy="0"/>
+          <a:chOff x="0" y="0"/>
+          <a:chExt cx="0" cy="0"/>
+        </a:xfrm>
+      </p:grpSpPr>
+      <p:sp>
+        <p:nvSpPr>
           <p:cNvPr id="2" name="Заголовок 1">
             <a:extLst>
               <a:ext uri="{FF2B5EF4-FFF2-40B4-BE49-F238E27FC236}">
@@ -3733,6 +3852,13 @@
   <p:clrMapOvr>
     <a:masterClrMapping/>
   </p:clrMapOvr>
+  <p:timing>
+    <p:tnLst>
+      <p:par>
+        <p:cTn id="1" dur="indefinite" restart="never" nodeType="tmRoot"/>
+      </p:par>
+    </p:tnLst>
+  </p:timing>
 </p:sld>
 </file>
 
@@ -4309,6 +4435,13 @@
   <p:clrMapOvr>
     <a:masterClrMapping/>
   </p:clrMapOvr>
+  <p:timing>
+    <p:tnLst>
+      <p:par>
+        <p:cTn id="1" dur="indefinite" restart="never" nodeType="tmRoot"/>
+      </p:par>
+    </p:tnLst>
+  </p:timing>
 </p:sld>
 </file>
 
@@ -4433,6 +4566,13 @@
   <p:clrMapOvr>
     <a:masterClrMapping/>
   </p:clrMapOvr>
+  <p:timing>
+    <p:tnLst>
+      <p:par>
+        <p:cTn id="1" dur="indefinite" restart="never" nodeType="tmRoot"/>
+      </p:par>
+    </p:tnLst>
+  </p:timing>
 </p:sld>
 </file>
 
@@ -4553,6 +4693,13 @@
   <p:clrMapOvr>
     <a:masterClrMapping/>
   </p:clrMapOvr>
+  <p:timing>
+    <p:tnLst>
+      <p:par>
+        <p:cTn id="1" dur="indefinite" restart="never" nodeType="tmRoot"/>
+      </p:par>
+    </p:tnLst>
+  </p:timing>
 </p:sld>
 </file>
 
@@ -4737,6 +4884,13 @@
   <p:clrMapOvr>
     <a:masterClrMapping/>
   </p:clrMapOvr>
+  <p:timing>
+    <p:tnLst>
+      <p:par>
+        <p:cTn id="1" dur="indefinite" restart="never" nodeType="tmRoot"/>
+      </p:par>
+    </p:tnLst>
+  </p:timing>
 </p:sld>
 </file>
 
@@ -4769,85 +4923,69 @@
         </p:nvSpPr>
         <p:spPr/>
         <p:txBody>
-          <a:bodyPr>
-            <a:normAutofit/>
-          </a:bodyPr>
+          <a:bodyPr/>
           <a:lstStyle/>
           <a:p>
             <a:pPr algn="ctr"/>
             <a:r>
-              <a:rPr lang="ru-RU" sz="5400" dirty="0" smtClean="0"/>
-              <a:t>Технические средства</a:t>
-            </a:r>
-            <a:endParaRPr lang="ru-RU" sz="5400" dirty="0"/>
-          </a:p>
-        </p:txBody>
-      </p:sp>
-      <p:sp>
-        <p:nvSpPr>
-          <p:cNvPr id="3" name="Объект 2"/>
-          <p:cNvSpPr>
-            <a:spLocks noGrp="1"/>
-          </p:cNvSpPr>
+              <a:rPr lang="ru-RU" dirty="0" smtClean="0"/>
+              <a:t>Выбор доступных в </a:t>
+            </a:r>
+            <a:r>
+              <a:rPr lang="ru-RU" dirty="0" err="1" smtClean="0"/>
+              <a:t>репозитории</a:t>
+            </a:r>
+            <a:r>
+              <a:rPr lang="ru-RU" dirty="0" smtClean="0"/>
+              <a:t> моделей</a:t>
+            </a:r>
+            <a:endParaRPr lang="ru-RU" dirty="0"/>
+          </a:p>
+        </p:txBody>
+      </p:sp>
+      <p:pic>
+        <p:nvPicPr>
+          <p:cNvPr id="4" name="Объект 3"/>
+          <p:cNvPicPr>
+            <a:picLocks noGrp="1" noChangeAspect="1"/>
+          </p:cNvPicPr>
           <p:nvPr>
             <p:ph idx="1"/>
           </p:nvPr>
-        </p:nvSpPr>
-        <p:spPr/>
-        <p:txBody>
-          <a:bodyPr/>
-          <a:lstStyle/>
-          <a:p>
-            <a:r>
-              <a:rPr lang="en-US" dirty="0" err="1" smtClean="0"/>
-              <a:t>GitHub</a:t>
-            </a:r>
-            <a:endParaRPr lang="en-US" dirty="0" smtClean="0"/>
-          </a:p>
-          <a:p>
-            <a:r>
-              <a:rPr lang="en-US" dirty="0" err="1" smtClean="0"/>
-              <a:t>GitHub</a:t>
-            </a:r>
-            <a:r>
-              <a:rPr lang="en-US" dirty="0" smtClean="0"/>
-              <a:t> Projects</a:t>
-            </a:r>
-          </a:p>
-          <a:p>
-            <a:r>
-              <a:rPr lang="en-US" dirty="0" err="1" smtClean="0"/>
-              <a:t>Gitter</a:t>
-            </a:r>
-            <a:endParaRPr lang="en-US" dirty="0" smtClean="0"/>
-          </a:p>
-          <a:p>
-            <a:r>
-              <a:rPr lang="en-US" dirty="0" smtClean="0"/>
-              <a:t>Travis CI &amp; </a:t>
-            </a:r>
-            <a:r>
-              <a:rPr lang="en-US" dirty="0" err="1" smtClean="0"/>
-              <a:t>AppVeyor</a:t>
-            </a:r>
-            <a:r>
-              <a:rPr lang="en-US" dirty="0" smtClean="0"/>
-              <a:t> CI</a:t>
-            </a:r>
-            <a:endParaRPr lang="ru-RU" dirty="0"/>
-          </a:p>
-        </p:txBody>
-      </p:sp>
+        </p:nvPicPr>
+        <p:blipFill>
+          <a:blip r:embed="rId2"/>
+          <a:stretch>
+            <a:fillRect/>
+          </a:stretch>
+        </p:blipFill>
+        <p:spPr>
+          <a:xfrm>
+            <a:off x="1195132" y="1690688"/>
+            <a:ext cx="9801735" cy="4599276"/>
+          </a:xfrm>
+          <a:prstGeom prst="rect">
+            <a:avLst/>
+          </a:prstGeom>
+        </p:spPr>
+      </p:pic>
     </p:spTree>
     <p:extLst>
       <p:ext uri="{BB962C8B-B14F-4D97-AF65-F5344CB8AC3E}">
-        <p14:creationId xmlns:p14="http://schemas.microsoft.com/office/powerpoint/2010/main" val="2997512538"/>
+        <p14:creationId xmlns:p14="http://schemas.microsoft.com/office/powerpoint/2010/main" val="1159847860"/>
       </p:ext>
     </p:extLst>
   </p:cSld>
   <p:clrMapOvr>
     <a:masterClrMapping/>
   </p:clrMapOvr>
+  <p:timing>
+    <p:tnLst>
+      <p:par>
+        <p:cTn id="1" dur="indefinite" restart="never" nodeType="tmRoot"/>
+      </p:par>
+    </p:tnLst>
+  </p:timing>
 </p:sld>
 </file>
 

</xml_diff>